<commit_message>
[#10 Regular Expression Matching] Add 010_RegularExpressionMatching_DynamicProgramming02.png to show the result of 010_RegularExpressionMatching_DynamicProgramming01.png.
</commit_message>
<xml_diff>
--- a/Resources/010_RegularExpressionMatching_DynamicProgramming.pptx
+++ b/Resources/010_RegularExpressionMatching_DynamicProgramming.pptx
@@ -6,11 +6,12 @@
   </p:sldMasterIdLst>
   <p:sldIdLst>
     <p:sldId id="371" r:id="rId2"/>
-    <p:sldId id="372" r:id="rId3"/>
-    <p:sldId id="373" r:id="rId4"/>
-    <p:sldId id="374" r:id="rId5"/>
-    <p:sldId id="375" r:id="rId6"/>
-    <p:sldId id="376" r:id="rId7"/>
+    <p:sldId id="377" r:id="rId3"/>
+    <p:sldId id="372" r:id="rId4"/>
+    <p:sldId id="373" r:id="rId5"/>
+    <p:sldId id="374" r:id="rId6"/>
+    <p:sldId id="375" r:id="rId7"/>
+    <p:sldId id="376" r:id="rId8"/>
   </p:sldIdLst>
   <p:sldSz cx="12192000" cy="6858000"/>
   <p:notesSz cx="6858000" cy="9144000"/>
@@ -248,7 +249,7 @@
           <a:p>
             <a:fld id="{E27CD909-5952-48F8-A19C-6F1FFF2EAE97}" type="datetimeFigureOut">
               <a:rPr lang="zh-CN" altLang="en-US" smtClean="0"/>
-              <a:t>2017/6/30</a:t>
+              <a:t>2017/7/1</a:t>
             </a:fld>
             <a:endParaRPr lang="zh-CN" altLang="en-US"/>
           </a:p>
@@ -418,7 +419,7 @@
           <a:p>
             <a:fld id="{E27CD909-5952-48F8-A19C-6F1FFF2EAE97}" type="datetimeFigureOut">
               <a:rPr lang="zh-CN" altLang="en-US" smtClean="0"/>
-              <a:t>2017/6/30</a:t>
+              <a:t>2017/7/1</a:t>
             </a:fld>
             <a:endParaRPr lang="zh-CN" altLang="en-US"/>
           </a:p>
@@ -598,7 +599,7 @@
           <a:p>
             <a:fld id="{E27CD909-5952-48F8-A19C-6F1FFF2EAE97}" type="datetimeFigureOut">
               <a:rPr lang="zh-CN" altLang="en-US" smtClean="0"/>
-              <a:t>2017/6/30</a:t>
+              <a:t>2017/7/1</a:t>
             </a:fld>
             <a:endParaRPr lang="zh-CN" altLang="en-US"/>
           </a:p>
@@ -768,7 +769,7 @@
           <a:p>
             <a:fld id="{E27CD909-5952-48F8-A19C-6F1FFF2EAE97}" type="datetimeFigureOut">
               <a:rPr lang="zh-CN" altLang="en-US" smtClean="0"/>
-              <a:t>2017/6/30</a:t>
+              <a:t>2017/7/1</a:t>
             </a:fld>
             <a:endParaRPr lang="zh-CN" altLang="en-US"/>
           </a:p>
@@ -1014,7 +1015,7 @@
           <a:p>
             <a:fld id="{E27CD909-5952-48F8-A19C-6F1FFF2EAE97}" type="datetimeFigureOut">
               <a:rPr lang="zh-CN" altLang="en-US" smtClean="0"/>
-              <a:t>2017/6/30</a:t>
+              <a:t>2017/7/1</a:t>
             </a:fld>
             <a:endParaRPr lang="zh-CN" altLang="en-US"/>
           </a:p>
@@ -1246,7 +1247,7 @@
           <a:p>
             <a:fld id="{E27CD909-5952-48F8-A19C-6F1FFF2EAE97}" type="datetimeFigureOut">
               <a:rPr lang="zh-CN" altLang="en-US" smtClean="0"/>
-              <a:t>2017/6/30</a:t>
+              <a:t>2017/7/1</a:t>
             </a:fld>
             <a:endParaRPr lang="zh-CN" altLang="en-US"/>
           </a:p>
@@ -1613,7 +1614,7 @@
           <a:p>
             <a:fld id="{E27CD909-5952-48F8-A19C-6F1FFF2EAE97}" type="datetimeFigureOut">
               <a:rPr lang="zh-CN" altLang="en-US" smtClean="0"/>
-              <a:t>2017/6/30</a:t>
+              <a:t>2017/7/1</a:t>
             </a:fld>
             <a:endParaRPr lang="zh-CN" altLang="en-US"/>
           </a:p>
@@ -1731,7 +1732,7 @@
           <a:p>
             <a:fld id="{E27CD909-5952-48F8-A19C-6F1FFF2EAE97}" type="datetimeFigureOut">
               <a:rPr lang="zh-CN" altLang="en-US" smtClean="0"/>
-              <a:t>2017/6/30</a:t>
+              <a:t>2017/7/1</a:t>
             </a:fld>
             <a:endParaRPr lang="zh-CN" altLang="en-US"/>
           </a:p>
@@ -1826,7 +1827,7 @@
           <a:p>
             <a:fld id="{E27CD909-5952-48F8-A19C-6F1FFF2EAE97}" type="datetimeFigureOut">
               <a:rPr lang="zh-CN" altLang="en-US" smtClean="0"/>
-              <a:t>2017/6/30</a:t>
+              <a:t>2017/7/1</a:t>
             </a:fld>
             <a:endParaRPr lang="zh-CN" altLang="en-US"/>
           </a:p>
@@ -2103,7 +2104,7 @@
           <a:p>
             <a:fld id="{E27CD909-5952-48F8-A19C-6F1FFF2EAE97}" type="datetimeFigureOut">
               <a:rPr lang="zh-CN" altLang="en-US" smtClean="0"/>
-              <a:t>2017/6/30</a:t>
+              <a:t>2017/7/1</a:t>
             </a:fld>
             <a:endParaRPr lang="zh-CN" altLang="en-US"/>
           </a:p>
@@ -2356,7 +2357,7 @@
           <a:p>
             <a:fld id="{E27CD909-5952-48F8-A19C-6F1FFF2EAE97}" type="datetimeFigureOut">
               <a:rPr lang="zh-CN" altLang="en-US" smtClean="0"/>
-              <a:t>2017/6/30</a:t>
+              <a:t>2017/7/1</a:t>
             </a:fld>
             <a:endParaRPr lang="zh-CN" altLang="en-US"/>
           </a:p>
@@ -2569,7 +2570,7 @@
           <a:p>
             <a:fld id="{E27CD909-5952-48F8-A19C-6F1FFF2EAE97}" type="datetimeFigureOut">
               <a:rPr lang="zh-CN" altLang="en-US" smtClean="0"/>
-              <a:t>2017/6/30</a:t>
+              <a:t>2017/7/1</a:t>
             </a:fld>
             <a:endParaRPr lang="zh-CN" altLang="en-US"/>
           </a:p>
@@ -5955,6 +5956,9 @@
           <a:prstGeom prst="rect">
             <a:avLst/>
           </a:prstGeom>
+          <a:solidFill>
+            <a:srgbClr val="00B0F0"/>
+          </a:solidFill>
         </p:spPr>
         <p:style>
           <a:lnRef idx="2">
@@ -6076,6 +6080,90 @@
         <p:spPr>
           <a:xfrm>
             <a:off x="1561356" y="437159"/>
+            <a:ext cx="360000" cy="360000"/>
+          </a:xfrm>
+          <a:prstGeom prst="rect">
+            <a:avLst/>
+          </a:prstGeom>
+        </p:spPr>
+        <p:style>
+          <a:lnRef idx="2">
+            <a:schemeClr val="accent1"/>
+          </a:lnRef>
+          <a:fillRef idx="1">
+            <a:schemeClr val="lt1"/>
+          </a:fillRef>
+          <a:effectRef idx="0">
+            <a:schemeClr val="accent1"/>
+          </a:effectRef>
+          <a:fontRef idx="minor">
+            <a:schemeClr val="dk1"/>
+          </a:fontRef>
+        </p:style>
+        <p:txBody>
+          <a:bodyPr rtlCol="0" anchor="ctr"/>
+          <a:lstStyle/>
+          <a:p>
+            <a:pPr algn="ctr"/>
+            <a:r>
+              <a:rPr lang="en-US" altLang="zh-CN" dirty="0"/>
+              <a:t>0</a:t>
+            </a:r>
+            <a:endParaRPr lang="zh-CN" altLang="en-US" dirty="0"/>
+          </a:p>
+        </p:txBody>
+      </p:sp>
+      <p:sp>
+        <p:nvSpPr>
+          <p:cNvPr id="8" name="矩形 7"/>
+          <p:cNvSpPr/>
+          <p:nvPr/>
+        </p:nvSpPr>
+        <p:spPr>
+          <a:xfrm>
+            <a:off x="1921356" y="437159"/>
+            <a:ext cx="360000" cy="360000"/>
+          </a:xfrm>
+          <a:prstGeom prst="rect">
+            <a:avLst/>
+          </a:prstGeom>
+        </p:spPr>
+        <p:style>
+          <a:lnRef idx="2">
+            <a:schemeClr val="accent1"/>
+          </a:lnRef>
+          <a:fillRef idx="1">
+            <a:schemeClr val="lt1"/>
+          </a:fillRef>
+          <a:effectRef idx="0">
+            <a:schemeClr val="accent1"/>
+          </a:effectRef>
+          <a:fontRef idx="minor">
+            <a:schemeClr val="dk1"/>
+          </a:fontRef>
+        </p:style>
+        <p:txBody>
+          <a:bodyPr rtlCol="0" anchor="ctr"/>
+          <a:lstStyle/>
+          <a:p>
+            <a:pPr algn="ctr"/>
+            <a:r>
+              <a:rPr lang="en-US" altLang="zh-CN" dirty="0"/>
+              <a:t>0</a:t>
+            </a:r>
+            <a:endParaRPr lang="zh-CN" altLang="en-US" dirty="0"/>
+          </a:p>
+        </p:txBody>
+      </p:sp>
+      <p:sp>
+        <p:nvSpPr>
+          <p:cNvPr id="9" name="矩形 8"/>
+          <p:cNvSpPr/>
+          <p:nvPr/>
+        </p:nvSpPr>
+        <p:spPr>
+          <a:xfrm>
+            <a:off x="2281356" y="437159"/>
             <a:ext cx="360000" cy="360000"/>
           </a:xfrm>
           <a:prstGeom prst="rect">
@@ -6193,7 +6281,7 @@
             <a:pPr algn="ctr"/>
             <a:r>
               <a:rPr lang="en-US" altLang="zh-CN" dirty="0"/>
-              <a:t>a</a:t>
+              <a:t>b</a:t>
             </a:r>
             <a:endParaRPr lang="zh-CN" altLang="en-US" dirty="0"/>
           </a:p>
@@ -6246,349 +6334,13 @@
       </p:sp>
       <p:sp>
         <p:nvSpPr>
-          <p:cNvPr id="19" name="矩形 18"/>
-          <p:cNvSpPr/>
-          <p:nvPr/>
-        </p:nvSpPr>
-        <p:spPr>
-          <a:xfrm>
-            <a:off x="481356" y="793969"/>
-            <a:ext cx="360000" cy="360000"/>
-          </a:xfrm>
-          <a:prstGeom prst="rect">
-            <a:avLst/>
-          </a:prstGeom>
-        </p:spPr>
-        <p:style>
-          <a:lnRef idx="2">
-            <a:schemeClr val="accent1"/>
-          </a:lnRef>
-          <a:fillRef idx="1">
-            <a:schemeClr val="lt1"/>
-          </a:fillRef>
-          <a:effectRef idx="0">
-            <a:schemeClr val="accent1"/>
-          </a:effectRef>
-          <a:fontRef idx="minor">
-            <a:schemeClr val="dk1"/>
-          </a:fontRef>
-        </p:style>
-        <p:txBody>
-          <a:bodyPr rtlCol="0" anchor="ctr"/>
-          <a:lstStyle/>
-          <a:p>
-            <a:pPr algn="ctr"/>
-            <a:r>
-              <a:rPr lang="en-US" altLang="zh-CN" dirty="0"/>
-              <a:t>0</a:t>
-            </a:r>
-            <a:endParaRPr lang="zh-CN" altLang="en-US" dirty="0"/>
-          </a:p>
-        </p:txBody>
-      </p:sp>
-      <p:sp>
-        <p:nvSpPr>
-          <p:cNvPr id="20" name="矩形 19"/>
-          <p:cNvSpPr/>
-          <p:nvPr/>
-        </p:nvSpPr>
-        <p:spPr>
-          <a:xfrm>
-            <a:off x="841356" y="793969"/>
-            <a:ext cx="360000" cy="360000"/>
-          </a:xfrm>
-          <a:prstGeom prst="rect">
-            <a:avLst/>
-          </a:prstGeom>
-        </p:spPr>
-        <p:style>
-          <a:lnRef idx="2">
-            <a:schemeClr val="accent1"/>
-          </a:lnRef>
-          <a:fillRef idx="1">
-            <a:schemeClr val="lt1"/>
-          </a:fillRef>
-          <a:effectRef idx="0">
-            <a:schemeClr val="accent1"/>
-          </a:effectRef>
-          <a:fontRef idx="minor">
-            <a:schemeClr val="dk1"/>
-          </a:fontRef>
-        </p:style>
-        <p:txBody>
-          <a:bodyPr rtlCol="0" anchor="ctr"/>
-          <a:lstStyle/>
-          <a:p>
-            <a:pPr algn="ctr"/>
-            <a:r>
-              <a:rPr lang="en-US" altLang="zh-CN" dirty="0"/>
-              <a:t>0</a:t>
-            </a:r>
-            <a:endParaRPr lang="zh-CN" altLang="en-US" dirty="0"/>
-          </a:p>
-        </p:txBody>
-      </p:sp>
-      <p:sp>
-        <p:nvSpPr>
-          <p:cNvPr id="21" name="矩形 20"/>
-          <p:cNvSpPr/>
-          <p:nvPr/>
-        </p:nvSpPr>
-        <p:spPr>
-          <a:xfrm>
-            <a:off x="1201356" y="793969"/>
-            <a:ext cx="360000" cy="360000"/>
-          </a:xfrm>
-          <a:prstGeom prst="rect">
-            <a:avLst/>
-          </a:prstGeom>
-        </p:spPr>
-        <p:style>
-          <a:lnRef idx="2">
-            <a:schemeClr val="accent1"/>
-          </a:lnRef>
-          <a:fillRef idx="1">
-            <a:schemeClr val="lt1"/>
-          </a:fillRef>
-          <a:effectRef idx="0">
-            <a:schemeClr val="accent1"/>
-          </a:effectRef>
-          <a:fontRef idx="minor">
-            <a:schemeClr val="dk1"/>
-          </a:fontRef>
-        </p:style>
-        <p:txBody>
-          <a:bodyPr rtlCol="0" anchor="ctr"/>
-          <a:lstStyle/>
-          <a:p>
-            <a:pPr algn="ctr"/>
-            <a:r>
-              <a:rPr lang="en-US" altLang="zh-CN" dirty="0"/>
-              <a:t>0</a:t>
-            </a:r>
-            <a:endParaRPr lang="zh-CN" altLang="en-US" dirty="0"/>
-          </a:p>
-        </p:txBody>
-      </p:sp>
-      <p:sp>
-        <p:nvSpPr>
-          <p:cNvPr id="22" name="矩形 21"/>
-          <p:cNvSpPr/>
-          <p:nvPr/>
-        </p:nvSpPr>
-        <p:spPr>
-          <a:xfrm>
-            <a:off x="1561356" y="793969"/>
-            <a:ext cx="360000" cy="360000"/>
-          </a:xfrm>
-          <a:prstGeom prst="rect">
-            <a:avLst/>
-          </a:prstGeom>
-        </p:spPr>
-        <p:style>
-          <a:lnRef idx="2">
-            <a:schemeClr val="accent1"/>
-          </a:lnRef>
-          <a:fillRef idx="1">
-            <a:schemeClr val="lt1"/>
-          </a:fillRef>
-          <a:effectRef idx="0">
-            <a:schemeClr val="accent1"/>
-          </a:effectRef>
-          <a:fontRef idx="minor">
-            <a:schemeClr val="dk1"/>
-          </a:fontRef>
-        </p:style>
-        <p:txBody>
-          <a:bodyPr rtlCol="0" anchor="ctr"/>
-          <a:lstStyle/>
-          <a:p>
-            <a:pPr algn="ctr"/>
-            <a:r>
-              <a:rPr lang="en-US" altLang="zh-CN" dirty="0"/>
-              <a:t>0</a:t>
-            </a:r>
-            <a:endParaRPr lang="zh-CN" altLang="en-US" dirty="0"/>
-          </a:p>
-        </p:txBody>
-      </p:sp>
-      <p:sp>
-        <p:nvSpPr>
-          <p:cNvPr id="33" name="矩形 32"/>
-          <p:cNvSpPr/>
-          <p:nvPr/>
-        </p:nvSpPr>
-        <p:spPr>
-          <a:xfrm>
-            <a:off x="481356" y="1151155"/>
-            <a:ext cx="360000" cy="360000"/>
-          </a:xfrm>
-          <a:prstGeom prst="rect">
-            <a:avLst/>
-          </a:prstGeom>
-        </p:spPr>
-        <p:style>
-          <a:lnRef idx="2">
-            <a:schemeClr val="accent1"/>
-          </a:lnRef>
-          <a:fillRef idx="1">
-            <a:schemeClr val="lt1"/>
-          </a:fillRef>
-          <a:effectRef idx="0">
-            <a:schemeClr val="accent1"/>
-          </a:effectRef>
-          <a:fontRef idx="minor">
-            <a:schemeClr val="dk1"/>
-          </a:fontRef>
-        </p:style>
-        <p:txBody>
-          <a:bodyPr rtlCol="0" anchor="ctr"/>
-          <a:lstStyle/>
-          <a:p>
-            <a:pPr algn="ctr"/>
-            <a:r>
-              <a:rPr lang="en-US" altLang="zh-CN" dirty="0"/>
-              <a:t>0</a:t>
-            </a:r>
-            <a:endParaRPr lang="zh-CN" altLang="en-US" dirty="0"/>
-          </a:p>
-        </p:txBody>
-      </p:sp>
-      <p:sp>
-        <p:nvSpPr>
-          <p:cNvPr id="34" name="矩形 33"/>
-          <p:cNvSpPr/>
-          <p:nvPr/>
-        </p:nvSpPr>
-        <p:spPr>
-          <a:xfrm>
-            <a:off x="841356" y="1151155"/>
-            <a:ext cx="360000" cy="360000"/>
-          </a:xfrm>
-          <a:prstGeom prst="rect">
-            <a:avLst/>
-          </a:prstGeom>
-        </p:spPr>
-        <p:style>
-          <a:lnRef idx="2">
-            <a:schemeClr val="accent1"/>
-          </a:lnRef>
-          <a:fillRef idx="1">
-            <a:schemeClr val="lt1"/>
-          </a:fillRef>
-          <a:effectRef idx="0">
-            <a:schemeClr val="accent1"/>
-          </a:effectRef>
-          <a:fontRef idx="minor">
-            <a:schemeClr val="dk1"/>
-          </a:fontRef>
-        </p:style>
-        <p:txBody>
-          <a:bodyPr rtlCol="0" anchor="ctr"/>
-          <a:lstStyle/>
-          <a:p>
-            <a:pPr algn="ctr"/>
-            <a:r>
-              <a:rPr lang="en-US" altLang="zh-CN" dirty="0"/>
-              <a:t>0</a:t>
-            </a:r>
-            <a:endParaRPr lang="zh-CN" altLang="en-US" dirty="0"/>
-          </a:p>
-        </p:txBody>
-      </p:sp>
-      <p:sp>
-        <p:nvSpPr>
-          <p:cNvPr id="35" name="矩形 34"/>
-          <p:cNvSpPr/>
-          <p:nvPr/>
-        </p:nvSpPr>
-        <p:spPr>
-          <a:xfrm>
-            <a:off x="1201356" y="1151155"/>
-            <a:ext cx="360000" cy="360000"/>
-          </a:xfrm>
-          <a:prstGeom prst="rect">
-            <a:avLst/>
-          </a:prstGeom>
-        </p:spPr>
-        <p:style>
-          <a:lnRef idx="2">
-            <a:schemeClr val="accent1"/>
-          </a:lnRef>
-          <a:fillRef idx="1">
-            <a:schemeClr val="lt1"/>
-          </a:fillRef>
-          <a:effectRef idx="0">
-            <a:schemeClr val="accent1"/>
-          </a:effectRef>
-          <a:fontRef idx="minor">
-            <a:schemeClr val="dk1"/>
-          </a:fontRef>
-        </p:style>
-        <p:txBody>
-          <a:bodyPr rtlCol="0" anchor="ctr"/>
-          <a:lstStyle/>
-          <a:p>
-            <a:pPr algn="ctr"/>
-            <a:r>
-              <a:rPr lang="en-US" altLang="zh-CN" dirty="0"/>
-              <a:t>0</a:t>
-            </a:r>
-            <a:endParaRPr lang="zh-CN" altLang="en-US" dirty="0"/>
-          </a:p>
-        </p:txBody>
-      </p:sp>
-      <p:sp>
-        <p:nvSpPr>
-          <p:cNvPr id="36" name="矩形 35"/>
-          <p:cNvSpPr/>
-          <p:nvPr/>
-        </p:nvSpPr>
-        <p:spPr>
-          <a:xfrm>
-            <a:off x="1561356" y="1151155"/>
-            <a:ext cx="360000" cy="360000"/>
-          </a:xfrm>
-          <a:prstGeom prst="rect">
-            <a:avLst/>
-          </a:prstGeom>
-        </p:spPr>
-        <p:style>
-          <a:lnRef idx="2">
-            <a:schemeClr val="accent1"/>
-          </a:lnRef>
-          <a:fillRef idx="1">
-            <a:schemeClr val="lt1"/>
-          </a:fillRef>
-          <a:effectRef idx="0">
-            <a:schemeClr val="accent1"/>
-          </a:effectRef>
-          <a:fontRef idx="minor">
-            <a:schemeClr val="dk1"/>
-          </a:fontRef>
-        </p:style>
-        <p:txBody>
-          <a:bodyPr rtlCol="0" anchor="ctr"/>
-          <a:lstStyle/>
-          <a:p>
-            <a:pPr algn="ctr"/>
-            <a:r>
-              <a:rPr lang="en-US" altLang="zh-CN" dirty="0"/>
-              <a:t>0</a:t>
-            </a:r>
-            <a:endParaRPr lang="zh-CN" altLang="en-US" dirty="0"/>
-          </a:p>
-        </p:txBody>
-      </p:sp>
-      <p:sp>
-        <p:nvSpPr>
-          <p:cNvPr id="65" name="矩形 64"/>
-          <p:cNvSpPr/>
-          <p:nvPr/>
-        </p:nvSpPr>
-        <p:spPr>
-          <a:xfrm>
-            <a:off x="121356" y="789748"/>
+          <p:cNvPr id="14" name="矩形 13"/>
+          <p:cNvSpPr/>
+          <p:nvPr/>
+        </p:nvSpPr>
+        <p:spPr>
+          <a:xfrm>
+            <a:off x="1921356" y="76221"/>
             <a:ext cx="360000" cy="360000"/>
           </a:xfrm>
           <a:prstGeom prst="rect">
@@ -6619,21 +6371,21 @@
             <a:pPr algn="ctr"/>
             <a:r>
               <a:rPr lang="en-US" altLang="zh-CN" dirty="0"/>
-              <a:t>a</a:t>
-            </a:r>
-            <a:endParaRPr lang="zh-CN" altLang="en-US" dirty="0"/>
-          </a:p>
-        </p:txBody>
-      </p:sp>
-      <p:sp>
-        <p:nvSpPr>
-          <p:cNvPr id="66" name="矩形 65"/>
-          <p:cNvSpPr/>
-          <p:nvPr/>
-        </p:nvSpPr>
-        <p:spPr>
-          <a:xfrm>
-            <a:off x="121356" y="1142337"/>
+              <a:t>d</a:t>
+            </a:r>
+            <a:endParaRPr lang="zh-CN" altLang="en-US" dirty="0"/>
+          </a:p>
+        </p:txBody>
+      </p:sp>
+      <p:sp>
+        <p:nvSpPr>
+          <p:cNvPr id="15" name="矩形 14"/>
+          <p:cNvSpPr/>
+          <p:nvPr/>
+        </p:nvSpPr>
+        <p:spPr>
+          <a:xfrm>
+            <a:off x="2281356" y="76221"/>
             <a:ext cx="360000" cy="360000"/>
           </a:xfrm>
           <a:prstGeom prst="rect">
@@ -6664,21 +6416,21 @@
             <a:pPr algn="ctr"/>
             <a:r>
               <a:rPr lang="en-US" altLang="zh-CN" dirty="0"/>
-              <a:t>.</a:t>
-            </a:r>
-            <a:endParaRPr lang="zh-CN" altLang="en-US" dirty="0"/>
-          </a:p>
-        </p:txBody>
-      </p:sp>
-      <p:sp>
-        <p:nvSpPr>
-          <p:cNvPr id="67" name="矩形 66"/>
-          <p:cNvSpPr/>
-          <p:nvPr/>
-        </p:nvSpPr>
-        <p:spPr>
-          <a:xfrm>
-            <a:off x="121356" y="1516783"/>
+              <a:t>d</a:t>
+            </a:r>
+            <a:endParaRPr lang="zh-CN" altLang="en-US" dirty="0"/>
+          </a:p>
+        </p:txBody>
+      </p:sp>
+      <p:sp>
+        <p:nvSpPr>
+          <p:cNvPr id="16" name="矩形 15"/>
+          <p:cNvSpPr/>
+          <p:nvPr/>
+        </p:nvSpPr>
+        <p:spPr>
+          <a:xfrm>
+            <a:off x="2641356" y="76221"/>
             <a:ext cx="360000" cy="360000"/>
           </a:xfrm>
           <a:prstGeom prst="rect">
@@ -6709,7 +6461,1084 @@
             <a:pPr algn="ctr"/>
             <a:r>
               <a:rPr lang="en-US" altLang="zh-CN" dirty="0"/>
-              <a:t>c</a:t>
+              <a:t>d</a:t>
+            </a:r>
+            <a:endParaRPr lang="zh-CN" altLang="en-US" dirty="0"/>
+          </a:p>
+        </p:txBody>
+      </p:sp>
+      <p:sp>
+        <p:nvSpPr>
+          <p:cNvPr id="17" name="矩形 16"/>
+          <p:cNvSpPr/>
+          <p:nvPr/>
+        </p:nvSpPr>
+        <p:spPr>
+          <a:xfrm>
+            <a:off x="3001356" y="75752"/>
+            <a:ext cx="360000" cy="360000"/>
+          </a:xfrm>
+          <a:prstGeom prst="rect">
+            <a:avLst/>
+          </a:prstGeom>
+          <a:ln>
+            <a:noFill/>
+          </a:ln>
+        </p:spPr>
+        <p:style>
+          <a:lnRef idx="2">
+            <a:schemeClr val="accent1"/>
+          </a:lnRef>
+          <a:fillRef idx="1">
+            <a:schemeClr val="lt1"/>
+          </a:fillRef>
+          <a:effectRef idx="0">
+            <a:schemeClr val="accent1"/>
+          </a:effectRef>
+          <a:fontRef idx="minor">
+            <a:schemeClr val="dk1"/>
+          </a:fontRef>
+        </p:style>
+        <p:txBody>
+          <a:bodyPr rtlCol="0" anchor="ctr"/>
+          <a:lstStyle/>
+          <a:p>
+            <a:pPr algn="ctr"/>
+            <a:r>
+              <a:rPr lang="en-US" altLang="zh-CN" dirty="0"/>
+              <a:t>g</a:t>
+            </a:r>
+            <a:endParaRPr lang="zh-CN" altLang="en-US" dirty="0"/>
+          </a:p>
+        </p:txBody>
+      </p:sp>
+      <p:sp>
+        <p:nvSpPr>
+          <p:cNvPr id="19" name="矩形 18"/>
+          <p:cNvSpPr/>
+          <p:nvPr/>
+        </p:nvSpPr>
+        <p:spPr>
+          <a:xfrm>
+            <a:off x="481356" y="793969"/>
+            <a:ext cx="360000" cy="360000"/>
+          </a:xfrm>
+          <a:prstGeom prst="rect">
+            <a:avLst/>
+          </a:prstGeom>
+        </p:spPr>
+        <p:style>
+          <a:lnRef idx="2">
+            <a:schemeClr val="accent1"/>
+          </a:lnRef>
+          <a:fillRef idx="1">
+            <a:schemeClr val="lt1"/>
+          </a:fillRef>
+          <a:effectRef idx="0">
+            <a:schemeClr val="accent1"/>
+          </a:effectRef>
+          <a:fontRef idx="minor">
+            <a:schemeClr val="dk1"/>
+          </a:fontRef>
+        </p:style>
+        <p:txBody>
+          <a:bodyPr rtlCol="0" anchor="ctr"/>
+          <a:lstStyle/>
+          <a:p>
+            <a:pPr algn="ctr"/>
+            <a:r>
+              <a:rPr lang="en-US" altLang="zh-CN" dirty="0"/>
+              <a:t>0</a:t>
+            </a:r>
+            <a:endParaRPr lang="zh-CN" altLang="en-US" dirty="0"/>
+          </a:p>
+        </p:txBody>
+      </p:sp>
+      <p:sp>
+        <p:nvSpPr>
+          <p:cNvPr id="20" name="矩形 19"/>
+          <p:cNvSpPr/>
+          <p:nvPr/>
+        </p:nvSpPr>
+        <p:spPr>
+          <a:xfrm>
+            <a:off x="841356" y="793969"/>
+            <a:ext cx="360000" cy="360000"/>
+          </a:xfrm>
+          <a:prstGeom prst="rect">
+            <a:avLst/>
+          </a:prstGeom>
+          <a:solidFill>
+            <a:srgbClr val="00B0F0"/>
+          </a:solidFill>
+        </p:spPr>
+        <p:style>
+          <a:lnRef idx="2">
+            <a:schemeClr val="accent1"/>
+          </a:lnRef>
+          <a:fillRef idx="1">
+            <a:schemeClr val="lt1"/>
+          </a:fillRef>
+          <a:effectRef idx="0">
+            <a:schemeClr val="accent1"/>
+          </a:effectRef>
+          <a:fontRef idx="minor">
+            <a:schemeClr val="dk1"/>
+          </a:fontRef>
+        </p:style>
+        <p:txBody>
+          <a:bodyPr rtlCol="0" anchor="ctr"/>
+          <a:lstStyle/>
+          <a:p>
+            <a:pPr algn="ctr"/>
+            <a:r>
+              <a:rPr lang="en-US" altLang="zh-CN" dirty="0"/>
+              <a:t>1</a:t>
+            </a:r>
+            <a:endParaRPr lang="zh-CN" altLang="en-US" dirty="0"/>
+          </a:p>
+        </p:txBody>
+      </p:sp>
+      <p:sp>
+        <p:nvSpPr>
+          <p:cNvPr id="21" name="矩形 20"/>
+          <p:cNvSpPr/>
+          <p:nvPr/>
+        </p:nvSpPr>
+        <p:spPr>
+          <a:xfrm>
+            <a:off x="1201356" y="793969"/>
+            <a:ext cx="360000" cy="360000"/>
+          </a:xfrm>
+          <a:prstGeom prst="rect">
+            <a:avLst/>
+          </a:prstGeom>
+        </p:spPr>
+        <p:style>
+          <a:lnRef idx="2">
+            <a:schemeClr val="accent1"/>
+          </a:lnRef>
+          <a:fillRef idx="1">
+            <a:schemeClr val="lt1"/>
+          </a:fillRef>
+          <a:effectRef idx="0">
+            <a:schemeClr val="accent1"/>
+          </a:effectRef>
+          <a:fontRef idx="minor">
+            <a:schemeClr val="dk1"/>
+          </a:fontRef>
+        </p:style>
+        <p:txBody>
+          <a:bodyPr rtlCol="0" anchor="ctr"/>
+          <a:lstStyle/>
+          <a:p>
+            <a:pPr algn="ctr"/>
+            <a:r>
+              <a:rPr lang="en-US" altLang="zh-CN" dirty="0"/>
+              <a:t>0</a:t>
+            </a:r>
+            <a:endParaRPr lang="zh-CN" altLang="en-US" dirty="0"/>
+          </a:p>
+        </p:txBody>
+      </p:sp>
+      <p:sp>
+        <p:nvSpPr>
+          <p:cNvPr id="22" name="矩形 21"/>
+          <p:cNvSpPr/>
+          <p:nvPr/>
+        </p:nvSpPr>
+        <p:spPr>
+          <a:xfrm>
+            <a:off x="1561356" y="793969"/>
+            <a:ext cx="360000" cy="360000"/>
+          </a:xfrm>
+          <a:prstGeom prst="rect">
+            <a:avLst/>
+          </a:prstGeom>
+        </p:spPr>
+        <p:style>
+          <a:lnRef idx="2">
+            <a:schemeClr val="accent1"/>
+          </a:lnRef>
+          <a:fillRef idx="1">
+            <a:schemeClr val="lt1"/>
+          </a:fillRef>
+          <a:effectRef idx="0">
+            <a:schemeClr val="accent1"/>
+          </a:effectRef>
+          <a:fontRef idx="minor">
+            <a:schemeClr val="dk1"/>
+          </a:fontRef>
+        </p:style>
+        <p:txBody>
+          <a:bodyPr rtlCol="0" anchor="ctr"/>
+          <a:lstStyle/>
+          <a:p>
+            <a:pPr algn="ctr"/>
+            <a:r>
+              <a:rPr lang="en-US" altLang="zh-CN" dirty="0"/>
+              <a:t>0</a:t>
+            </a:r>
+            <a:endParaRPr lang="zh-CN" altLang="en-US" dirty="0"/>
+          </a:p>
+        </p:txBody>
+      </p:sp>
+      <p:sp>
+        <p:nvSpPr>
+          <p:cNvPr id="23" name="矩形 22"/>
+          <p:cNvSpPr/>
+          <p:nvPr/>
+        </p:nvSpPr>
+        <p:spPr>
+          <a:xfrm>
+            <a:off x="1921356" y="793969"/>
+            <a:ext cx="360000" cy="360000"/>
+          </a:xfrm>
+          <a:prstGeom prst="rect">
+            <a:avLst/>
+          </a:prstGeom>
+        </p:spPr>
+        <p:style>
+          <a:lnRef idx="2">
+            <a:schemeClr val="accent1"/>
+          </a:lnRef>
+          <a:fillRef idx="1">
+            <a:schemeClr val="lt1"/>
+          </a:fillRef>
+          <a:effectRef idx="0">
+            <a:schemeClr val="accent1"/>
+          </a:effectRef>
+          <a:fontRef idx="minor">
+            <a:schemeClr val="dk1"/>
+          </a:fontRef>
+        </p:style>
+        <p:txBody>
+          <a:bodyPr rtlCol="0" anchor="ctr"/>
+          <a:lstStyle/>
+          <a:p>
+            <a:pPr algn="ctr"/>
+            <a:r>
+              <a:rPr lang="en-US" altLang="zh-CN" dirty="0"/>
+              <a:t>0</a:t>
+            </a:r>
+            <a:endParaRPr lang="zh-CN" altLang="en-US" dirty="0"/>
+          </a:p>
+        </p:txBody>
+      </p:sp>
+      <p:sp>
+        <p:nvSpPr>
+          <p:cNvPr id="24" name="矩形 23"/>
+          <p:cNvSpPr/>
+          <p:nvPr/>
+        </p:nvSpPr>
+        <p:spPr>
+          <a:xfrm>
+            <a:off x="2281356" y="793969"/>
+            <a:ext cx="360000" cy="360000"/>
+          </a:xfrm>
+          <a:prstGeom prst="rect">
+            <a:avLst/>
+          </a:prstGeom>
+        </p:spPr>
+        <p:style>
+          <a:lnRef idx="2">
+            <a:schemeClr val="accent1"/>
+          </a:lnRef>
+          <a:fillRef idx="1">
+            <a:schemeClr val="lt1"/>
+          </a:fillRef>
+          <a:effectRef idx="0">
+            <a:schemeClr val="accent1"/>
+          </a:effectRef>
+          <a:fontRef idx="minor">
+            <a:schemeClr val="dk1"/>
+          </a:fontRef>
+        </p:style>
+        <p:txBody>
+          <a:bodyPr rtlCol="0" anchor="ctr"/>
+          <a:lstStyle/>
+          <a:p>
+            <a:pPr algn="ctr"/>
+            <a:r>
+              <a:rPr lang="en-US" altLang="zh-CN" dirty="0"/>
+              <a:t>0</a:t>
+            </a:r>
+            <a:endParaRPr lang="zh-CN" altLang="en-US" dirty="0"/>
+          </a:p>
+        </p:txBody>
+      </p:sp>
+      <p:sp>
+        <p:nvSpPr>
+          <p:cNvPr id="27" name="矩形 26"/>
+          <p:cNvSpPr/>
+          <p:nvPr/>
+        </p:nvSpPr>
+        <p:spPr>
+          <a:xfrm>
+            <a:off x="2641356" y="435752"/>
+            <a:ext cx="360000" cy="360000"/>
+          </a:xfrm>
+          <a:prstGeom prst="rect">
+            <a:avLst/>
+          </a:prstGeom>
+        </p:spPr>
+        <p:style>
+          <a:lnRef idx="2">
+            <a:schemeClr val="accent1"/>
+          </a:lnRef>
+          <a:fillRef idx="1">
+            <a:schemeClr val="lt1"/>
+          </a:fillRef>
+          <a:effectRef idx="0">
+            <a:schemeClr val="accent1"/>
+          </a:effectRef>
+          <a:fontRef idx="minor">
+            <a:schemeClr val="dk1"/>
+          </a:fontRef>
+        </p:style>
+        <p:txBody>
+          <a:bodyPr rtlCol="0" anchor="ctr"/>
+          <a:lstStyle/>
+          <a:p>
+            <a:pPr algn="ctr"/>
+            <a:r>
+              <a:rPr lang="en-US" altLang="zh-CN" dirty="0"/>
+              <a:t>0</a:t>
+            </a:r>
+            <a:endParaRPr lang="zh-CN" altLang="en-US" dirty="0"/>
+          </a:p>
+        </p:txBody>
+      </p:sp>
+      <p:sp>
+        <p:nvSpPr>
+          <p:cNvPr id="28" name="矩形 27"/>
+          <p:cNvSpPr/>
+          <p:nvPr/>
+        </p:nvSpPr>
+        <p:spPr>
+          <a:xfrm>
+            <a:off x="3001356" y="435752"/>
+            <a:ext cx="360000" cy="360000"/>
+          </a:xfrm>
+          <a:prstGeom prst="rect">
+            <a:avLst/>
+          </a:prstGeom>
+        </p:spPr>
+        <p:style>
+          <a:lnRef idx="2">
+            <a:schemeClr val="accent1"/>
+          </a:lnRef>
+          <a:fillRef idx="1">
+            <a:schemeClr val="lt1"/>
+          </a:fillRef>
+          <a:effectRef idx="0">
+            <a:schemeClr val="accent1"/>
+          </a:effectRef>
+          <a:fontRef idx="minor">
+            <a:schemeClr val="dk1"/>
+          </a:fontRef>
+        </p:style>
+        <p:txBody>
+          <a:bodyPr rtlCol="0" anchor="ctr"/>
+          <a:lstStyle/>
+          <a:p>
+            <a:pPr algn="ctr"/>
+            <a:r>
+              <a:rPr lang="en-US" altLang="zh-CN" dirty="0"/>
+              <a:t>0</a:t>
+            </a:r>
+            <a:endParaRPr lang="zh-CN" altLang="en-US" dirty="0"/>
+          </a:p>
+        </p:txBody>
+      </p:sp>
+      <p:sp>
+        <p:nvSpPr>
+          <p:cNvPr id="29" name="矩形 28"/>
+          <p:cNvSpPr/>
+          <p:nvPr/>
+        </p:nvSpPr>
+        <p:spPr>
+          <a:xfrm>
+            <a:off x="2641356" y="792563"/>
+            <a:ext cx="360000" cy="360000"/>
+          </a:xfrm>
+          <a:prstGeom prst="rect">
+            <a:avLst/>
+          </a:prstGeom>
+        </p:spPr>
+        <p:style>
+          <a:lnRef idx="2">
+            <a:schemeClr val="accent1"/>
+          </a:lnRef>
+          <a:fillRef idx="1">
+            <a:schemeClr val="lt1"/>
+          </a:fillRef>
+          <a:effectRef idx="0">
+            <a:schemeClr val="accent1"/>
+          </a:effectRef>
+          <a:fontRef idx="minor">
+            <a:schemeClr val="dk1"/>
+          </a:fontRef>
+        </p:style>
+        <p:txBody>
+          <a:bodyPr rtlCol="0" anchor="ctr"/>
+          <a:lstStyle/>
+          <a:p>
+            <a:pPr algn="ctr"/>
+            <a:r>
+              <a:rPr lang="en-US" altLang="zh-CN" dirty="0"/>
+              <a:t>0</a:t>
+            </a:r>
+            <a:endParaRPr lang="zh-CN" altLang="en-US" dirty="0"/>
+          </a:p>
+        </p:txBody>
+      </p:sp>
+      <p:sp>
+        <p:nvSpPr>
+          <p:cNvPr id="30" name="矩形 29"/>
+          <p:cNvSpPr/>
+          <p:nvPr/>
+        </p:nvSpPr>
+        <p:spPr>
+          <a:xfrm>
+            <a:off x="3001356" y="792563"/>
+            <a:ext cx="360000" cy="360000"/>
+          </a:xfrm>
+          <a:prstGeom prst="rect">
+            <a:avLst/>
+          </a:prstGeom>
+        </p:spPr>
+        <p:style>
+          <a:lnRef idx="2">
+            <a:schemeClr val="accent1"/>
+          </a:lnRef>
+          <a:fillRef idx="1">
+            <a:schemeClr val="lt1"/>
+          </a:fillRef>
+          <a:effectRef idx="0">
+            <a:schemeClr val="accent1"/>
+          </a:effectRef>
+          <a:fontRef idx="minor">
+            <a:schemeClr val="dk1"/>
+          </a:fontRef>
+        </p:style>
+        <p:txBody>
+          <a:bodyPr rtlCol="0" anchor="ctr"/>
+          <a:lstStyle/>
+          <a:p>
+            <a:pPr algn="ctr"/>
+            <a:r>
+              <a:rPr lang="en-US" altLang="zh-CN" dirty="0"/>
+              <a:t>0</a:t>
+            </a:r>
+            <a:endParaRPr lang="zh-CN" altLang="en-US" dirty="0"/>
+          </a:p>
+        </p:txBody>
+      </p:sp>
+      <p:sp>
+        <p:nvSpPr>
+          <p:cNvPr id="33" name="矩形 32"/>
+          <p:cNvSpPr/>
+          <p:nvPr/>
+        </p:nvSpPr>
+        <p:spPr>
+          <a:xfrm>
+            <a:off x="481356" y="1151155"/>
+            <a:ext cx="360000" cy="360000"/>
+          </a:xfrm>
+          <a:prstGeom prst="rect">
+            <a:avLst/>
+          </a:prstGeom>
+        </p:spPr>
+        <p:style>
+          <a:lnRef idx="2">
+            <a:schemeClr val="accent1"/>
+          </a:lnRef>
+          <a:fillRef idx="1">
+            <a:schemeClr val="lt1"/>
+          </a:fillRef>
+          <a:effectRef idx="0">
+            <a:schemeClr val="accent1"/>
+          </a:effectRef>
+          <a:fontRef idx="minor">
+            <a:schemeClr val="dk1"/>
+          </a:fontRef>
+        </p:style>
+        <p:txBody>
+          <a:bodyPr rtlCol="0" anchor="ctr"/>
+          <a:lstStyle/>
+          <a:p>
+            <a:pPr algn="ctr"/>
+            <a:r>
+              <a:rPr lang="en-US" altLang="zh-CN" dirty="0"/>
+              <a:t>0</a:t>
+            </a:r>
+            <a:endParaRPr lang="zh-CN" altLang="en-US" dirty="0"/>
+          </a:p>
+        </p:txBody>
+      </p:sp>
+      <p:sp>
+        <p:nvSpPr>
+          <p:cNvPr id="34" name="矩形 33"/>
+          <p:cNvSpPr/>
+          <p:nvPr/>
+        </p:nvSpPr>
+        <p:spPr>
+          <a:xfrm>
+            <a:off x="841356" y="1151155"/>
+            <a:ext cx="360000" cy="360000"/>
+          </a:xfrm>
+          <a:prstGeom prst="rect">
+            <a:avLst/>
+          </a:prstGeom>
+        </p:spPr>
+        <p:style>
+          <a:lnRef idx="2">
+            <a:schemeClr val="accent1"/>
+          </a:lnRef>
+          <a:fillRef idx="1">
+            <a:schemeClr val="lt1"/>
+          </a:fillRef>
+          <a:effectRef idx="0">
+            <a:schemeClr val="accent1"/>
+          </a:effectRef>
+          <a:fontRef idx="minor">
+            <a:schemeClr val="dk1"/>
+          </a:fontRef>
+        </p:style>
+        <p:txBody>
+          <a:bodyPr rtlCol="0" anchor="ctr"/>
+          <a:lstStyle/>
+          <a:p>
+            <a:pPr algn="ctr"/>
+            <a:r>
+              <a:rPr lang="en-US" altLang="zh-CN" dirty="0"/>
+              <a:t>0</a:t>
+            </a:r>
+            <a:endParaRPr lang="zh-CN" altLang="en-US" dirty="0"/>
+          </a:p>
+        </p:txBody>
+      </p:sp>
+      <p:sp>
+        <p:nvSpPr>
+          <p:cNvPr id="35" name="矩形 34"/>
+          <p:cNvSpPr/>
+          <p:nvPr/>
+        </p:nvSpPr>
+        <p:spPr>
+          <a:xfrm>
+            <a:off x="1201356" y="1151155"/>
+            <a:ext cx="360000" cy="360000"/>
+          </a:xfrm>
+          <a:prstGeom prst="rect">
+            <a:avLst/>
+          </a:prstGeom>
+          <a:solidFill>
+            <a:srgbClr val="00B0F0"/>
+          </a:solidFill>
+        </p:spPr>
+        <p:style>
+          <a:lnRef idx="2">
+            <a:schemeClr val="accent1"/>
+          </a:lnRef>
+          <a:fillRef idx="1">
+            <a:schemeClr val="lt1"/>
+          </a:fillRef>
+          <a:effectRef idx="0">
+            <a:schemeClr val="accent1"/>
+          </a:effectRef>
+          <a:fontRef idx="minor">
+            <a:schemeClr val="dk1"/>
+          </a:fontRef>
+        </p:style>
+        <p:txBody>
+          <a:bodyPr rtlCol="0" anchor="ctr"/>
+          <a:lstStyle/>
+          <a:p>
+            <a:pPr algn="ctr"/>
+            <a:r>
+              <a:rPr lang="en-US" altLang="zh-CN" dirty="0"/>
+              <a:t>1</a:t>
+            </a:r>
+            <a:endParaRPr lang="zh-CN" altLang="en-US" dirty="0"/>
+          </a:p>
+        </p:txBody>
+      </p:sp>
+      <p:sp>
+        <p:nvSpPr>
+          <p:cNvPr id="36" name="矩形 35"/>
+          <p:cNvSpPr/>
+          <p:nvPr/>
+        </p:nvSpPr>
+        <p:spPr>
+          <a:xfrm>
+            <a:off x="1561356" y="1151155"/>
+            <a:ext cx="360000" cy="360000"/>
+          </a:xfrm>
+          <a:prstGeom prst="rect">
+            <a:avLst/>
+          </a:prstGeom>
+        </p:spPr>
+        <p:style>
+          <a:lnRef idx="2">
+            <a:schemeClr val="accent1"/>
+          </a:lnRef>
+          <a:fillRef idx="1">
+            <a:schemeClr val="lt1"/>
+          </a:fillRef>
+          <a:effectRef idx="0">
+            <a:schemeClr val="accent1"/>
+          </a:effectRef>
+          <a:fontRef idx="minor">
+            <a:schemeClr val="dk1"/>
+          </a:fontRef>
+        </p:style>
+        <p:txBody>
+          <a:bodyPr rtlCol="0" anchor="ctr"/>
+          <a:lstStyle/>
+          <a:p>
+            <a:pPr algn="ctr"/>
+            <a:r>
+              <a:rPr lang="en-US" altLang="zh-CN" dirty="0"/>
+              <a:t>0</a:t>
+            </a:r>
+            <a:endParaRPr lang="zh-CN" altLang="en-US" dirty="0"/>
+          </a:p>
+        </p:txBody>
+      </p:sp>
+      <p:sp>
+        <p:nvSpPr>
+          <p:cNvPr id="37" name="矩形 36"/>
+          <p:cNvSpPr/>
+          <p:nvPr/>
+        </p:nvSpPr>
+        <p:spPr>
+          <a:xfrm>
+            <a:off x="1921356" y="1151155"/>
+            <a:ext cx="360000" cy="360000"/>
+          </a:xfrm>
+          <a:prstGeom prst="rect">
+            <a:avLst/>
+          </a:prstGeom>
+        </p:spPr>
+        <p:style>
+          <a:lnRef idx="2">
+            <a:schemeClr val="accent1"/>
+          </a:lnRef>
+          <a:fillRef idx="1">
+            <a:schemeClr val="lt1"/>
+          </a:fillRef>
+          <a:effectRef idx="0">
+            <a:schemeClr val="accent1"/>
+          </a:effectRef>
+          <a:fontRef idx="minor">
+            <a:schemeClr val="dk1"/>
+          </a:fontRef>
+        </p:style>
+        <p:txBody>
+          <a:bodyPr rtlCol="0" anchor="ctr"/>
+          <a:lstStyle/>
+          <a:p>
+            <a:pPr algn="ctr"/>
+            <a:r>
+              <a:rPr lang="en-US" altLang="zh-CN" dirty="0"/>
+              <a:t>0</a:t>
+            </a:r>
+            <a:endParaRPr lang="zh-CN" altLang="en-US" dirty="0"/>
+          </a:p>
+        </p:txBody>
+      </p:sp>
+      <p:sp>
+        <p:nvSpPr>
+          <p:cNvPr id="38" name="矩形 37"/>
+          <p:cNvSpPr/>
+          <p:nvPr/>
+        </p:nvSpPr>
+        <p:spPr>
+          <a:xfrm>
+            <a:off x="2281356" y="1151155"/>
+            <a:ext cx="360000" cy="360000"/>
+          </a:xfrm>
+          <a:prstGeom prst="rect">
+            <a:avLst/>
+          </a:prstGeom>
+        </p:spPr>
+        <p:style>
+          <a:lnRef idx="2">
+            <a:schemeClr val="accent1"/>
+          </a:lnRef>
+          <a:fillRef idx="1">
+            <a:schemeClr val="lt1"/>
+          </a:fillRef>
+          <a:effectRef idx="0">
+            <a:schemeClr val="accent1"/>
+          </a:effectRef>
+          <a:fontRef idx="minor">
+            <a:schemeClr val="dk1"/>
+          </a:fontRef>
+        </p:style>
+        <p:txBody>
+          <a:bodyPr rtlCol="0" anchor="ctr"/>
+          <a:lstStyle/>
+          <a:p>
+            <a:pPr algn="ctr"/>
+            <a:r>
+              <a:rPr lang="en-US" altLang="zh-CN" dirty="0"/>
+              <a:t>0</a:t>
+            </a:r>
+            <a:endParaRPr lang="zh-CN" altLang="en-US" dirty="0"/>
+          </a:p>
+        </p:txBody>
+      </p:sp>
+      <p:sp>
+        <p:nvSpPr>
+          <p:cNvPr id="45" name="矩形 44"/>
+          <p:cNvSpPr/>
+          <p:nvPr/>
+        </p:nvSpPr>
+        <p:spPr>
+          <a:xfrm>
+            <a:off x="2641356" y="1149748"/>
+            <a:ext cx="360000" cy="360000"/>
+          </a:xfrm>
+          <a:prstGeom prst="rect">
+            <a:avLst/>
+          </a:prstGeom>
+        </p:spPr>
+        <p:style>
+          <a:lnRef idx="2">
+            <a:schemeClr val="accent1"/>
+          </a:lnRef>
+          <a:fillRef idx="1">
+            <a:schemeClr val="lt1"/>
+          </a:fillRef>
+          <a:effectRef idx="0">
+            <a:schemeClr val="accent1"/>
+          </a:effectRef>
+          <a:fontRef idx="minor">
+            <a:schemeClr val="dk1"/>
+          </a:fontRef>
+        </p:style>
+        <p:txBody>
+          <a:bodyPr rtlCol="0" anchor="ctr"/>
+          <a:lstStyle/>
+          <a:p>
+            <a:pPr algn="ctr"/>
+            <a:r>
+              <a:rPr lang="en-US" altLang="zh-CN" dirty="0"/>
+              <a:t>0</a:t>
+            </a:r>
+            <a:endParaRPr lang="zh-CN" altLang="en-US" dirty="0"/>
+          </a:p>
+        </p:txBody>
+      </p:sp>
+      <p:sp>
+        <p:nvSpPr>
+          <p:cNvPr id="46" name="矩形 45"/>
+          <p:cNvSpPr/>
+          <p:nvPr/>
+        </p:nvSpPr>
+        <p:spPr>
+          <a:xfrm>
+            <a:off x="3001356" y="1149748"/>
+            <a:ext cx="360000" cy="360000"/>
+          </a:xfrm>
+          <a:prstGeom prst="rect">
+            <a:avLst/>
+          </a:prstGeom>
+        </p:spPr>
+        <p:style>
+          <a:lnRef idx="2">
+            <a:schemeClr val="accent1"/>
+          </a:lnRef>
+          <a:fillRef idx="1">
+            <a:schemeClr val="lt1"/>
+          </a:fillRef>
+          <a:effectRef idx="0">
+            <a:schemeClr val="accent1"/>
+          </a:effectRef>
+          <a:fontRef idx="minor">
+            <a:schemeClr val="dk1"/>
+          </a:fontRef>
+        </p:style>
+        <p:txBody>
+          <a:bodyPr rtlCol="0" anchor="ctr"/>
+          <a:lstStyle/>
+          <a:p>
+            <a:pPr algn="ctr"/>
+            <a:r>
+              <a:rPr lang="en-US" altLang="zh-CN" dirty="0"/>
+              <a:t>0</a:t>
+            </a:r>
+            <a:endParaRPr lang="zh-CN" altLang="en-US" dirty="0"/>
+          </a:p>
+        </p:txBody>
+      </p:sp>
+      <p:sp>
+        <p:nvSpPr>
+          <p:cNvPr id="65" name="矩形 64"/>
+          <p:cNvSpPr/>
+          <p:nvPr/>
+        </p:nvSpPr>
+        <p:spPr>
+          <a:xfrm>
+            <a:off x="121356" y="789748"/>
+            <a:ext cx="360000" cy="360000"/>
+          </a:xfrm>
+          <a:prstGeom prst="rect">
+            <a:avLst/>
+          </a:prstGeom>
+          <a:ln>
+            <a:noFill/>
+          </a:ln>
+        </p:spPr>
+        <p:style>
+          <a:lnRef idx="2">
+            <a:schemeClr val="accent1"/>
+          </a:lnRef>
+          <a:fillRef idx="1">
+            <a:schemeClr val="lt1"/>
+          </a:fillRef>
+          <a:effectRef idx="0">
+            <a:schemeClr val="accent1"/>
+          </a:effectRef>
+          <a:fontRef idx="minor">
+            <a:schemeClr val="dk1"/>
+          </a:fontRef>
+        </p:style>
+        <p:txBody>
+          <a:bodyPr rtlCol="0" anchor="ctr"/>
+          <a:lstStyle/>
+          <a:p>
+            <a:pPr algn="ctr"/>
+            <a:r>
+              <a:rPr lang="en-US" altLang="zh-CN" dirty="0"/>
+              <a:t>a</a:t>
+            </a:r>
+            <a:endParaRPr lang="zh-CN" altLang="en-US" dirty="0"/>
+          </a:p>
+        </p:txBody>
+      </p:sp>
+      <p:sp>
+        <p:nvSpPr>
+          <p:cNvPr id="66" name="矩形 65"/>
+          <p:cNvSpPr/>
+          <p:nvPr/>
+        </p:nvSpPr>
+        <p:spPr>
+          <a:xfrm>
+            <a:off x="121356" y="1142337"/>
+            <a:ext cx="360000" cy="360000"/>
+          </a:xfrm>
+          <a:prstGeom prst="rect">
+            <a:avLst/>
+          </a:prstGeom>
+          <a:ln>
+            <a:noFill/>
+          </a:ln>
+        </p:spPr>
+        <p:style>
+          <a:lnRef idx="2">
+            <a:schemeClr val="accent1"/>
+          </a:lnRef>
+          <a:fillRef idx="1">
+            <a:schemeClr val="lt1"/>
+          </a:fillRef>
+          <a:effectRef idx="0">
+            <a:schemeClr val="accent1"/>
+          </a:effectRef>
+          <a:fontRef idx="minor">
+            <a:schemeClr val="dk1"/>
+          </a:fontRef>
+        </p:style>
+        <p:txBody>
+          <a:bodyPr rtlCol="0" anchor="ctr"/>
+          <a:lstStyle/>
+          <a:p>
+            <a:pPr algn="ctr"/>
+            <a:r>
+              <a:rPr lang="en-US" altLang="zh-CN" dirty="0"/>
+              <a:t>.</a:t>
+            </a:r>
+            <a:endParaRPr lang="zh-CN" altLang="en-US" dirty="0"/>
+          </a:p>
+        </p:txBody>
+      </p:sp>
+      <p:sp>
+        <p:nvSpPr>
+          <p:cNvPr id="67" name="矩形 66"/>
+          <p:cNvSpPr/>
+          <p:nvPr/>
+        </p:nvSpPr>
+        <p:spPr>
+          <a:xfrm>
+            <a:off x="121356" y="1516783"/>
+            <a:ext cx="360000" cy="360000"/>
+          </a:xfrm>
+          <a:prstGeom prst="rect">
+            <a:avLst/>
+          </a:prstGeom>
+          <a:ln>
+            <a:noFill/>
+          </a:ln>
+        </p:spPr>
+        <p:style>
+          <a:lnRef idx="2">
+            <a:schemeClr val="accent1"/>
+          </a:lnRef>
+          <a:fillRef idx="1">
+            <a:schemeClr val="lt1"/>
+          </a:fillRef>
+          <a:effectRef idx="0">
+            <a:schemeClr val="accent1"/>
+          </a:effectRef>
+          <a:fontRef idx="minor">
+            <a:schemeClr val="dk1"/>
+          </a:fontRef>
+        </p:style>
+        <p:txBody>
+          <a:bodyPr rtlCol="0" anchor="ctr"/>
+          <a:lstStyle/>
+          <a:p>
+            <a:pPr algn="ctr"/>
+            <a:r>
+              <a:rPr lang="en-US" altLang="zh-CN" dirty="0"/>
+              <a:t>*</a:t>
+            </a:r>
+            <a:endParaRPr lang="zh-CN" altLang="en-US" dirty="0"/>
+          </a:p>
+        </p:txBody>
+      </p:sp>
+      <p:sp>
+        <p:nvSpPr>
+          <p:cNvPr id="68" name="矩形 67"/>
+          <p:cNvSpPr/>
+          <p:nvPr/>
+        </p:nvSpPr>
+        <p:spPr>
+          <a:xfrm>
+            <a:off x="121356" y="1869372"/>
+            <a:ext cx="360000" cy="360000"/>
+          </a:xfrm>
+          <a:prstGeom prst="rect">
+            <a:avLst/>
+          </a:prstGeom>
+          <a:ln>
+            <a:noFill/>
+          </a:ln>
+        </p:spPr>
+        <p:style>
+          <a:lnRef idx="2">
+            <a:schemeClr val="accent1"/>
+          </a:lnRef>
+          <a:fillRef idx="1">
+            <a:schemeClr val="lt1"/>
+          </a:fillRef>
+          <a:effectRef idx="0">
+            <a:schemeClr val="accent1"/>
+          </a:effectRef>
+          <a:fontRef idx="minor">
+            <a:schemeClr val="dk1"/>
+          </a:fontRef>
+        </p:style>
+        <p:txBody>
+          <a:bodyPr rtlCol="0" anchor="ctr"/>
+          <a:lstStyle/>
+          <a:p>
+            <a:pPr algn="ctr"/>
+            <a:r>
+              <a:rPr lang="en-US" altLang="zh-CN" dirty="0"/>
+              <a:t>d</a:t>
+            </a:r>
+            <a:endParaRPr lang="zh-CN" altLang="en-US" dirty="0"/>
+          </a:p>
+        </p:txBody>
+      </p:sp>
+      <p:sp>
+        <p:nvSpPr>
+          <p:cNvPr id="69" name="矩形 68"/>
+          <p:cNvSpPr/>
+          <p:nvPr/>
+        </p:nvSpPr>
+        <p:spPr>
+          <a:xfrm>
+            <a:off x="121356" y="2233593"/>
+            <a:ext cx="360000" cy="360000"/>
+          </a:xfrm>
+          <a:prstGeom prst="rect">
+            <a:avLst/>
+          </a:prstGeom>
+          <a:ln>
+            <a:noFill/>
+          </a:ln>
+        </p:spPr>
+        <p:style>
+          <a:lnRef idx="2">
+            <a:schemeClr val="accent1"/>
+          </a:lnRef>
+          <a:fillRef idx="1">
+            <a:schemeClr val="lt1"/>
+          </a:fillRef>
+          <a:effectRef idx="0">
+            <a:schemeClr val="accent1"/>
+          </a:effectRef>
+          <a:fontRef idx="minor">
+            <a:schemeClr val="dk1"/>
+          </a:fontRef>
+        </p:style>
+        <p:txBody>
+          <a:bodyPr rtlCol="0" anchor="ctr"/>
+          <a:lstStyle/>
+          <a:p>
+            <a:pPr algn="ctr"/>
+            <a:r>
+              <a:rPr lang="en-US" altLang="zh-CN" dirty="0"/>
+              <a:t>*</a:t>
+            </a:r>
+            <a:endParaRPr lang="zh-CN" altLang="en-US" dirty="0"/>
+          </a:p>
+        </p:txBody>
+      </p:sp>
+      <p:sp>
+        <p:nvSpPr>
+          <p:cNvPr id="70" name="矩形 69"/>
+          <p:cNvSpPr/>
+          <p:nvPr/>
+        </p:nvSpPr>
+        <p:spPr>
+          <a:xfrm>
+            <a:off x="121356" y="2586183"/>
+            <a:ext cx="360000" cy="360000"/>
+          </a:xfrm>
+          <a:prstGeom prst="rect">
+            <a:avLst/>
+          </a:prstGeom>
+          <a:ln>
+            <a:noFill/>
+          </a:ln>
+        </p:spPr>
+        <p:style>
+          <a:lnRef idx="2">
+            <a:schemeClr val="accent1"/>
+          </a:lnRef>
+          <a:fillRef idx="1">
+            <a:schemeClr val="lt1"/>
+          </a:fillRef>
+          <a:effectRef idx="0">
+            <a:schemeClr val="accent1"/>
+          </a:effectRef>
+          <a:fontRef idx="minor">
+            <a:schemeClr val="dk1"/>
+          </a:fontRef>
+        </p:style>
+        <p:txBody>
+          <a:bodyPr rtlCol="0" anchor="ctr"/>
+          <a:lstStyle/>
+          <a:p>
+            <a:pPr algn="ctr"/>
+            <a:r>
+              <a:rPr lang="en-US" altLang="zh-CN" dirty="0"/>
+              <a:t>g</a:t>
             </a:r>
             <a:endParaRPr lang="zh-CN" altLang="en-US" dirty="0"/>
           </a:p>
@@ -6771,29 +7600,32 @@
           <a:prstGeom prst="rect">
             <a:avLst/>
           </a:prstGeom>
-        </p:spPr>
-        <p:style>
-          <a:lnRef idx="2">
-            <a:schemeClr val="accent1"/>
-          </a:lnRef>
-          <a:fillRef idx="1">
-            <a:schemeClr val="lt1"/>
-          </a:fillRef>
-          <a:effectRef idx="0">
-            <a:schemeClr val="accent1"/>
-          </a:effectRef>
-          <a:fontRef idx="minor">
-            <a:schemeClr val="dk1"/>
-          </a:fontRef>
-        </p:style>
-        <p:txBody>
-          <a:bodyPr rtlCol="0" anchor="ctr"/>
-          <a:lstStyle/>
-          <a:p>
-            <a:pPr algn="ctr"/>
-            <a:r>
-              <a:rPr lang="en-US" altLang="zh-CN" dirty="0"/>
-              <a:t>0</a:t>
+          <a:solidFill>
+            <a:srgbClr val="00B0F0"/>
+          </a:solidFill>
+        </p:spPr>
+        <p:style>
+          <a:lnRef idx="2">
+            <a:schemeClr val="accent1"/>
+          </a:lnRef>
+          <a:fillRef idx="1">
+            <a:schemeClr val="lt1"/>
+          </a:fillRef>
+          <a:effectRef idx="0">
+            <a:schemeClr val="accent1"/>
+          </a:effectRef>
+          <a:fontRef idx="minor">
+            <a:schemeClr val="dk1"/>
+          </a:fontRef>
+        </p:style>
+        <p:txBody>
+          <a:bodyPr rtlCol="0" anchor="ctr"/>
+          <a:lstStyle/>
+          <a:p>
+            <a:pPr algn="ctr"/>
+            <a:r>
+              <a:rPr lang="en-US" altLang="zh-CN" dirty="0"/>
+              <a:t>1</a:t>
             </a:r>
             <a:endParaRPr lang="zh-CN" altLang="en-US" dirty="0"/>
           </a:p>
@@ -6813,29 +7645,32 @@
           <a:prstGeom prst="rect">
             <a:avLst/>
           </a:prstGeom>
-        </p:spPr>
-        <p:style>
-          <a:lnRef idx="2">
-            <a:schemeClr val="accent1"/>
-          </a:lnRef>
-          <a:fillRef idx="1">
-            <a:schemeClr val="lt1"/>
-          </a:fillRef>
-          <a:effectRef idx="0">
-            <a:schemeClr val="accent1"/>
-          </a:effectRef>
-          <a:fontRef idx="minor">
-            <a:schemeClr val="dk1"/>
-          </a:fontRef>
-        </p:style>
-        <p:txBody>
-          <a:bodyPr rtlCol="0" anchor="ctr"/>
-          <a:lstStyle/>
-          <a:p>
-            <a:pPr algn="ctr"/>
-            <a:r>
-              <a:rPr lang="en-US" altLang="zh-CN" dirty="0"/>
-              <a:t>0</a:t>
+          <a:solidFill>
+            <a:srgbClr val="00B0F0"/>
+          </a:solidFill>
+        </p:spPr>
+        <p:style>
+          <a:lnRef idx="2">
+            <a:schemeClr val="accent1"/>
+          </a:lnRef>
+          <a:fillRef idx="1">
+            <a:schemeClr val="lt1"/>
+          </a:fillRef>
+          <a:effectRef idx="0">
+            <a:schemeClr val="accent1"/>
+          </a:effectRef>
+          <a:fontRef idx="minor">
+            <a:schemeClr val="dk1"/>
+          </a:fontRef>
+        </p:style>
+        <p:txBody>
+          <a:bodyPr rtlCol="0" anchor="ctr"/>
+          <a:lstStyle/>
+          <a:p>
+            <a:pPr algn="ctr"/>
+            <a:r>
+              <a:rPr lang="en-US" altLang="zh-CN" dirty="0" smtClean="0"/>
+              <a:t>1</a:t>
             </a:r>
             <a:endParaRPr lang="zh-CN" altLang="en-US" dirty="0"/>
           </a:p>
@@ -6855,38 +7690,1478 @@
           <a:prstGeom prst="rect">
             <a:avLst/>
           </a:prstGeom>
-        </p:spPr>
-        <p:style>
-          <a:lnRef idx="2">
-            <a:schemeClr val="accent1"/>
-          </a:lnRef>
-          <a:fillRef idx="1">
-            <a:schemeClr val="lt1"/>
-          </a:fillRef>
-          <a:effectRef idx="0">
-            <a:schemeClr val="accent1"/>
-          </a:effectRef>
-          <a:fontRef idx="minor">
-            <a:schemeClr val="dk1"/>
-          </a:fontRef>
-        </p:style>
-        <p:txBody>
-          <a:bodyPr rtlCol="0" anchor="ctr"/>
-          <a:lstStyle/>
-          <a:p>
-            <a:pPr algn="ctr"/>
-            <a:r>
-              <a:rPr lang="en-US" altLang="zh-CN" dirty="0"/>
-              <a:t>0</a:t>
-            </a:r>
-            <a:endParaRPr lang="zh-CN" altLang="en-US" dirty="0"/>
-          </a:p>
-        </p:txBody>
-      </p:sp>
+          <a:solidFill>
+            <a:srgbClr val="00B0F0"/>
+          </a:solidFill>
+        </p:spPr>
+        <p:style>
+          <a:lnRef idx="2">
+            <a:schemeClr val="accent1"/>
+          </a:lnRef>
+          <a:fillRef idx="1">
+            <a:schemeClr val="lt1"/>
+          </a:fillRef>
+          <a:effectRef idx="0">
+            <a:schemeClr val="accent1"/>
+          </a:effectRef>
+          <a:fontRef idx="minor">
+            <a:schemeClr val="dk1"/>
+          </a:fontRef>
+        </p:style>
+        <p:txBody>
+          <a:bodyPr rtlCol="0" anchor="ctr"/>
+          <a:lstStyle/>
+          <a:p>
+            <a:pPr algn="ctr"/>
+            <a:r>
+              <a:rPr lang="en-US" altLang="zh-CN" dirty="0"/>
+              <a:t>1</a:t>
+            </a:r>
+            <a:endParaRPr lang="zh-CN" altLang="en-US" dirty="0"/>
+          </a:p>
+        </p:txBody>
+      </p:sp>
+      <p:sp>
+        <p:nvSpPr>
+          <p:cNvPr id="83" name="矩形 82"/>
+          <p:cNvSpPr/>
+          <p:nvPr/>
+        </p:nvSpPr>
+        <p:spPr>
+          <a:xfrm>
+            <a:off x="1921356" y="1516715"/>
+            <a:ext cx="360000" cy="360000"/>
+          </a:xfrm>
+          <a:prstGeom prst="rect">
+            <a:avLst/>
+          </a:prstGeom>
+          <a:solidFill>
+            <a:srgbClr val="00B0F0"/>
+          </a:solidFill>
+        </p:spPr>
+        <p:style>
+          <a:lnRef idx="2">
+            <a:schemeClr val="accent1"/>
+          </a:lnRef>
+          <a:fillRef idx="1">
+            <a:schemeClr val="lt1"/>
+          </a:fillRef>
+          <a:effectRef idx="0">
+            <a:schemeClr val="accent1"/>
+          </a:effectRef>
+          <a:fontRef idx="minor">
+            <a:schemeClr val="dk1"/>
+          </a:fontRef>
+        </p:style>
+        <p:txBody>
+          <a:bodyPr rtlCol="0" anchor="ctr"/>
+          <a:lstStyle/>
+          <a:p>
+            <a:pPr algn="ctr"/>
+            <a:r>
+              <a:rPr lang="en-US" altLang="zh-CN" dirty="0"/>
+              <a:t>1</a:t>
+            </a:r>
+            <a:endParaRPr lang="zh-CN" altLang="en-US" dirty="0"/>
+          </a:p>
+        </p:txBody>
+      </p:sp>
+      <p:sp>
+        <p:nvSpPr>
+          <p:cNvPr id="84" name="矩形 83"/>
+          <p:cNvSpPr/>
+          <p:nvPr/>
+        </p:nvSpPr>
+        <p:spPr>
+          <a:xfrm>
+            <a:off x="2281356" y="1516715"/>
+            <a:ext cx="360000" cy="360000"/>
+          </a:xfrm>
+          <a:prstGeom prst="rect">
+            <a:avLst/>
+          </a:prstGeom>
+          <a:solidFill>
+            <a:srgbClr val="00B0F0"/>
+          </a:solidFill>
+        </p:spPr>
+        <p:style>
+          <a:lnRef idx="2">
+            <a:schemeClr val="accent1"/>
+          </a:lnRef>
+          <a:fillRef idx="1">
+            <a:schemeClr val="lt1"/>
+          </a:fillRef>
+          <a:effectRef idx="0">
+            <a:schemeClr val="accent1"/>
+          </a:effectRef>
+          <a:fontRef idx="minor">
+            <a:schemeClr val="dk1"/>
+          </a:fontRef>
+        </p:style>
+        <p:txBody>
+          <a:bodyPr rtlCol="0" anchor="ctr"/>
+          <a:lstStyle/>
+          <a:p>
+            <a:pPr algn="ctr"/>
+            <a:r>
+              <a:rPr lang="en-US" altLang="zh-CN" dirty="0" smtClean="0"/>
+              <a:t>1</a:t>
+            </a:r>
+            <a:endParaRPr lang="zh-CN" altLang="en-US" dirty="0"/>
+          </a:p>
+        </p:txBody>
+      </p:sp>
+      <p:sp>
+        <p:nvSpPr>
+          <p:cNvPr id="85" name="矩形 84"/>
+          <p:cNvSpPr/>
+          <p:nvPr/>
+        </p:nvSpPr>
+        <p:spPr>
+          <a:xfrm>
+            <a:off x="2641356" y="1515308"/>
+            <a:ext cx="360000" cy="360000"/>
+          </a:xfrm>
+          <a:prstGeom prst="rect">
+            <a:avLst/>
+          </a:prstGeom>
+          <a:solidFill>
+            <a:srgbClr val="00B0F0"/>
+          </a:solidFill>
+        </p:spPr>
+        <p:style>
+          <a:lnRef idx="2">
+            <a:schemeClr val="accent1"/>
+          </a:lnRef>
+          <a:fillRef idx="1">
+            <a:schemeClr val="lt1"/>
+          </a:fillRef>
+          <a:effectRef idx="0">
+            <a:schemeClr val="accent1"/>
+          </a:effectRef>
+          <a:fontRef idx="minor">
+            <a:schemeClr val="dk1"/>
+          </a:fontRef>
+        </p:style>
+        <p:txBody>
+          <a:bodyPr rtlCol="0" anchor="ctr"/>
+          <a:lstStyle/>
+          <a:p>
+            <a:pPr algn="ctr"/>
+            <a:r>
+              <a:rPr lang="en-US" altLang="zh-CN" dirty="0" smtClean="0"/>
+              <a:t>1</a:t>
+            </a:r>
+            <a:endParaRPr lang="zh-CN" altLang="en-US" dirty="0"/>
+          </a:p>
+        </p:txBody>
+      </p:sp>
+      <p:sp>
+        <p:nvSpPr>
+          <p:cNvPr id="86" name="矩形 85"/>
+          <p:cNvSpPr/>
+          <p:nvPr/>
+        </p:nvSpPr>
+        <p:spPr>
+          <a:xfrm>
+            <a:off x="3001356" y="1515308"/>
+            <a:ext cx="360000" cy="360000"/>
+          </a:xfrm>
+          <a:prstGeom prst="rect">
+            <a:avLst/>
+          </a:prstGeom>
+          <a:solidFill>
+            <a:srgbClr val="00B0F0"/>
+          </a:solidFill>
+        </p:spPr>
+        <p:style>
+          <a:lnRef idx="2">
+            <a:schemeClr val="accent1"/>
+          </a:lnRef>
+          <a:fillRef idx="1">
+            <a:schemeClr val="lt1"/>
+          </a:fillRef>
+          <a:effectRef idx="0">
+            <a:schemeClr val="accent1"/>
+          </a:effectRef>
+          <a:fontRef idx="minor">
+            <a:schemeClr val="dk1"/>
+          </a:fontRef>
+        </p:style>
+        <p:txBody>
+          <a:bodyPr rtlCol="0" anchor="ctr"/>
+          <a:lstStyle/>
+          <a:p>
+            <a:pPr algn="ctr"/>
+            <a:r>
+              <a:rPr lang="en-US" altLang="zh-CN" dirty="0"/>
+              <a:t>1</a:t>
+            </a:r>
+            <a:endParaRPr lang="zh-CN" altLang="en-US" dirty="0"/>
+          </a:p>
+        </p:txBody>
+      </p:sp>
+      <p:sp>
+        <p:nvSpPr>
+          <p:cNvPr id="87" name="矩形 86"/>
+          <p:cNvSpPr/>
+          <p:nvPr/>
+        </p:nvSpPr>
+        <p:spPr>
+          <a:xfrm>
+            <a:off x="481356" y="1873901"/>
+            <a:ext cx="360000" cy="360000"/>
+          </a:xfrm>
+          <a:prstGeom prst="rect">
+            <a:avLst/>
+          </a:prstGeom>
+        </p:spPr>
+        <p:style>
+          <a:lnRef idx="2">
+            <a:schemeClr val="accent1"/>
+          </a:lnRef>
+          <a:fillRef idx="1">
+            <a:schemeClr val="lt1"/>
+          </a:fillRef>
+          <a:effectRef idx="0">
+            <a:schemeClr val="accent1"/>
+          </a:effectRef>
+          <a:fontRef idx="minor">
+            <a:schemeClr val="dk1"/>
+          </a:fontRef>
+        </p:style>
+        <p:txBody>
+          <a:bodyPr rtlCol="0" anchor="ctr"/>
+          <a:lstStyle/>
+          <a:p>
+            <a:pPr algn="ctr"/>
+            <a:r>
+              <a:rPr lang="en-US" altLang="zh-CN" dirty="0"/>
+              <a:t>0</a:t>
+            </a:r>
+            <a:endParaRPr lang="zh-CN" altLang="en-US" dirty="0"/>
+          </a:p>
+        </p:txBody>
+      </p:sp>
+      <p:sp>
+        <p:nvSpPr>
+          <p:cNvPr id="88" name="矩形 87"/>
+          <p:cNvSpPr/>
+          <p:nvPr/>
+        </p:nvSpPr>
+        <p:spPr>
+          <a:xfrm>
+            <a:off x="841356" y="1873901"/>
+            <a:ext cx="360000" cy="360000"/>
+          </a:xfrm>
+          <a:prstGeom prst="rect">
+            <a:avLst/>
+          </a:prstGeom>
+        </p:spPr>
+        <p:style>
+          <a:lnRef idx="2">
+            <a:schemeClr val="accent1"/>
+          </a:lnRef>
+          <a:fillRef idx="1">
+            <a:schemeClr val="lt1"/>
+          </a:fillRef>
+          <a:effectRef idx="0">
+            <a:schemeClr val="accent1"/>
+          </a:effectRef>
+          <a:fontRef idx="minor">
+            <a:schemeClr val="dk1"/>
+          </a:fontRef>
+        </p:style>
+        <p:txBody>
+          <a:bodyPr rtlCol="0" anchor="ctr"/>
+          <a:lstStyle/>
+          <a:p>
+            <a:pPr algn="ctr"/>
+            <a:r>
+              <a:rPr lang="en-US" altLang="zh-CN" dirty="0"/>
+              <a:t>0</a:t>
+            </a:r>
+            <a:endParaRPr lang="zh-CN" altLang="en-US" dirty="0"/>
+          </a:p>
+        </p:txBody>
+      </p:sp>
+      <p:sp>
+        <p:nvSpPr>
+          <p:cNvPr id="89" name="矩形 88"/>
+          <p:cNvSpPr/>
+          <p:nvPr/>
+        </p:nvSpPr>
+        <p:spPr>
+          <a:xfrm>
+            <a:off x="1201356" y="1873901"/>
+            <a:ext cx="360000" cy="360000"/>
+          </a:xfrm>
+          <a:prstGeom prst="rect">
+            <a:avLst/>
+          </a:prstGeom>
+        </p:spPr>
+        <p:style>
+          <a:lnRef idx="2">
+            <a:schemeClr val="accent1"/>
+          </a:lnRef>
+          <a:fillRef idx="1">
+            <a:schemeClr val="lt1"/>
+          </a:fillRef>
+          <a:effectRef idx="0">
+            <a:schemeClr val="accent1"/>
+          </a:effectRef>
+          <a:fontRef idx="minor">
+            <a:schemeClr val="dk1"/>
+          </a:fontRef>
+        </p:style>
+        <p:txBody>
+          <a:bodyPr rtlCol="0" anchor="ctr"/>
+          <a:lstStyle/>
+          <a:p>
+            <a:pPr algn="ctr"/>
+            <a:r>
+              <a:rPr lang="en-US" altLang="zh-CN" dirty="0"/>
+              <a:t>0</a:t>
+            </a:r>
+            <a:endParaRPr lang="zh-CN" altLang="en-US" dirty="0"/>
+          </a:p>
+        </p:txBody>
+      </p:sp>
+      <p:sp>
+        <p:nvSpPr>
+          <p:cNvPr id="90" name="矩形 89"/>
+          <p:cNvSpPr/>
+          <p:nvPr/>
+        </p:nvSpPr>
+        <p:spPr>
+          <a:xfrm>
+            <a:off x="1561356" y="1873901"/>
+            <a:ext cx="360000" cy="360000"/>
+          </a:xfrm>
+          <a:prstGeom prst="rect">
+            <a:avLst/>
+          </a:prstGeom>
+        </p:spPr>
+        <p:style>
+          <a:lnRef idx="2">
+            <a:schemeClr val="accent1"/>
+          </a:lnRef>
+          <a:fillRef idx="1">
+            <a:schemeClr val="lt1"/>
+          </a:fillRef>
+          <a:effectRef idx="0">
+            <a:schemeClr val="accent1"/>
+          </a:effectRef>
+          <a:fontRef idx="minor">
+            <a:schemeClr val="dk1"/>
+          </a:fontRef>
+        </p:style>
+        <p:txBody>
+          <a:bodyPr rtlCol="0" anchor="ctr"/>
+          <a:lstStyle/>
+          <a:p>
+            <a:pPr algn="ctr"/>
+            <a:r>
+              <a:rPr lang="en-US" altLang="zh-CN" dirty="0"/>
+              <a:t>0</a:t>
+            </a:r>
+            <a:endParaRPr lang="zh-CN" altLang="en-US" dirty="0"/>
+          </a:p>
+        </p:txBody>
+      </p:sp>
+      <p:sp>
+        <p:nvSpPr>
+          <p:cNvPr id="91" name="矩形 90"/>
+          <p:cNvSpPr/>
+          <p:nvPr/>
+        </p:nvSpPr>
+        <p:spPr>
+          <a:xfrm>
+            <a:off x="1921356" y="1873901"/>
+            <a:ext cx="360000" cy="360000"/>
+          </a:xfrm>
+          <a:prstGeom prst="rect">
+            <a:avLst/>
+          </a:prstGeom>
+          <a:solidFill>
+            <a:srgbClr val="00B0F0"/>
+          </a:solidFill>
+        </p:spPr>
+        <p:style>
+          <a:lnRef idx="2">
+            <a:schemeClr val="accent1"/>
+          </a:lnRef>
+          <a:fillRef idx="1">
+            <a:schemeClr val="lt1"/>
+          </a:fillRef>
+          <a:effectRef idx="0">
+            <a:schemeClr val="accent1"/>
+          </a:effectRef>
+          <a:fontRef idx="minor">
+            <a:schemeClr val="dk1"/>
+          </a:fontRef>
+        </p:style>
+        <p:txBody>
+          <a:bodyPr rtlCol="0" anchor="ctr"/>
+          <a:lstStyle/>
+          <a:p>
+            <a:pPr algn="ctr"/>
+            <a:r>
+              <a:rPr lang="en-US" altLang="zh-CN" dirty="0"/>
+              <a:t>1</a:t>
+            </a:r>
+            <a:endParaRPr lang="zh-CN" altLang="en-US" dirty="0"/>
+          </a:p>
+        </p:txBody>
+      </p:sp>
+      <p:sp>
+        <p:nvSpPr>
+          <p:cNvPr id="92" name="矩形 91"/>
+          <p:cNvSpPr/>
+          <p:nvPr/>
+        </p:nvSpPr>
+        <p:spPr>
+          <a:xfrm>
+            <a:off x="2281356" y="1873901"/>
+            <a:ext cx="360000" cy="360000"/>
+          </a:xfrm>
+          <a:prstGeom prst="rect">
+            <a:avLst/>
+          </a:prstGeom>
+          <a:solidFill>
+            <a:srgbClr val="00B0F0"/>
+          </a:solidFill>
+        </p:spPr>
+        <p:style>
+          <a:lnRef idx="2">
+            <a:schemeClr val="accent1"/>
+          </a:lnRef>
+          <a:fillRef idx="1">
+            <a:schemeClr val="lt1"/>
+          </a:fillRef>
+          <a:effectRef idx="0">
+            <a:schemeClr val="accent1"/>
+          </a:effectRef>
+          <a:fontRef idx="minor">
+            <a:schemeClr val="dk1"/>
+          </a:fontRef>
+        </p:style>
+        <p:txBody>
+          <a:bodyPr rtlCol="0" anchor="ctr"/>
+          <a:lstStyle/>
+          <a:p>
+            <a:pPr algn="ctr"/>
+            <a:r>
+              <a:rPr lang="en-US" altLang="zh-CN" dirty="0"/>
+              <a:t>1</a:t>
+            </a:r>
+            <a:endParaRPr lang="zh-CN" altLang="en-US" dirty="0"/>
+          </a:p>
+        </p:txBody>
+      </p:sp>
+      <p:sp>
+        <p:nvSpPr>
+          <p:cNvPr id="93" name="矩形 92"/>
+          <p:cNvSpPr/>
+          <p:nvPr/>
+        </p:nvSpPr>
+        <p:spPr>
+          <a:xfrm>
+            <a:off x="2641356" y="1872495"/>
+            <a:ext cx="360000" cy="360000"/>
+          </a:xfrm>
+          <a:prstGeom prst="rect">
+            <a:avLst/>
+          </a:prstGeom>
+          <a:solidFill>
+            <a:srgbClr val="00B0F0"/>
+          </a:solidFill>
+        </p:spPr>
+        <p:style>
+          <a:lnRef idx="2">
+            <a:schemeClr val="accent1"/>
+          </a:lnRef>
+          <a:fillRef idx="1">
+            <a:schemeClr val="lt1"/>
+          </a:fillRef>
+          <a:effectRef idx="0">
+            <a:schemeClr val="accent1"/>
+          </a:effectRef>
+          <a:fontRef idx="minor">
+            <a:schemeClr val="dk1"/>
+          </a:fontRef>
+        </p:style>
+        <p:txBody>
+          <a:bodyPr rtlCol="0" anchor="ctr"/>
+          <a:lstStyle/>
+          <a:p>
+            <a:pPr algn="ctr"/>
+            <a:r>
+              <a:rPr lang="en-US" altLang="zh-CN" dirty="0" smtClean="0"/>
+              <a:t>1</a:t>
+            </a:r>
+            <a:endParaRPr lang="zh-CN" altLang="en-US" dirty="0"/>
+          </a:p>
+        </p:txBody>
+      </p:sp>
+      <p:sp>
+        <p:nvSpPr>
+          <p:cNvPr id="94" name="矩形 93"/>
+          <p:cNvSpPr/>
+          <p:nvPr/>
+        </p:nvSpPr>
+        <p:spPr>
+          <a:xfrm>
+            <a:off x="3001356" y="1872495"/>
+            <a:ext cx="360000" cy="360000"/>
+          </a:xfrm>
+          <a:prstGeom prst="rect">
+            <a:avLst/>
+          </a:prstGeom>
+        </p:spPr>
+        <p:style>
+          <a:lnRef idx="2">
+            <a:schemeClr val="accent1"/>
+          </a:lnRef>
+          <a:fillRef idx="1">
+            <a:schemeClr val="lt1"/>
+          </a:fillRef>
+          <a:effectRef idx="0">
+            <a:schemeClr val="accent1"/>
+          </a:effectRef>
+          <a:fontRef idx="minor">
+            <a:schemeClr val="dk1"/>
+          </a:fontRef>
+        </p:style>
+        <p:txBody>
+          <a:bodyPr rtlCol="0" anchor="ctr"/>
+          <a:lstStyle/>
+          <a:p>
+            <a:pPr algn="ctr"/>
+            <a:r>
+              <a:rPr lang="en-US" altLang="zh-CN" dirty="0"/>
+              <a:t>0</a:t>
+            </a:r>
+            <a:endParaRPr lang="zh-CN" altLang="en-US" dirty="0"/>
+          </a:p>
+        </p:txBody>
+      </p:sp>
+      <p:sp>
+        <p:nvSpPr>
+          <p:cNvPr id="95" name="矩形 94"/>
+          <p:cNvSpPr/>
+          <p:nvPr/>
+        </p:nvSpPr>
+        <p:spPr>
+          <a:xfrm>
+            <a:off x="481356" y="2237815"/>
+            <a:ext cx="360000" cy="360000"/>
+          </a:xfrm>
+          <a:prstGeom prst="rect">
+            <a:avLst/>
+          </a:prstGeom>
+        </p:spPr>
+        <p:style>
+          <a:lnRef idx="2">
+            <a:schemeClr val="accent1"/>
+          </a:lnRef>
+          <a:fillRef idx="1">
+            <a:schemeClr val="lt1"/>
+          </a:fillRef>
+          <a:effectRef idx="0">
+            <a:schemeClr val="accent1"/>
+          </a:effectRef>
+          <a:fontRef idx="minor">
+            <a:schemeClr val="dk1"/>
+          </a:fontRef>
+        </p:style>
+        <p:txBody>
+          <a:bodyPr rtlCol="0" anchor="ctr"/>
+          <a:lstStyle/>
+          <a:p>
+            <a:pPr algn="ctr"/>
+            <a:r>
+              <a:rPr lang="en-US" altLang="zh-CN" dirty="0"/>
+              <a:t>0</a:t>
+            </a:r>
+            <a:endParaRPr lang="zh-CN" altLang="en-US" dirty="0"/>
+          </a:p>
+        </p:txBody>
+      </p:sp>
+      <p:sp>
+        <p:nvSpPr>
+          <p:cNvPr id="96" name="矩形 95"/>
+          <p:cNvSpPr/>
+          <p:nvPr/>
+        </p:nvSpPr>
+        <p:spPr>
+          <a:xfrm>
+            <a:off x="841356" y="2237815"/>
+            <a:ext cx="360000" cy="360000"/>
+          </a:xfrm>
+          <a:prstGeom prst="rect">
+            <a:avLst/>
+          </a:prstGeom>
+          <a:solidFill>
+            <a:srgbClr val="00B0F0"/>
+          </a:solidFill>
+        </p:spPr>
+        <p:style>
+          <a:lnRef idx="2">
+            <a:schemeClr val="accent1"/>
+          </a:lnRef>
+          <a:fillRef idx="1">
+            <a:schemeClr val="lt1"/>
+          </a:fillRef>
+          <a:effectRef idx="0">
+            <a:schemeClr val="accent1"/>
+          </a:effectRef>
+          <a:fontRef idx="minor">
+            <a:schemeClr val="dk1"/>
+          </a:fontRef>
+        </p:style>
+        <p:txBody>
+          <a:bodyPr rtlCol="0" anchor="ctr"/>
+          <a:lstStyle/>
+          <a:p>
+            <a:pPr algn="ctr"/>
+            <a:r>
+              <a:rPr lang="en-US" altLang="zh-CN" dirty="0"/>
+              <a:t>1</a:t>
+            </a:r>
+            <a:endParaRPr lang="zh-CN" altLang="en-US" dirty="0"/>
+          </a:p>
+        </p:txBody>
+      </p:sp>
+      <p:sp>
+        <p:nvSpPr>
+          <p:cNvPr id="97" name="矩形 96"/>
+          <p:cNvSpPr/>
+          <p:nvPr/>
+        </p:nvSpPr>
+        <p:spPr>
+          <a:xfrm>
+            <a:off x="1201356" y="2237815"/>
+            <a:ext cx="360000" cy="360000"/>
+          </a:xfrm>
+          <a:prstGeom prst="rect">
+            <a:avLst/>
+          </a:prstGeom>
+          <a:solidFill>
+            <a:srgbClr val="00B0F0"/>
+          </a:solidFill>
+        </p:spPr>
+        <p:style>
+          <a:lnRef idx="2">
+            <a:schemeClr val="accent1"/>
+          </a:lnRef>
+          <a:fillRef idx="1">
+            <a:schemeClr val="lt1"/>
+          </a:fillRef>
+          <a:effectRef idx="0">
+            <a:schemeClr val="accent1"/>
+          </a:effectRef>
+          <a:fontRef idx="minor">
+            <a:schemeClr val="dk1"/>
+          </a:fontRef>
+        </p:style>
+        <p:txBody>
+          <a:bodyPr rtlCol="0" anchor="ctr"/>
+          <a:lstStyle/>
+          <a:p>
+            <a:pPr algn="ctr"/>
+            <a:r>
+              <a:rPr lang="en-US" altLang="zh-CN" dirty="0" smtClean="0"/>
+              <a:t>1</a:t>
+            </a:r>
+            <a:endParaRPr lang="zh-CN" altLang="en-US" dirty="0"/>
+          </a:p>
+        </p:txBody>
+      </p:sp>
+      <p:sp>
+        <p:nvSpPr>
+          <p:cNvPr id="98" name="矩形 97"/>
+          <p:cNvSpPr/>
+          <p:nvPr/>
+        </p:nvSpPr>
+        <p:spPr>
+          <a:xfrm>
+            <a:off x="1561356" y="2237815"/>
+            <a:ext cx="360000" cy="360000"/>
+          </a:xfrm>
+          <a:prstGeom prst="rect">
+            <a:avLst/>
+          </a:prstGeom>
+          <a:solidFill>
+            <a:srgbClr val="00B0F0"/>
+          </a:solidFill>
+        </p:spPr>
+        <p:style>
+          <a:lnRef idx="2">
+            <a:schemeClr val="accent1"/>
+          </a:lnRef>
+          <a:fillRef idx="1">
+            <a:schemeClr val="lt1"/>
+          </a:fillRef>
+          <a:effectRef idx="0">
+            <a:schemeClr val="accent1"/>
+          </a:effectRef>
+          <a:fontRef idx="minor">
+            <a:schemeClr val="dk1"/>
+          </a:fontRef>
+        </p:style>
+        <p:txBody>
+          <a:bodyPr rtlCol="0" anchor="ctr"/>
+          <a:lstStyle/>
+          <a:p>
+            <a:pPr algn="ctr"/>
+            <a:r>
+              <a:rPr lang="en-US" altLang="zh-CN" dirty="0"/>
+              <a:t>1</a:t>
+            </a:r>
+            <a:endParaRPr lang="zh-CN" altLang="en-US" dirty="0"/>
+          </a:p>
+        </p:txBody>
+      </p:sp>
+      <p:sp>
+        <p:nvSpPr>
+          <p:cNvPr id="99" name="矩形 98"/>
+          <p:cNvSpPr/>
+          <p:nvPr/>
+        </p:nvSpPr>
+        <p:spPr>
+          <a:xfrm>
+            <a:off x="1921356" y="2237815"/>
+            <a:ext cx="360000" cy="360000"/>
+          </a:xfrm>
+          <a:prstGeom prst="rect">
+            <a:avLst/>
+          </a:prstGeom>
+          <a:solidFill>
+            <a:srgbClr val="00B0F0"/>
+          </a:solidFill>
+        </p:spPr>
+        <p:style>
+          <a:lnRef idx="2">
+            <a:schemeClr val="accent1"/>
+          </a:lnRef>
+          <a:fillRef idx="1">
+            <a:schemeClr val="lt1"/>
+          </a:fillRef>
+          <a:effectRef idx="0">
+            <a:schemeClr val="accent1"/>
+          </a:effectRef>
+          <a:fontRef idx="minor">
+            <a:schemeClr val="dk1"/>
+          </a:fontRef>
+        </p:style>
+        <p:txBody>
+          <a:bodyPr rtlCol="0" anchor="ctr"/>
+          <a:lstStyle/>
+          <a:p>
+            <a:pPr algn="ctr"/>
+            <a:r>
+              <a:rPr lang="en-US" altLang="zh-CN" dirty="0"/>
+              <a:t>1</a:t>
+            </a:r>
+            <a:endParaRPr lang="zh-CN" altLang="en-US" dirty="0"/>
+          </a:p>
+        </p:txBody>
+      </p:sp>
+      <p:sp>
+        <p:nvSpPr>
+          <p:cNvPr id="100" name="矩形 99"/>
+          <p:cNvSpPr/>
+          <p:nvPr/>
+        </p:nvSpPr>
+        <p:spPr>
+          <a:xfrm>
+            <a:off x="2281356" y="2237815"/>
+            <a:ext cx="360000" cy="360000"/>
+          </a:xfrm>
+          <a:prstGeom prst="rect">
+            <a:avLst/>
+          </a:prstGeom>
+          <a:solidFill>
+            <a:srgbClr val="00B0F0"/>
+          </a:solidFill>
+        </p:spPr>
+        <p:style>
+          <a:lnRef idx="2">
+            <a:schemeClr val="accent1"/>
+          </a:lnRef>
+          <a:fillRef idx="1">
+            <a:schemeClr val="lt1"/>
+          </a:fillRef>
+          <a:effectRef idx="0">
+            <a:schemeClr val="accent1"/>
+          </a:effectRef>
+          <a:fontRef idx="minor">
+            <a:schemeClr val="dk1"/>
+          </a:fontRef>
+        </p:style>
+        <p:txBody>
+          <a:bodyPr rtlCol="0" anchor="ctr"/>
+          <a:lstStyle/>
+          <a:p>
+            <a:pPr algn="ctr"/>
+            <a:r>
+              <a:rPr lang="en-US" altLang="zh-CN" dirty="0" smtClean="0"/>
+              <a:t>1</a:t>
+            </a:r>
+            <a:endParaRPr lang="zh-CN" altLang="en-US" dirty="0"/>
+          </a:p>
+        </p:txBody>
+      </p:sp>
+      <p:sp>
+        <p:nvSpPr>
+          <p:cNvPr id="101" name="矩形 100"/>
+          <p:cNvSpPr/>
+          <p:nvPr/>
+        </p:nvSpPr>
+        <p:spPr>
+          <a:xfrm>
+            <a:off x="2641356" y="2236407"/>
+            <a:ext cx="360000" cy="360000"/>
+          </a:xfrm>
+          <a:prstGeom prst="rect">
+            <a:avLst/>
+          </a:prstGeom>
+          <a:solidFill>
+            <a:srgbClr val="00B0F0"/>
+          </a:solidFill>
+        </p:spPr>
+        <p:style>
+          <a:lnRef idx="2">
+            <a:schemeClr val="accent1"/>
+          </a:lnRef>
+          <a:fillRef idx="1">
+            <a:schemeClr val="lt1"/>
+          </a:fillRef>
+          <a:effectRef idx="0">
+            <a:schemeClr val="accent1"/>
+          </a:effectRef>
+          <a:fontRef idx="minor">
+            <a:schemeClr val="dk1"/>
+          </a:fontRef>
+        </p:style>
+        <p:txBody>
+          <a:bodyPr rtlCol="0" anchor="ctr"/>
+          <a:lstStyle/>
+          <a:p>
+            <a:pPr algn="ctr"/>
+            <a:r>
+              <a:rPr lang="en-US" altLang="zh-CN" dirty="0"/>
+              <a:t>1</a:t>
+            </a:r>
+            <a:endParaRPr lang="zh-CN" altLang="en-US" dirty="0"/>
+          </a:p>
+        </p:txBody>
+      </p:sp>
+      <p:sp>
+        <p:nvSpPr>
+          <p:cNvPr id="102" name="矩形 101"/>
+          <p:cNvSpPr/>
+          <p:nvPr/>
+        </p:nvSpPr>
+        <p:spPr>
+          <a:xfrm>
+            <a:off x="3001356" y="2236407"/>
+            <a:ext cx="360000" cy="360000"/>
+          </a:xfrm>
+          <a:prstGeom prst="rect">
+            <a:avLst/>
+          </a:prstGeom>
+          <a:solidFill>
+            <a:srgbClr val="00B0F0"/>
+          </a:solidFill>
+        </p:spPr>
+        <p:style>
+          <a:lnRef idx="2">
+            <a:schemeClr val="accent1"/>
+          </a:lnRef>
+          <a:fillRef idx="1">
+            <a:schemeClr val="lt1"/>
+          </a:fillRef>
+          <a:effectRef idx="0">
+            <a:schemeClr val="accent1"/>
+          </a:effectRef>
+          <a:fontRef idx="minor">
+            <a:schemeClr val="dk1"/>
+          </a:fontRef>
+        </p:style>
+        <p:txBody>
+          <a:bodyPr rtlCol="0" anchor="ctr"/>
+          <a:lstStyle/>
+          <a:p>
+            <a:pPr algn="ctr"/>
+            <a:r>
+              <a:rPr lang="en-US" altLang="zh-CN" dirty="0"/>
+              <a:t>1</a:t>
+            </a:r>
+            <a:endParaRPr lang="zh-CN" altLang="en-US" dirty="0"/>
+          </a:p>
+        </p:txBody>
+      </p:sp>
+      <p:sp>
+        <p:nvSpPr>
+          <p:cNvPr id="103" name="矩形 102"/>
+          <p:cNvSpPr/>
+          <p:nvPr/>
+        </p:nvSpPr>
+        <p:spPr>
+          <a:xfrm>
+            <a:off x="481356" y="2595000"/>
+            <a:ext cx="360000" cy="360000"/>
+          </a:xfrm>
+          <a:prstGeom prst="rect">
+            <a:avLst/>
+          </a:prstGeom>
+        </p:spPr>
+        <p:style>
+          <a:lnRef idx="2">
+            <a:schemeClr val="accent1"/>
+          </a:lnRef>
+          <a:fillRef idx="1">
+            <a:schemeClr val="lt1"/>
+          </a:fillRef>
+          <a:effectRef idx="0">
+            <a:schemeClr val="accent1"/>
+          </a:effectRef>
+          <a:fontRef idx="minor">
+            <a:schemeClr val="dk1"/>
+          </a:fontRef>
+        </p:style>
+        <p:txBody>
+          <a:bodyPr rtlCol="0" anchor="ctr"/>
+          <a:lstStyle/>
+          <a:p>
+            <a:pPr algn="ctr"/>
+            <a:r>
+              <a:rPr lang="en-US" altLang="zh-CN" dirty="0"/>
+              <a:t>0</a:t>
+            </a:r>
+            <a:endParaRPr lang="zh-CN" altLang="en-US" dirty="0"/>
+          </a:p>
+        </p:txBody>
+      </p:sp>
+      <p:sp>
+        <p:nvSpPr>
+          <p:cNvPr id="104" name="矩形 103"/>
+          <p:cNvSpPr/>
+          <p:nvPr/>
+        </p:nvSpPr>
+        <p:spPr>
+          <a:xfrm>
+            <a:off x="841356" y="2595000"/>
+            <a:ext cx="360000" cy="360000"/>
+          </a:xfrm>
+          <a:prstGeom prst="rect">
+            <a:avLst/>
+          </a:prstGeom>
+        </p:spPr>
+        <p:style>
+          <a:lnRef idx="2">
+            <a:schemeClr val="accent1"/>
+          </a:lnRef>
+          <a:fillRef idx="1">
+            <a:schemeClr val="lt1"/>
+          </a:fillRef>
+          <a:effectRef idx="0">
+            <a:schemeClr val="accent1"/>
+          </a:effectRef>
+          <a:fontRef idx="minor">
+            <a:schemeClr val="dk1"/>
+          </a:fontRef>
+        </p:style>
+        <p:txBody>
+          <a:bodyPr rtlCol="0" anchor="ctr"/>
+          <a:lstStyle/>
+          <a:p>
+            <a:pPr algn="ctr"/>
+            <a:r>
+              <a:rPr lang="en-US" altLang="zh-CN" dirty="0"/>
+              <a:t>0</a:t>
+            </a:r>
+            <a:endParaRPr lang="zh-CN" altLang="en-US" dirty="0"/>
+          </a:p>
+        </p:txBody>
+      </p:sp>
+      <p:sp>
+        <p:nvSpPr>
+          <p:cNvPr id="105" name="矩形 104"/>
+          <p:cNvSpPr/>
+          <p:nvPr/>
+        </p:nvSpPr>
+        <p:spPr>
+          <a:xfrm>
+            <a:off x="1201356" y="2595000"/>
+            <a:ext cx="360000" cy="360000"/>
+          </a:xfrm>
+          <a:prstGeom prst="rect">
+            <a:avLst/>
+          </a:prstGeom>
+        </p:spPr>
+        <p:style>
+          <a:lnRef idx="2">
+            <a:schemeClr val="accent1"/>
+          </a:lnRef>
+          <a:fillRef idx="1">
+            <a:schemeClr val="lt1"/>
+          </a:fillRef>
+          <a:effectRef idx="0">
+            <a:schemeClr val="accent1"/>
+          </a:effectRef>
+          <a:fontRef idx="minor">
+            <a:schemeClr val="dk1"/>
+          </a:fontRef>
+        </p:style>
+        <p:txBody>
+          <a:bodyPr rtlCol="0" anchor="ctr"/>
+          <a:lstStyle/>
+          <a:p>
+            <a:pPr algn="ctr"/>
+            <a:r>
+              <a:rPr lang="en-US" altLang="zh-CN" dirty="0"/>
+              <a:t>0</a:t>
+            </a:r>
+            <a:endParaRPr lang="zh-CN" altLang="en-US" dirty="0"/>
+          </a:p>
+        </p:txBody>
+      </p:sp>
+      <p:sp>
+        <p:nvSpPr>
+          <p:cNvPr id="106" name="矩形 105"/>
+          <p:cNvSpPr/>
+          <p:nvPr/>
+        </p:nvSpPr>
+        <p:spPr>
+          <a:xfrm>
+            <a:off x="1561356" y="2595000"/>
+            <a:ext cx="360000" cy="360000"/>
+          </a:xfrm>
+          <a:prstGeom prst="rect">
+            <a:avLst/>
+          </a:prstGeom>
+        </p:spPr>
+        <p:style>
+          <a:lnRef idx="2">
+            <a:schemeClr val="accent1"/>
+          </a:lnRef>
+          <a:fillRef idx="1">
+            <a:schemeClr val="lt1"/>
+          </a:fillRef>
+          <a:effectRef idx="0">
+            <a:schemeClr val="accent1"/>
+          </a:effectRef>
+          <a:fontRef idx="minor">
+            <a:schemeClr val="dk1"/>
+          </a:fontRef>
+        </p:style>
+        <p:txBody>
+          <a:bodyPr rtlCol="0" anchor="ctr"/>
+          <a:lstStyle/>
+          <a:p>
+            <a:pPr algn="ctr"/>
+            <a:r>
+              <a:rPr lang="en-US" altLang="zh-CN" dirty="0"/>
+              <a:t>0</a:t>
+            </a:r>
+            <a:endParaRPr lang="zh-CN" altLang="en-US" dirty="0"/>
+          </a:p>
+        </p:txBody>
+      </p:sp>
+      <p:sp>
+        <p:nvSpPr>
+          <p:cNvPr id="107" name="矩形 106"/>
+          <p:cNvSpPr/>
+          <p:nvPr/>
+        </p:nvSpPr>
+        <p:spPr>
+          <a:xfrm>
+            <a:off x="1921356" y="2595000"/>
+            <a:ext cx="360000" cy="360000"/>
+          </a:xfrm>
+          <a:prstGeom prst="rect">
+            <a:avLst/>
+          </a:prstGeom>
+        </p:spPr>
+        <p:style>
+          <a:lnRef idx="2">
+            <a:schemeClr val="accent1"/>
+          </a:lnRef>
+          <a:fillRef idx="1">
+            <a:schemeClr val="lt1"/>
+          </a:fillRef>
+          <a:effectRef idx="0">
+            <a:schemeClr val="accent1"/>
+          </a:effectRef>
+          <a:fontRef idx="minor">
+            <a:schemeClr val="dk1"/>
+          </a:fontRef>
+        </p:style>
+        <p:txBody>
+          <a:bodyPr rtlCol="0" anchor="ctr"/>
+          <a:lstStyle/>
+          <a:p>
+            <a:pPr algn="ctr"/>
+            <a:r>
+              <a:rPr lang="en-US" altLang="zh-CN" dirty="0"/>
+              <a:t>0</a:t>
+            </a:r>
+            <a:endParaRPr lang="zh-CN" altLang="en-US" dirty="0"/>
+          </a:p>
+        </p:txBody>
+      </p:sp>
+      <p:sp>
+        <p:nvSpPr>
+          <p:cNvPr id="108" name="矩形 107"/>
+          <p:cNvSpPr/>
+          <p:nvPr/>
+        </p:nvSpPr>
+        <p:spPr>
+          <a:xfrm>
+            <a:off x="2281356" y="2595000"/>
+            <a:ext cx="360000" cy="360000"/>
+          </a:xfrm>
+          <a:prstGeom prst="rect">
+            <a:avLst/>
+          </a:prstGeom>
+        </p:spPr>
+        <p:style>
+          <a:lnRef idx="2">
+            <a:schemeClr val="accent1"/>
+          </a:lnRef>
+          <a:fillRef idx="1">
+            <a:schemeClr val="lt1"/>
+          </a:fillRef>
+          <a:effectRef idx="0">
+            <a:schemeClr val="accent1"/>
+          </a:effectRef>
+          <a:fontRef idx="minor">
+            <a:schemeClr val="dk1"/>
+          </a:fontRef>
+        </p:style>
+        <p:txBody>
+          <a:bodyPr rtlCol="0" anchor="ctr"/>
+          <a:lstStyle/>
+          <a:p>
+            <a:pPr algn="ctr"/>
+            <a:r>
+              <a:rPr lang="en-US" altLang="zh-CN" dirty="0"/>
+              <a:t>0</a:t>
+            </a:r>
+            <a:endParaRPr lang="zh-CN" altLang="en-US" dirty="0"/>
+          </a:p>
+        </p:txBody>
+      </p:sp>
+      <p:sp>
+        <p:nvSpPr>
+          <p:cNvPr id="109" name="矩形 108"/>
+          <p:cNvSpPr/>
+          <p:nvPr/>
+        </p:nvSpPr>
+        <p:spPr>
+          <a:xfrm>
+            <a:off x="2641356" y="2593593"/>
+            <a:ext cx="360000" cy="360000"/>
+          </a:xfrm>
+          <a:prstGeom prst="rect">
+            <a:avLst/>
+          </a:prstGeom>
+        </p:spPr>
+        <p:style>
+          <a:lnRef idx="2">
+            <a:schemeClr val="accent1"/>
+          </a:lnRef>
+          <a:fillRef idx="1">
+            <a:schemeClr val="lt1"/>
+          </a:fillRef>
+          <a:effectRef idx="0">
+            <a:schemeClr val="accent1"/>
+          </a:effectRef>
+          <a:fontRef idx="minor">
+            <a:schemeClr val="dk1"/>
+          </a:fontRef>
+        </p:style>
+        <p:txBody>
+          <a:bodyPr rtlCol="0" anchor="ctr"/>
+          <a:lstStyle/>
+          <a:p>
+            <a:pPr algn="ctr"/>
+            <a:r>
+              <a:rPr lang="en-US" altLang="zh-CN" dirty="0"/>
+              <a:t>0</a:t>
+            </a:r>
+            <a:endParaRPr lang="zh-CN" altLang="en-US" dirty="0"/>
+          </a:p>
+        </p:txBody>
+      </p:sp>
+      <p:sp>
+        <p:nvSpPr>
+          <p:cNvPr id="110" name="矩形 109"/>
+          <p:cNvSpPr/>
+          <p:nvPr/>
+        </p:nvSpPr>
+        <p:spPr>
+          <a:xfrm>
+            <a:off x="3001356" y="2593593"/>
+            <a:ext cx="360000" cy="360000"/>
+          </a:xfrm>
+          <a:prstGeom prst="rect">
+            <a:avLst/>
+          </a:prstGeom>
+          <a:solidFill>
+            <a:srgbClr val="00B050"/>
+          </a:solidFill>
+        </p:spPr>
+        <p:style>
+          <a:lnRef idx="2">
+            <a:schemeClr val="accent1"/>
+          </a:lnRef>
+          <a:fillRef idx="1">
+            <a:schemeClr val="lt1"/>
+          </a:fillRef>
+          <a:effectRef idx="0">
+            <a:schemeClr val="accent1"/>
+          </a:effectRef>
+          <a:fontRef idx="minor">
+            <a:schemeClr val="dk1"/>
+          </a:fontRef>
+        </p:style>
+        <p:txBody>
+          <a:bodyPr rtlCol="0" anchor="ctr"/>
+          <a:lstStyle/>
+          <a:p>
+            <a:pPr algn="ctr"/>
+            <a:r>
+              <a:rPr lang="en-US" altLang="zh-CN" dirty="0" smtClean="0"/>
+              <a:t>1</a:t>
+            </a:r>
+            <a:endParaRPr lang="zh-CN" altLang="en-US" dirty="0"/>
+          </a:p>
+        </p:txBody>
+      </p:sp>
+      <p:cxnSp>
+        <p:nvCxnSpPr>
+          <p:cNvPr id="71" name="直接箭头连接符 70"/>
+          <p:cNvCxnSpPr/>
+          <p:nvPr/>
+        </p:nvCxnSpPr>
+        <p:spPr>
+          <a:xfrm>
+            <a:off x="733356" y="689159"/>
+            <a:ext cx="216000" cy="216000"/>
+          </a:xfrm>
+          <a:prstGeom prst="straightConnector1">
+            <a:avLst/>
+          </a:prstGeom>
+          <a:ln w="12700">
+            <a:solidFill>
+              <a:schemeClr val="tx1"/>
+            </a:solidFill>
+            <a:tailEnd type="triangle"/>
+          </a:ln>
+        </p:spPr>
+        <p:style>
+          <a:lnRef idx="1">
+            <a:schemeClr val="accent1"/>
+          </a:lnRef>
+          <a:fillRef idx="0">
+            <a:schemeClr val="accent1"/>
+          </a:fillRef>
+          <a:effectRef idx="0">
+            <a:schemeClr val="accent1"/>
+          </a:effectRef>
+          <a:fontRef idx="minor">
+            <a:schemeClr val="tx1"/>
+          </a:fontRef>
+        </p:style>
+      </p:cxnSp>
+      <p:cxnSp>
+        <p:nvCxnSpPr>
+          <p:cNvPr id="72" name="直接箭头连接符 71"/>
+          <p:cNvCxnSpPr/>
+          <p:nvPr/>
+        </p:nvCxnSpPr>
+        <p:spPr>
+          <a:xfrm>
+            <a:off x="1093356" y="1047926"/>
+            <a:ext cx="216000" cy="216000"/>
+          </a:xfrm>
+          <a:prstGeom prst="straightConnector1">
+            <a:avLst/>
+          </a:prstGeom>
+          <a:ln w="12700">
+            <a:solidFill>
+              <a:schemeClr val="tx1"/>
+            </a:solidFill>
+            <a:tailEnd type="triangle"/>
+          </a:ln>
+        </p:spPr>
+        <p:style>
+          <a:lnRef idx="1">
+            <a:schemeClr val="accent1"/>
+          </a:lnRef>
+          <a:fillRef idx="0">
+            <a:schemeClr val="accent1"/>
+          </a:fillRef>
+          <a:effectRef idx="0">
+            <a:schemeClr val="accent1"/>
+          </a:effectRef>
+          <a:fontRef idx="minor">
+            <a:schemeClr val="tx1"/>
+          </a:fontRef>
+        </p:style>
+      </p:cxnSp>
+      <p:cxnSp>
+        <p:nvCxnSpPr>
+          <p:cNvPr id="73" name="直接箭头连接符 72"/>
+          <p:cNvCxnSpPr/>
+          <p:nvPr/>
+        </p:nvCxnSpPr>
+        <p:spPr>
+          <a:xfrm>
+            <a:off x="1813356" y="1770672"/>
+            <a:ext cx="216000" cy="216000"/>
+          </a:xfrm>
+          <a:prstGeom prst="straightConnector1">
+            <a:avLst/>
+          </a:prstGeom>
+          <a:ln w="12700">
+            <a:solidFill>
+              <a:schemeClr val="tx1"/>
+            </a:solidFill>
+            <a:tailEnd type="triangle"/>
+          </a:ln>
+        </p:spPr>
+        <p:style>
+          <a:lnRef idx="1">
+            <a:schemeClr val="accent1"/>
+          </a:lnRef>
+          <a:fillRef idx="0">
+            <a:schemeClr val="accent1"/>
+          </a:fillRef>
+          <a:effectRef idx="0">
+            <a:schemeClr val="accent1"/>
+          </a:effectRef>
+          <a:fontRef idx="minor">
+            <a:schemeClr val="tx1"/>
+          </a:fontRef>
+        </p:style>
+      </p:cxnSp>
+      <p:cxnSp>
+        <p:nvCxnSpPr>
+          <p:cNvPr id="74" name="直接箭头连接符 73"/>
+          <p:cNvCxnSpPr/>
+          <p:nvPr/>
+        </p:nvCxnSpPr>
+        <p:spPr>
+          <a:xfrm>
+            <a:off x="2179455" y="1770672"/>
+            <a:ext cx="216000" cy="216000"/>
+          </a:xfrm>
+          <a:prstGeom prst="straightConnector1">
+            <a:avLst/>
+          </a:prstGeom>
+          <a:ln w="12700">
+            <a:solidFill>
+              <a:schemeClr val="tx1"/>
+            </a:solidFill>
+            <a:tailEnd type="triangle"/>
+          </a:ln>
+        </p:spPr>
+        <p:style>
+          <a:lnRef idx="1">
+            <a:schemeClr val="accent1"/>
+          </a:lnRef>
+          <a:fillRef idx="0">
+            <a:schemeClr val="accent1"/>
+          </a:fillRef>
+          <a:effectRef idx="0">
+            <a:schemeClr val="accent1"/>
+          </a:effectRef>
+          <a:fontRef idx="minor">
+            <a:schemeClr val="tx1"/>
+          </a:fontRef>
+        </p:style>
+      </p:cxnSp>
+      <p:cxnSp>
+        <p:nvCxnSpPr>
+          <p:cNvPr id="75" name="直接箭头连接符 74"/>
+          <p:cNvCxnSpPr/>
+          <p:nvPr/>
+        </p:nvCxnSpPr>
+        <p:spPr>
+          <a:xfrm>
+            <a:off x="2539455" y="1770672"/>
+            <a:ext cx="216000" cy="216000"/>
+          </a:xfrm>
+          <a:prstGeom prst="straightConnector1">
+            <a:avLst/>
+          </a:prstGeom>
+          <a:ln w="12700">
+            <a:solidFill>
+              <a:schemeClr val="tx1"/>
+            </a:solidFill>
+            <a:tailEnd type="triangle"/>
+          </a:ln>
+        </p:spPr>
+        <p:style>
+          <a:lnRef idx="1">
+            <a:schemeClr val="accent1"/>
+          </a:lnRef>
+          <a:fillRef idx="0">
+            <a:schemeClr val="accent1"/>
+          </a:fillRef>
+          <a:effectRef idx="0">
+            <a:schemeClr val="accent1"/>
+          </a:effectRef>
+          <a:fontRef idx="minor">
+            <a:schemeClr val="tx1"/>
+          </a:fontRef>
+        </p:style>
+      </p:cxnSp>
+      <p:cxnSp>
+        <p:nvCxnSpPr>
+          <p:cNvPr id="76" name="直接箭头连接符 75"/>
+          <p:cNvCxnSpPr/>
+          <p:nvPr/>
+        </p:nvCxnSpPr>
+        <p:spPr>
+          <a:xfrm>
+            <a:off x="2893356" y="2492319"/>
+            <a:ext cx="216000" cy="216000"/>
+          </a:xfrm>
+          <a:prstGeom prst="straightConnector1">
+            <a:avLst/>
+          </a:prstGeom>
+          <a:ln w="12700">
+            <a:solidFill>
+              <a:schemeClr val="tx1"/>
+            </a:solidFill>
+            <a:tailEnd type="triangle"/>
+          </a:ln>
+        </p:spPr>
+        <p:style>
+          <a:lnRef idx="1">
+            <a:schemeClr val="accent1"/>
+          </a:lnRef>
+          <a:fillRef idx="0">
+            <a:schemeClr val="accent1"/>
+          </a:fillRef>
+          <a:effectRef idx="0">
+            <a:schemeClr val="accent1"/>
+          </a:effectRef>
+          <a:fontRef idx="minor">
+            <a:schemeClr val="tx1"/>
+          </a:fontRef>
+        </p:style>
+      </p:cxnSp>
     </p:spTree>
     <p:extLst>
       <p:ext uri="{BB962C8B-B14F-4D97-AF65-F5344CB8AC3E}">
-        <p14:creationId xmlns:p14="http://schemas.microsoft.com/office/powerpoint/2010/main" val="3296605493"/>
+        <p14:creationId xmlns:p14="http://schemas.microsoft.com/office/powerpoint/2010/main" val="3427096324"/>
       </p:ext>
     </p:extLst>
   </p:cSld>
@@ -7272,11 +9547,6 @@
           <a:prstGeom prst="rect">
             <a:avLst/>
           </a:prstGeom>
-          <a:solidFill>
-            <a:schemeClr val="bg2">
-              <a:lumMod val="90000"/>
-            </a:schemeClr>
-          </a:solidFill>
         </p:spPr>
         <p:style>
           <a:lnRef idx="2">
@@ -7863,7 +10133,7 @@
     </p:spTree>
     <p:extLst>
       <p:ext uri="{BB962C8B-B14F-4D97-AF65-F5344CB8AC3E}">
-        <p14:creationId xmlns:p14="http://schemas.microsoft.com/office/powerpoint/2010/main" val="3366423656"/>
+        <p14:creationId xmlns:p14="http://schemas.microsoft.com/office/powerpoint/2010/main" val="3296605493"/>
       </p:ext>
     </p:extLst>
   </p:cSld>
@@ -8250,7 +10520,9 @@
             <a:avLst/>
           </a:prstGeom>
           <a:solidFill>
-            <a:srgbClr val="00B0F0"/>
+            <a:schemeClr val="bg2">
+              <a:lumMod val="90000"/>
+            </a:schemeClr>
           </a:solidFill>
         </p:spPr>
         <p:style>
@@ -8274,7 +10546,7 @@
             <a:pPr algn="ctr"/>
             <a:r>
               <a:rPr lang="en-US" altLang="zh-CN" dirty="0"/>
-              <a:t>1</a:t>
+              <a:t>0</a:t>
             </a:r>
             <a:endParaRPr lang="zh-CN" altLang="en-US" dirty="0"/>
           </a:p>
@@ -8835,46 +11107,10 @@
           </a:p>
         </p:txBody>
       </p:sp>
-      <p:cxnSp>
-        <p:nvCxnSpPr>
-          <p:cNvPr id="9" name="直接箭头连接符 8"/>
-          <p:cNvCxnSpPr/>
-          <p:nvPr/>
-        </p:nvCxnSpPr>
-        <p:spPr>
-          <a:xfrm>
-            <a:off x="733356" y="689159"/>
-            <a:ext cx="216000" cy="216000"/>
-          </a:xfrm>
-          <a:prstGeom prst="straightConnector1">
-            <a:avLst/>
-          </a:prstGeom>
-          <a:ln w="12700">
-            <a:solidFill>
-              <a:schemeClr val="tx1"/>
-            </a:solidFill>
-            <a:tailEnd type="triangle"/>
-          </a:ln>
-        </p:spPr>
-        <p:style>
-          <a:lnRef idx="1">
-            <a:schemeClr val="accent1"/>
-          </a:lnRef>
-          <a:fillRef idx="0">
-            <a:schemeClr val="accent1"/>
-          </a:fillRef>
-          <a:effectRef idx="0">
-            <a:schemeClr val="accent1"/>
-          </a:effectRef>
-          <a:fontRef idx="minor">
-            <a:schemeClr val="tx1"/>
-          </a:fontRef>
-        </p:style>
-      </p:cxnSp>
     </p:spTree>
     <p:extLst>
       <p:ext uri="{BB962C8B-B14F-4D97-AF65-F5344CB8AC3E}">
-        <p14:creationId xmlns:p14="http://schemas.microsoft.com/office/powerpoint/2010/main" val="2961236058"/>
+        <p14:creationId xmlns:p14="http://schemas.microsoft.com/office/powerpoint/2010/main" val="3366423656"/>
       </p:ext>
     </p:extLst>
   </p:cSld>
@@ -9260,6 +11496,1017 @@
           <a:prstGeom prst="rect">
             <a:avLst/>
           </a:prstGeom>
+          <a:solidFill>
+            <a:srgbClr val="00B0F0"/>
+          </a:solidFill>
+        </p:spPr>
+        <p:style>
+          <a:lnRef idx="2">
+            <a:schemeClr val="accent1"/>
+          </a:lnRef>
+          <a:fillRef idx="1">
+            <a:schemeClr val="lt1"/>
+          </a:fillRef>
+          <a:effectRef idx="0">
+            <a:schemeClr val="accent1"/>
+          </a:effectRef>
+          <a:fontRef idx="minor">
+            <a:schemeClr val="dk1"/>
+          </a:fontRef>
+        </p:style>
+        <p:txBody>
+          <a:bodyPr rtlCol="0" anchor="ctr"/>
+          <a:lstStyle/>
+          <a:p>
+            <a:pPr algn="ctr"/>
+            <a:r>
+              <a:rPr lang="en-US" altLang="zh-CN" dirty="0"/>
+              <a:t>1</a:t>
+            </a:r>
+            <a:endParaRPr lang="zh-CN" altLang="en-US" dirty="0"/>
+          </a:p>
+        </p:txBody>
+      </p:sp>
+      <p:sp>
+        <p:nvSpPr>
+          <p:cNvPr id="21" name="矩形 20"/>
+          <p:cNvSpPr/>
+          <p:nvPr/>
+        </p:nvSpPr>
+        <p:spPr>
+          <a:xfrm>
+            <a:off x="1201356" y="793969"/>
+            <a:ext cx="360000" cy="360000"/>
+          </a:xfrm>
+          <a:prstGeom prst="rect">
+            <a:avLst/>
+          </a:prstGeom>
+        </p:spPr>
+        <p:style>
+          <a:lnRef idx="2">
+            <a:schemeClr val="accent1"/>
+          </a:lnRef>
+          <a:fillRef idx="1">
+            <a:schemeClr val="lt1"/>
+          </a:fillRef>
+          <a:effectRef idx="0">
+            <a:schemeClr val="accent1"/>
+          </a:effectRef>
+          <a:fontRef idx="minor">
+            <a:schemeClr val="dk1"/>
+          </a:fontRef>
+        </p:style>
+        <p:txBody>
+          <a:bodyPr rtlCol="0" anchor="ctr"/>
+          <a:lstStyle/>
+          <a:p>
+            <a:pPr algn="ctr"/>
+            <a:r>
+              <a:rPr lang="en-US" altLang="zh-CN" dirty="0"/>
+              <a:t>0</a:t>
+            </a:r>
+            <a:endParaRPr lang="zh-CN" altLang="en-US" dirty="0"/>
+          </a:p>
+        </p:txBody>
+      </p:sp>
+      <p:sp>
+        <p:nvSpPr>
+          <p:cNvPr id="22" name="矩形 21"/>
+          <p:cNvSpPr/>
+          <p:nvPr/>
+        </p:nvSpPr>
+        <p:spPr>
+          <a:xfrm>
+            <a:off x="1561356" y="793969"/>
+            <a:ext cx="360000" cy="360000"/>
+          </a:xfrm>
+          <a:prstGeom prst="rect">
+            <a:avLst/>
+          </a:prstGeom>
+        </p:spPr>
+        <p:style>
+          <a:lnRef idx="2">
+            <a:schemeClr val="accent1"/>
+          </a:lnRef>
+          <a:fillRef idx="1">
+            <a:schemeClr val="lt1"/>
+          </a:fillRef>
+          <a:effectRef idx="0">
+            <a:schemeClr val="accent1"/>
+          </a:effectRef>
+          <a:fontRef idx="minor">
+            <a:schemeClr val="dk1"/>
+          </a:fontRef>
+        </p:style>
+        <p:txBody>
+          <a:bodyPr rtlCol="0" anchor="ctr"/>
+          <a:lstStyle/>
+          <a:p>
+            <a:pPr algn="ctr"/>
+            <a:r>
+              <a:rPr lang="en-US" altLang="zh-CN" dirty="0"/>
+              <a:t>0</a:t>
+            </a:r>
+            <a:endParaRPr lang="zh-CN" altLang="en-US" dirty="0"/>
+          </a:p>
+        </p:txBody>
+      </p:sp>
+      <p:sp>
+        <p:nvSpPr>
+          <p:cNvPr id="33" name="矩形 32"/>
+          <p:cNvSpPr/>
+          <p:nvPr/>
+        </p:nvSpPr>
+        <p:spPr>
+          <a:xfrm>
+            <a:off x="481356" y="1151155"/>
+            <a:ext cx="360000" cy="360000"/>
+          </a:xfrm>
+          <a:prstGeom prst="rect">
+            <a:avLst/>
+          </a:prstGeom>
+        </p:spPr>
+        <p:style>
+          <a:lnRef idx="2">
+            <a:schemeClr val="accent1"/>
+          </a:lnRef>
+          <a:fillRef idx="1">
+            <a:schemeClr val="lt1"/>
+          </a:fillRef>
+          <a:effectRef idx="0">
+            <a:schemeClr val="accent1"/>
+          </a:effectRef>
+          <a:fontRef idx="minor">
+            <a:schemeClr val="dk1"/>
+          </a:fontRef>
+        </p:style>
+        <p:txBody>
+          <a:bodyPr rtlCol="0" anchor="ctr"/>
+          <a:lstStyle/>
+          <a:p>
+            <a:pPr algn="ctr"/>
+            <a:r>
+              <a:rPr lang="en-US" altLang="zh-CN" dirty="0"/>
+              <a:t>0</a:t>
+            </a:r>
+            <a:endParaRPr lang="zh-CN" altLang="en-US" dirty="0"/>
+          </a:p>
+        </p:txBody>
+      </p:sp>
+      <p:sp>
+        <p:nvSpPr>
+          <p:cNvPr id="34" name="矩形 33"/>
+          <p:cNvSpPr/>
+          <p:nvPr/>
+        </p:nvSpPr>
+        <p:spPr>
+          <a:xfrm>
+            <a:off x="841356" y="1151155"/>
+            <a:ext cx="360000" cy="360000"/>
+          </a:xfrm>
+          <a:prstGeom prst="rect">
+            <a:avLst/>
+          </a:prstGeom>
+        </p:spPr>
+        <p:style>
+          <a:lnRef idx="2">
+            <a:schemeClr val="accent1"/>
+          </a:lnRef>
+          <a:fillRef idx="1">
+            <a:schemeClr val="lt1"/>
+          </a:fillRef>
+          <a:effectRef idx="0">
+            <a:schemeClr val="accent1"/>
+          </a:effectRef>
+          <a:fontRef idx="minor">
+            <a:schemeClr val="dk1"/>
+          </a:fontRef>
+        </p:style>
+        <p:txBody>
+          <a:bodyPr rtlCol="0" anchor="ctr"/>
+          <a:lstStyle/>
+          <a:p>
+            <a:pPr algn="ctr"/>
+            <a:r>
+              <a:rPr lang="en-US" altLang="zh-CN" dirty="0"/>
+              <a:t>0</a:t>
+            </a:r>
+            <a:endParaRPr lang="zh-CN" altLang="en-US" dirty="0"/>
+          </a:p>
+        </p:txBody>
+      </p:sp>
+      <p:sp>
+        <p:nvSpPr>
+          <p:cNvPr id="35" name="矩形 34"/>
+          <p:cNvSpPr/>
+          <p:nvPr/>
+        </p:nvSpPr>
+        <p:spPr>
+          <a:xfrm>
+            <a:off x="1201356" y="1151155"/>
+            <a:ext cx="360000" cy="360000"/>
+          </a:xfrm>
+          <a:prstGeom prst="rect">
+            <a:avLst/>
+          </a:prstGeom>
+        </p:spPr>
+        <p:style>
+          <a:lnRef idx="2">
+            <a:schemeClr val="accent1"/>
+          </a:lnRef>
+          <a:fillRef idx="1">
+            <a:schemeClr val="lt1"/>
+          </a:fillRef>
+          <a:effectRef idx="0">
+            <a:schemeClr val="accent1"/>
+          </a:effectRef>
+          <a:fontRef idx="minor">
+            <a:schemeClr val="dk1"/>
+          </a:fontRef>
+        </p:style>
+        <p:txBody>
+          <a:bodyPr rtlCol="0" anchor="ctr"/>
+          <a:lstStyle/>
+          <a:p>
+            <a:pPr algn="ctr"/>
+            <a:r>
+              <a:rPr lang="en-US" altLang="zh-CN" dirty="0"/>
+              <a:t>0</a:t>
+            </a:r>
+            <a:endParaRPr lang="zh-CN" altLang="en-US" dirty="0"/>
+          </a:p>
+        </p:txBody>
+      </p:sp>
+      <p:sp>
+        <p:nvSpPr>
+          <p:cNvPr id="36" name="矩形 35"/>
+          <p:cNvSpPr/>
+          <p:nvPr/>
+        </p:nvSpPr>
+        <p:spPr>
+          <a:xfrm>
+            <a:off x="1561356" y="1151155"/>
+            <a:ext cx="360000" cy="360000"/>
+          </a:xfrm>
+          <a:prstGeom prst="rect">
+            <a:avLst/>
+          </a:prstGeom>
+        </p:spPr>
+        <p:style>
+          <a:lnRef idx="2">
+            <a:schemeClr val="accent1"/>
+          </a:lnRef>
+          <a:fillRef idx="1">
+            <a:schemeClr val="lt1"/>
+          </a:fillRef>
+          <a:effectRef idx="0">
+            <a:schemeClr val="accent1"/>
+          </a:effectRef>
+          <a:fontRef idx="minor">
+            <a:schemeClr val="dk1"/>
+          </a:fontRef>
+        </p:style>
+        <p:txBody>
+          <a:bodyPr rtlCol="0" anchor="ctr"/>
+          <a:lstStyle/>
+          <a:p>
+            <a:pPr algn="ctr"/>
+            <a:r>
+              <a:rPr lang="en-US" altLang="zh-CN" dirty="0"/>
+              <a:t>0</a:t>
+            </a:r>
+            <a:endParaRPr lang="zh-CN" altLang="en-US" dirty="0"/>
+          </a:p>
+        </p:txBody>
+      </p:sp>
+      <p:sp>
+        <p:nvSpPr>
+          <p:cNvPr id="65" name="矩形 64"/>
+          <p:cNvSpPr/>
+          <p:nvPr/>
+        </p:nvSpPr>
+        <p:spPr>
+          <a:xfrm>
+            <a:off x="121356" y="789748"/>
+            <a:ext cx="360000" cy="360000"/>
+          </a:xfrm>
+          <a:prstGeom prst="rect">
+            <a:avLst/>
+          </a:prstGeom>
+          <a:ln>
+            <a:noFill/>
+          </a:ln>
+        </p:spPr>
+        <p:style>
+          <a:lnRef idx="2">
+            <a:schemeClr val="accent1"/>
+          </a:lnRef>
+          <a:fillRef idx="1">
+            <a:schemeClr val="lt1"/>
+          </a:fillRef>
+          <a:effectRef idx="0">
+            <a:schemeClr val="accent1"/>
+          </a:effectRef>
+          <a:fontRef idx="minor">
+            <a:schemeClr val="dk1"/>
+          </a:fontRef>
+        </p:style>
+        <p:txBody>
+          <a:bodyPr rtlCol="0" anchor="ctr"/>
+          <a:lstStyle/>
+          <a:p>
+            <a:pPr algn="ctr"/>
+            <a:r>
+              <a:rPr lang="en-US" altLang="zh-CN" dirty="0"/>
+              <a:t>a</a:t>
+            </a:r>
+            <a:endParaRPr lang="zh-CN" altLang="en-US" dirty="0"/>
+          </a:p>
+        </p:txBody>
+      </p:sp>
+      <p:sp>
+        <p:nvSpPr>
+          <p:cNvPr id="66" name="矩形 65"/>
+          <p:cNvSpPr/>
+          <p:nvPr/>
+        </p:nvSpPr>
+        <p:spPr>
+          <a:xfrm>
+            <a:off x="121356" y="1142337"/>
+            <a:ext cx="360000" cy="360000"/>
+          </a:xfrm>
+          <a:prstGeom prst="rect">
+            <a:avLst/>
+          </a:prstGeom>
+          <a:ln>
+            <a:noFill/>
+          </a:ln>
+        </p:spPr>
+        <p:style>
+          <a:lnRef idx="2">
+            <a:schemeClr val="accent1"/>
+          </a:lnRef>
+          <a:fillRef idx="1">
+            <a:schemeClr val="lt1"/>
+          </a:fillRef>
+          <a:effectRef idx="0">
+            <a:schemeClr val="accent1"/>
+          </a:effectRef>
+          <a:fontRef idx="minor">
+            <a:schemeClr val="dk1"/>
+          </a:fontRef>
+        </p:style>
+        <p:txBody>
+          <a:bodyPr rtlCol="0" anchor="ctr"/>
+          <a:lstStyle/>
+          <a:p>
+            <a:pPr algn="ctr"/>
+            <a:r>
+              <a:rPr lang="en-US" altLang="zh-CN" dirty="0"/>
+              <a:t>.</a:t>
+            </a:r>
+            <a:endParaRPr lang="zh-CN" altLang="en-US" dirty="0"/>
+          </a:p>
+        </p:txBody>
+      </p:sp>
+      <p:sp>
+        <p:nvSpPr>
+          <p:cNvPr id="67" name="矩形 66"/>
+          <p:cNvSpPr/>
+          <p:nvPr/>
+        </p:nvSpPr>
+        <p:spPr>
+          <a:xfrm>
+            <a:off x="121356" y="1516783"/>
+            <a:ext cx="360000" cy="360000"/>
+          </a:xfrm>
+          <a:prstGeom prst="rect">
+            <a:avLst/>
+          </a:prstGeom>
+          <a:ln>
+            <a:noFill/>
+          </a:ln>
+        </p:spPr>
+        <p:style>
+          <a:lnRef idx="2">
+            <a:schemeClr val="accent1"/>
+          </a:lnRef>
+          <a:fillRef idx="1">
+            <a:schemeClr val="lt1"/>
+          </a:fillRef>
+          <a:effectRef idx="0">
+            <a:schemeClr val="accent1"/>
+          </a:effectRef>
+          <a:fontRef idx="minor">
+            <a:schemeClr val="dk1"/>
+          </a:fontRef>
+        </p:style>
+        <p:txBody>
+          <a:bodyPr rtlCol="0" anchor="ctr"/>
+          <a:lstStyle/>
+          <a:p>
+            <a:pPr algn="ctr"/>
+            <a:r>
+              <a:rPr lang="en-US" altLang="zh-CN" dirty="0"/>
+              <a:t>c</a:t>
+            </a:r>
+            <a:endParaRPr lang="zh-CN" altLang="en-US" dirty="0"/>
+          </a:p>
+        </p:txBody>
+      </p:sp>
+      <p:sp>
+        <p:nvSpPr>
+          <p:cNvPr id="79" name="矩形 78"/>
+          <p:cNvSpPr/>
+          <p:nvPr/>
+        </p:nvSpPr>
+        <p:spPr>
+          <a:xfrm>
+            <a:off x="481356" y="1516715"/>
+            <a:ext cx="360000" cy="360000"/>
+          </a:xfrm>
+          <a:prstGeom prst="rect">
+            <a:avLst/>
+          </a:prstGeom>
+        </p:spPr>
+        <p:style>
+          <a:lnRef idx="2">
+            <a:schemeClr val="accent1"/>
+          </a:lnRef>
+          <a:fillRef idx="1">
+            <a:schemeClr val="lt1"/>
+          </a:fillRef>
+          <a:effectRef idx="0">
+            <a:schemeClr val="accent1"/>
+          </a:effectRef>
+          <a:fontRef idx="minor">
+            <a:schemeClr val="dk1"/>
+          </a:fontRef>
+        </p:style>
+        <p:txBody>
+          <a:bodyPr rtlCol="0" anchor="ctr"/>
+          <a:lstStyle/>
+          <a:p>
+            <a:pPr algn="ctr"/>
+            <a:r>
+              <a:rPr lang="en-US" altLang="zh-CN" dirty="0"/>
+              <a:t>0</a:t>
+            </a:r>
+            <a:endParaRPr lang="zh-CN" altLang="en-US" dirty="0"/>
+          </a:p>
+        </p:txBody>
+      </p:sp>
+      <p:sp>
+        <p:nvSpPr>
+          <p:cNvPr id="80" name="矩形 79"/>
+          <p:cNvSpPr/>
+          <p:nvPr/>
+        </p:nvSpPr>
+        <p:spPr>
+          <a:xfrm>
+            <a:off x="841356" y="1516715"/>
+            <a:ext cx="360000" cy="360000"/>
+          </a:xfrm>
+          <a:prstGeom prst="rect">
+            <a:avLst/>
+          </a:prstGeom>
+        </p:spPr>
+        <p:style>
+          <a:lnRef idx="2">
+            <a:schemeClr val="accent1"/>
+          </a:lnRef>
+          <a:fillRef idx="1">
+            <a:schemeClr val="lt1"/>
+          </a:fillRef>
+          <a:effectRef idx="0">
+            <a:schemeClr val="accent1"/>
+          </a:effectRef>
+          <a:fontRef idx="minor">
+            <a:schemeClr val="dk1"/>
+          </a:fontRef>
+        </p:style>
+        <p:txBody>
+          <a:bodyPr rtlCol="0" anchor="ctr"/>
+          <a:lstStyle/>
+          <a:p>
+            <a:pPr algn="ctr"/>
+            <a:r>
+              <a:rPr lang="en-US" altLang="zh-CN" dirty="0"/>
+              <a:t>0</a:t>
+            </a:r>
+            <a:endParaRPr lang="zh-CN" altLang="en-US" dirty="0"/>
+          </a:p>
+        </p:txBody>
+      </p:sp>
+      <p:sp>
+        <p:nvSpPr>
+          <p:cNvPr id="81" name="矩形 80"/>
+          <p:cNvSpPr/>
+          <p:nvPr/>
+        </p:nvSpPr>
+        <p:spPr>
+          <a:xfrm>
+            <a:off x="1201356" y="1516715"/>
+            <a:ext cx="360000" cy="360000"/>
+          </a:xfrm>
+          <a:prstGeom prst="rect">
+            <a:avLst/>
+          </a:prstGeom>
+        </p:spPr>
+        <p:style>
+          <a:lnRef idx="2">
+            <a:schemeClr val="accent1"/>
+          </a:lnRef>
+          <a:fillRef idx="1">
+            <a:schemeClr val="lt1"/>
+          </a:fillRef>
+          <a:effectRef idx="0">
+            <a:schemeClr val="accent1"/>
+          </a:effectRef>
+          <a:fontRef idx="minor">
+            <a:schemeClr val="dk1"/>
+          </a:fontRef>
+        </p:style>
+        <p:txBody>
+          <a:bodyPr rtlCol="0" anchor="ctr"/>
+          <a:lstStyle/>
+          <a:p>
+            <a:pPr algn="ctr"/>
+            <a:r>
+              <a:rPr lang="en-US" altLang="zh-CN" dirty="0"/>
+              <a:t>0</a:t>
+            </a:r>
+            <a:endParaRPr lang="zh-CN" altLang="en-US" dirty="0"/>
+          </a:p>
+        </p:txBody>
+      </p:sp>
+      <p:sp>
+        <p:nvSpPr>
+          <p:cNvPr id="82" name="矩形 81"/>
+          <p:cNvSpPr/>
+          <p:nvPr/>
+        </p:nvSpPr>
+        <p:spPr>
+          <a:xfrm>
+            <a:off x="1561356" y="1516715"/>
+            <a:ext cx="360000" cy="360000"/>
+          </a:xfrm>
+          <a:prstGeom prst="rect">
+            <a:avLst/>
+          </a:prstGeom>
+        </p:spPr>
+        <p:style>
+          <a:lnRef idx="2">
+            <a:schemeClr val="accent1"/>
+          </a:lnRef>
+          <a:fillRef idx="1">
+            <a:schemeClr val="lt1"/>
+          </a:fillRef>
+          <a:effectRef idx="0">
+            <a:schemeClr val="accent1"/>
+          </a:effectRef>
+          <a:fontRef idx="minor">
+            <a:schemeClr val="dk1"/>
+          </a:fontRef>
+        </p:style>
+        <p:txBody>
+          <a:bodyPr rtlCol="0" anchor="ctr"/>
+          <a:lstStyle/>
+          <a:p>
+            <a:pPr algn="ctr"/>
+            <a:r>
+              <a:rPr lang="en-US" altLang="zh-CN" dirty="0"/>
+              <a:t>0</a:t>
+            </a:r>
+            <a:endParaRPr lang="zh-CN" altLang="en-US" dirty="0"/>
+          </a:p>
+        </p:txBody>
+      </p:sp>
+      <p:cxnSp>
+        <p:nvCxnSpPr>
+          <p:cNvPr id="9" name="直接箭头连接符 8"/>
+          <p:cNvCxnSpPr/>
+          <p:nvPr/>
+        </p:nvCxnSpPr>
+        <p:spPr>
+          <a:xfrm>
+            <a:off x="733356" y="689159"/>
+            <a:ext cx="216000" cy="216000"/>
+          </a:xfrm>
+          <a:prstGeom prst="straightConnector1">
+            <a:avLst/>
+          </a:prstGeom>
+          <a:ln w="12700">
+            <a:solidFill>
+              <a:schemeClr val="tx1"/>
+            </a:solidFill>
+            <a:tailEnd type="triangle"/>
+          </a:ln>
+        </p:spPr>
+        <p:style>
+          <a:lnRef idx="1">
+            <a:schemeClr val="accent1"/>
+          </a:lnRef>
+          <a:fillRef idx="0">
+            <a:schemeClr val="accent1"/>
+          </a:fillRef>
+          <a:effectRef idx="0">
+            <a:schemeClr val="accent1"/>
+          </a:effectRef>
+          <a:fontRef idx="minor">
+            <a:schemeClr val="tx1"/>
+          </a:fontRef>
+        </p:style>
+      </p:cxnSp>
+    </p:spTree>
+    <p:extLst>
+      <p:ext uri="{BB962C8B-B14F-4D97-AF65-F5344CB8AC3E}">
+        <p14:creationId xmlns:p14="http://schemas.microsoft.com/office/powerpoint/2010/main" val="2961236058"/>
+      </p:ext>
+    </p:extLst>
+  </p:cSld>
+  <p:clrMapOvr>
+    <a:masterClrMapping/>
+  </p:clrMapOvr>
+</p:sld>
+</file>
+
+<file path=ppt/slides/slide6.xml><?xml version="1.0" encoding="utf-8"?>
+<p:sld xmlns:a="http://schemas.openxmlformats.org/drawingml/2006/main" xmlns:r="http://schemas.openxmlformats.org/officeDocument/2006/relationships" xmlns:p="http://schemas.openxmlformats.org/presentationml/2006/main">
+  <p:cSld>
+    <p:spTree>
+      <p:nvGrpSpPr>
+        <p:cNvPr id="1" name=""/>
+        <p:cNvGrpSpPr/>
+        <p:nvPr/>
+      </p:nvGrpSpPr>
+      <p:grpSpPr>
+        <a:xfrm>
+          <a:off x="0" y="0"/>
+          <a:ext cx="0" cy="0"/>
+          <a:chOff x="0" y="0"/>
+          <a:chExt cx="0" cy="0"/>
+        </a:xfrm>
+      </p:grpSpPr>
+      <p:sp>
+        <p:nvSpPr>
+          <p:cNvPr id="4" name="矩形 3"/>
+          <p:cNvSpPr/>
+          <p:nvPr/>
+        </p:nvSpPr>
+        <p:spPr>
+          <a:xfrm>
+            <a:off x="481356" y="437159"/>
+            <a:ext cx="360000" cy="360000"/>
+          </a:xfrm>
+          <a:prstGeom prst="rect">
+            <a:avLst/>
+          </a:prstGeom>
+        </p:spPr>
+        <p:style>
+          <a:lnRef idx="2">
+            <a:schemeClr val="accent1"/>
+          </a:lnRef>
+          <a:fillRef idx="1">
+            <a:schemeClr val="lt1"/>
+          </a:fillRef>
+          <a:effectRef idx="0">
+            <a:schemeClr val="accent1"/>
+          </a:effectRef>
+          <a:fontRef idx="minor">
+            <a:schemeClr val="dk1"/>
+          </a:fontRef>
+        </p:style>
+        <p:txBody>
+          <a:bodyPr rtlCol="0" anchor="ctr"/>
+          <a:lstStyle/>
+          <a:p>
+            <a:pPr algn="ctr"/>
+            <a:r>
+              <a:rPr lang="en-US" altLang="zh-CN" dirty="0"/>
+              <a:t>1</a:t>
+            </a:r>
+            <a:endParaRPr lang="zh-CN" altLang="en-US" dirty="0"/>
+          </a:p>
+        </p:txBody>
+      </p:sp>
+      <p:sp>
+        <p:nvSpPr>
+          <p:cNvPr id="5" name="矩形 4"/>
+          <p:cNvSpPr/>
+          <p:nvPr/>
+        </p:nvSpPr>
+        <p:spPr>
+          <a:xfrm>
+            <a:off x="841356" y="437159"/>
+            <a:ext cx="360000" cy="360000"/>
+          </a:xfrm>
+          <a:prstGeom prst="rect">
+            <a:avLst/>
+          </a:prstGeom>
+        </p:spPr>
+        <p:style>
+          <a:lnRef idx="2">
+            <a:schemeClr val="accent1"/>
+          </a:lnRef>
+          <a:fillRef idx="1">
+            <a:schemeClr val="lt1"/>
+          </a:fillRef>
+          <a:effectRef idx="0">
+            <a:schemeClr val="accent1"/>
+          </a:effectRef>
+          <a:fontRef idx="minor">
+            <a:schemeClr val="dk1"/>
+          </a:fontRef>
+        </p:style>
+        <p:txBody>
+          <a:bodyPr rtlCol="0" anchor="ctr"/>
+          <a:lstStyle/>
+          <a:p>
+            <a:pPr algn="ctr"/>
+            <a:r>
+              <a:rPr lang="en-US" altLang="zh-CN" dirty="0"/>
+              <a:t>0</a:t>
+            </a:r>
+            <a:endParaRPr lang="zh-CN" altLang="en-US" dirty="0"/>
+          </a:p>
+        </p:txBody>
+      </p:sp>
+      <p:sp>
+        <p:nvSpPr>
+          <p:cNvPr id="6" name="矩形 5"/>
+          <p:cNvSpPr/>
+          <p:nvPr/>
+        </p:nvSpPr>
+        <p:spPr>
+          <a:xfrm>
+            <a:off x="1201356" y="437159"/>
+            <a:ext cx="360000" cy="360000"/>
+          </a:xfrm>
+          <a:prstGeom prst="rect">
+            <a:avLst/>
+          </a:prstGeom>
+        </p:spPr>
+        <p:style>
+          <a:lnRef idx="2">
+            <a:schemeClr val="accent1"/>
+          </a:lnRef>
+          <a:fillRef idx="1">
+            <a:schemeClr val="lt1"/>
+          </a:fillRef>
+          <a:effectRef idx="0">
+            <a:schemeClr val="accent1"/>
+          </a:effectRef>
+          <a:fontRef idx="minor">
+            <a:schemeClr val="dk1"/>
+          </a:fontRef>
+        </p:style>
+        <p:txBody>
+          <a:bodyPr rtlCol="0" anchor="ctr"/>
+          <a:lstStyle/>
+          <a:p>
+            <a:pPr algn="ctr"/>
+            <a:r>
+              <a:rPr lang="en-US" altLang="zh-CN" dirty="0"/>
+              <a:t>0</a:t>
+            </a:r>
+            <a:endParaRPr lang="zh-CN" altLang="en-US" dirty="0"/>
+          </a:p>
+        </p:txBody>
+      </p:sp>
+      <p:sp>
+        <p:nvSpPr>
+          <p:cNvPr id="7" name="矩形 6"/>
+          <p:cNvSpPr/>
+          <p:nvPr/>
+        </p:nvSpPr>
+        <p:spPr>
+          <a:xfrm>
+            <a:off x="1561356" y="437159"/>
+            <a:ext cx="360000" cy="360000"/>
+          </a:xfrm>
+          <a:prstGeom prst="rect">
+            <a:avLst/>
+          </a:prstGeom>
+        </p:spPr>
+        <p:style>
+          <a:lnRef idx="2">
+            <a:schemeClr val="accent1"/>
+          </a:lnRef>
+          <a:fillRef idx="1">
+            <a:schemeClr val="lt1"/>
+          </a:fillRef>
+          <a:effectRef idx="0">
+            <a:schemeClr val="accent1"/>
+          </a:effectRef>
+          <a:fontRef idx="minor">
+            <a:schemeClr val="dk1"/>
+          </a:fontRef>
+        </p:style>
+        <p:txBody>
+          <a:bodyPr rtlCol="0" anchor="ctr"/>
+          <a:lstStyle/>
+          <a:p>
+            <a:pPr algn="ctr"/>
+            <a:r>
+              <a:rPr lang="en-US" altLang="zh-CN" dirty="0"/>
+              <a:t>0</a:t>
+            </a:r>
+            <a:endParaRPr lang="zh-CN" altLang="en-US" dirty="0"/>
+          </a:p>
+        </p:txBody>
+      </p:sp>
+      <p:sp>
+        <p:nvSpPr>
+          <p:cNvPr id="11" name="矩形 10"/>
+          <p:cNvSpPr/>
+          <p:nvPr/>
+        </p:nvSpPr>
+        <p:spPr>
+          <a:xfrm>
+            <a:off x="841356" y="76221"/>
+            <a:ext cx="360000" cy="360000"/>
+          </a:xfrm>
+          <a:prstGeom prst="rect">
+            <a:avLst/>
+          </a:prstGeom>
+          <a:ln>
+            <a:noFill/>
+          </a:ln>
+        </p:spPr>
+        <p:style>
+          <a:lnRef idx="2">
+            <a:schemeClr val="accent1"/>
+          </a:lnRef>
+          <a:fillRef idx="1">
+            <a:schemeClr val="lt1"/>
+          </a:fillRef>
+          <a:effectRef idx="0">
+            <a:schemeClr val="accent1"/>
+          </a:effectRef>
+          <a:fontRef idx="minor">
+            <a:schemeClr val="dk1"/>
+          </a:fontRef>
+        </p:style>
+        <p:txBody>
+          <a:bodyPr rtlCol="0" anchor="ctr"/>
+          <a:lstStyle/>
+          <a:p>
+            <a:pPr algn="ctr"/>
+            <a:r>
+              <a:rPr lang="en-US" altLang="zh-CN" dirty="0"/>
+              <a:t>a</a:t>
+            </a:r>
+            <a:endParaRPr lang="zh-CN" altLang="en-US" dirty="0"/>
+          </a:p>
+        </p:txBody>
+      </p:sp>
+      <p:sp>
+        <p:nvSpPr>
+          <p:cNvPr id="12" name="矩形 11"/>
+          <p:cNvSpPr/>
+          <p:nvPr/>
+        </p:nvSpPr>
+        <p:spPr>
+          <a:xfrm>
+            <a:off x="1201356" y="76221"/>
+            <a:ext cx="360000" cy="360000"/>
+          </a:xfrm>
+          <a:prstGeom prst="rect">
+            <a:avLst/>
+          </a:prstGeom>
+          <a:ln>
+            <a:noFill/>
+          </a:ln>
+        </p:spPr>
+        <p:style>
+          <a:lnRef idx="2">
+            <a:schemeClr val="accent1"/>
+          </a:lnRef>
+          <a:fillRef idx="1">
+            <a:schemeClr val="lt1"/>
+          </a:fillRef>
+          <a:effectRef idx="0">
+            <a:schemeClr val="accent1"/>
+          </a:effectRef>
+          <a:fontRef idx="minor">
+            <a:schemeClr val="dk1"/>
+          </a:fontRef>
+        </p:style>
+        <p:txBody>
+          <a:bodyPr rtlCol="0" anchor="ctr"/>
+          <a:lstStyle/>
+          <a:p>
+            <a:pPr algn="ctr"/>
+            <a:r>
+              <a:rPr lang="en-US" altLang="zh-CN" dirty="0"/>
+              <a:t>a</a:t>
+            </a:r>
+            <a:endParaRPr lang="zh-CN" altLang="en-US" dirty="0"/>
+          </a:p>
+        </p:txBody>
+      </p:sp>
+      <p:sp>
+        <p:nvSpPr>
+          <p:cNvPr id="13" name="矩形 12"/>
+          <p:cNvSpPr/>
+          <p:nvPr/>
+        </p:nvSpPr>
+        <p:spPr>
+          <a:xfrm>
+            <a:off x="1561356" y="76221"/>
+            <a:ext cx="360000" cy="360000"/>
+          </a:xfrm>
+          <a:prstGeom prst="rect">
+            <a:avLst/>
+          </a:prstGeom>
+          <a:ln>
+            <a:noFill/>
+          </a:ln>
+        </p:spPr>
+        <p:style>
+          <a:lnRef idx="2">
+            <a:schemeClr val="accent1"/>
+          </a:lnRef>
+          <a:fillRef idx="1">
+            <a:schemeClr val="lt1"/>
+          </a:fillRef>
+          <a:effectRef idx="0">
+            <a:schemeClr val="accent1"/>
+          </a:effectRef>
+          <a:fontRef idx="minor">
+            <a:schemeClr val="dk1"/>
+          </a:fontRef>
+        </p:style>
+        <p:txBody>
+          <a:bodyPr rtlCol="0" anchor="ctr"/>
+          <a:lstStyle/>
+          <a:p>
+            <a:pPr algn="ctr"/>
+            <a:r>
+              <a:rPr lang="en-US" altLang="zh-CN" dirty="0"/>
+              <a:t>c</a:t>
+            </a:r>
+            <a:endParaRPr lang="zh-CN" altLang="en-US" dirty="0"/>
+          </a:p>
+        </p:txBody>
+      </p:sp>
+      <p:sp>
+        <p:nvSpPr>
+          <p:cNvPr id="19" name="矩形 18"/>
+          <p:cNvSpPr/>
+          <p:nvPr/>
+        </p:nvSpPr>
+        <p:spPr>
+          <a:xfrm>
+            <a:off x="481356" y="793969"/>
+            <a:ext cx="360000" cy="360000"/>
+          </a:xfrm>
+          <a:prstGeom prst="rect">
+            <a:avLst/>
+          </a:prstGeom>
+        </p:spPr>
+        <p:style>
+          <a:lnRef idx="2">
+            <a:schemeClr val="accent1"/>
+          </a:lnRef>
+          <a:fillRef idx="1">
+            <a:schemeClr val="lt1"/>
+          </a:fillRef>
+          <a:effectRef idx="0">
+            <a:schemeClr val="accent1"/>
+          </a:effectRef>
+          <a:fontRef idx="minor">
+            <a:schemeClr val="dk1"/>
+          </a:fontRef>
+        </p:style>
+        <p:txBody>
+          <a:bodyPr rtlCol="0" anchor="ctr"/>
+          <a:lstStyle/>
+          <a:p>
+            <a:pPr algn="ctr"/>
+            <a:r>
+              <a:rPr lang="en-US" altLang="zh-CN" dirty="0"/>
+              <a:t>0</a:t>
+            </a:r>
+            <a:endParaRPr lang="zh-CN" altLang="en-US" dirty="0"/>
+          </a:p>
+        </p:txBody>
+      </p:sp>
+      <p:sp>
+        <p:nvSpPr>
+          <p:cNvPr id="20" name="矩形 19"/>
+          <p:cNvSpPr/>
+          <p:nvPr/>
+        </p:nvSpPr>
+        <p:spPr>
+          <a:xfrm>
+            <a:off x="841356" y="793969"/>
+            <a:ext cx="360000" cy="360000"/>
+          </a:xfrm>
+          <a:prstGeom prst="rect">
+            <a:avLst/>
+          </a:prstGeom>
         </p:spPr>
         <p:style>
           <a:lnRef idx="2">
@@ -9861,7 +13108,7 @@
 </p:sld>
 </file>
 
-<file path=ppt/slides/slide6.xml><?xml version="1.0" encoding="utf-8"?>
+<file path=ppt/slides/slide7.xml><?xml version="1.0" encoding="utf-8"?>
 <p:sld xmlns:a="http://schemas.openxmlformats.org/drawingml/2006/main" xmlns:r="http://schemas.openxmlformats.org/officeDocument/2006/relationships" xmlns:p="http://schemas.openxmlformats.org/presentationml/2006/main">
   <p:cSld>
     <p:spTree>

</xml_diff>

<commit_message>
[#10 Regular Expression Matching] Update 010_RegularExpressionMatching_DynamicProgramming01.png.
</commit_message>
<xml_diff>
--- a/Resources/010_RegularExpressionMatching_DynamicProgramming.pptx
+++ b/Resources/010_RegularExpressionMatching_DynamicProgramming.pptx
@@ -9132,6 +9132,186 @@
           </a:fontRef>
         </p:style>
       </p:cxnSp>
+      <p:cxnSp>
+        <p:nvCxnSpPr>
+          <p:cNvPr id="178" name="直接箭头连接符 177"/>
+          <p:cNvCxnSpPr/>
+          <p:nvPr/>
+        </p:nvCxnSpPr>
+        <p:spPr>
+          <a:xfrm>
+            <a:off x="5053356" y="1055443"/>
+            <a:ext cx="216000" cy="216000"/>
+          </a:xfrm>
+          <a:prstGeom prst="straightConnector1">
+            <a:avLst/>
+          </a:prstGeom>
+          <a:ln w="12700">
+            <a:solidFill>
+              <a:schemeClr val="tx1"/>
+            </a:solidFill>
+            <a:tailEnd type="triangle"/>
+          </a:ln>
+        </p:spPr>
+        <p:style>
+          <a:lnRef idx="1">
+            <a:schemeClr val="accent1"/>
+          </a:lnRef>
+          <a:fillRef idx="0">
+            <a:schemeClr val="accent1"/>
+          </a:fillRef>
+          <a:effectRef idx="0">
+            <a:schemeClr val="accent1"/>
+          </a:effectRef>
+          <a:fontRef idx="minor">
+            <a:schemeClr val="tx1"/>
+          </a:fontRef>
+        </p:style>
+      </p:cxnSp>
+      <p:cxnSp>
+        <p:nvCxnSpPr>
+          <p:cNvPr id="179" name="直接箭头连接符 178"/>
+          <p:cNvCxnSpPr/>
+          <p:nvPr/>
+        </p:nvCxnSpPr>
+        <p:spPr>
+          <a:xfrm>
+            <a:off x="5413356" y="1061144"/>
+            <a:ext cx="216000" cy="216000"/>
+          </a:xfrm>
+          <a:prstGeom prst="straightConnector1">
+            <a:avLst/>
+          </a:prstGeom>
+          <a:ln w="12700">
+            <a:solidFill>
+              <a:schemeClr val="tx1"/>
+            </a:solidFill>
+            <a:tailEnd type="triangle"/>
+          </a:ln>
+        </p:spPr>
+        <p:style>
+          <a:lnRef idx="1">
+            <a:schemeClr val="accent1"/>
+          </a:lnRef>
+          <a:fillRef idx="0">
+            <a:schemeClr val="accent1"/>
+          </a:fillRef>
+          <a:effectRef idx="0">
+            <a:schemeClr val="accent1"/>
+          </a:effectRef>
+          <a:fontRef idx="minor">
+            <a:schemeClr val="tx1"/>
+          </a:fontRef>
+        </p:style>
+      </p:cxnSp>
+      <p:cxnSp>
+        <p:nvCxnSpPr>
+          <p:cNvPr id="180" name="直接箭头连接符 179"/>
+          <p:cNvCxnSpPr/>
+          <p:nvPr/>
+        </p:nvCxnSpPr>
+        <p:spPr>
+          <a:xfrm>
+            <a:off x="5773356" y="1063101"/>
+            <a:ext cx="216000" cy="216000"/>
+          </a:xfrm>
+          <a:prstGeom prst="straightConnector1">
+            <a:avLst/>
+          </a:prstGeom>
+          <a:ln w="12700">
+            <a:solidFill>
+              <a:schemeClr val="tx1"/>
+            </a:solidFill>
+            <a:tailEnd type="triangle"/>
+          </a:ln>
+        </p:spPr>
+        <p:style>
+          <a:lnRef idx="1">
+            <a:schemeClr val="accent1"/>
+          </a:lnRef>
+          <a:fillRef idx="0">
+            <a:schemeClr val="accent1"/>
+          </a:fillRef>
+          <a:effectRef idx="0">
+            <a:schemeClr val="accent1"/>
+          </a:effectRef>
+          <a:fontRef idx="minor">
+            <a:schemeClr val="tx1"/>
+          </a:fontRef>
+        </p:style>
+      </p:cxnSp>
+      <p:cxnSp>
+        <p:nvCxnSpPr>
+          <p:cNvPr id="181" name="直接箭头连接符 180"/>
+          <p:cNvCxnSpPr/>
+          <p:nvPr/>
+        </p:nvCxnSpPr>
+        <p:spPr>
+          <a:xfrm>
+            <a:off x="6133356" y="1060440"/>
+            <a:ext cx="216000" cy="216000"/>
+          </a:xfrm>
+          <a:prstGeom prst="straightConnector1">
+            <a:avLst/>
+          </a:prstGeom>
+          <a:ln w="12700">
+            <a:solidFill>
+              <a:schemeClr val="tx1"/>
+            </a:solidFill>
+            <a:tailEnd type="triangle"/>
+          </a:ln>
+        </p:spPr>
+        <p:style>
+          <a:lnRef idx="1">
+            <a:schemeClr val="accent1"/>
+          </a:lnRef>
+          <a:fillRef idx="0">
+            <a:schemeClr val="accent1"/>
+          </a:fillRef>
+          <a:effectRef idx="0">
+            <a:schemeClr val="accent1"/>
+          </a:effectRef>
+          <a:fontRef idx="minor">
+            <a:schemeClr val="tx1"/>
+          </a:fontRef>
+        </p:style>
+      </p:cxnSp>
+      <p:cxnSp>
+        <p:nvCxnSpPr>
+          <p:cNvPr id="182" name="直接箭头连接符 181"/>
+          <p:cNvCxnSpPr/>
+          <p:nvPr/>
+        </p:nvCxnSpPr>
+        <p:spPr>
+          <a:xfrm>
+            <a:off x="6493356" y="1062397"/>
+            <a:ext cx="216000" cy="216000"/>
+          </a:xfrm>
+          <a:prstGeom prst="straightConnector1">
+            <a:avLst/>
+          </a:prstGeom>
+          <a:ln w="12700">
+            <a:solidFill>
+              <a:schemeClr val="tx1"/>
+            </a:solidFill>
+            <a:tailEnd type="triangle"/>
+          </a:ln>
+        </p:spPr>
+        <p:style>
+          <a:lnRef idx="1">
+            <a:schemeClr val="accent1"/>
+          </a:lnRef>
+          <a:fillRef idx="0">
+            <a:schemeClr val="accent1"/>
+          </a:fillRef>
+          <a:effectRef idx="0">
+            <a:schemeClr val="accent1"/>
+          </a:effectRef>
+          <a:fontRef idx="minor">
+            <a:schemeClr val="tx1"/>
+          </a:fontRef>
+        </p:style>
+      </p:cxnSp>
     </p:spTree>
     <p:extLst>
       <p:ext uri="{BB962C8B-B14F-4D97-AF65-F5344CB8AC3E}">

</xml_diff>

<commit_message>
[#10 Regular Expression Matching] Add 010_RegularExpressionMatching_DynamicProgramming03.png.
</commit_message>
<xml_diff>
--- a/Resources/010_RegularExpressionMatching_DynamicProgramming.pptx
+++ b/Resources/010_RegularExpressionMatching_DynamicProgramming.pptx
@@ -16,6 +16,7 @@
     <p:sldId id="380" r:id="rId10"/>
     <p:sldId id="381" r:id="rId11"/>
     <p:sldId id="382" r:id="rId12"/>
+    <p:sldId id="383" r:id="rId13"/>
   </p:sldIdLst>
   <p:sldSz cx="12192000" cy="6858000"/>
   <p:notesSz cx="6858000" cy="9144000"/>
@@ -253,7 +254,7 @@
           <a:p>
             <a:fld id="{E27CD909-5952-48F8-A19C-6F1FFF2EAE97}" type="datetimeFigureOut">
               <a:rPr lang="zh-CN" altLang="en-US" smtClean="0"/>
-              <a:t>2017/7/1</a:t>
+              <a:t>2017/7/5</a:t>
             </a:fld>
             <a:endParaRPr lang="zh-CN" altLang="en-US"/>
           </a:p>
@@ -423,7 +424,7 @@
           <a:p>
             <a:fld id="{E27CD909-5952-48F8-A19C-6F1FFF2EAE97}" type="datetimeFigureOut">
               <a:rPr lang="zh-CN" altLang="en-US" smtClean="0"/>
-              <a:t>2017/7/1</a:t>
+              <a:t>2017/7/5</a:t>
             </a:fld>
             <a:endParaRPr lang="zh-CN" altLang="en-US"/>
           </a:p>
@@ -603,7 +604,7 @@
           <a:p>
             <a:fld id="{E27CD909-5952-48F8-A19C-6F1FFF2EAE97}" type="datetimeFigureOut">
               <a:rPr lang="zh-CN" altLang="en-US" smtClean="0"/>
-              <a:t>2017/7/1</a:t>
+              <a:t>2017/7/5</a:t>
             </a:fld>
             <a:endParaRPr lang="zh-CN" altLang="en-US"/>
           </a:p>
@@ -773,7 +774,7 @@
           <a:p>
             <a:fld id="{E27CD909-5952-48F8-A19C-6F1FFF2EAE97}" type="datetimeFigureOut">
               <a:rPr lang="zh-CN" altLang="en-US" smtClean="0"/>
-              <a:t>2017/7/1</a:t>
+              <a:t>2017/7/5</a:t>
             </a:fld>
             <a:endParaRPr lang="zh-CN" altLang="en-US"/>
           </a:p>
@@ -1019,7 +1020,7 @@
           <a:p>
             <a:fld id="{E27CD909-5952-48F8-A19C-6F1FFF2EAE97}" type="datetimeFigureOut">
               <a:rPr lang="zh-CN" altLang="en-US" smtClean="0"/>
-              <a:t>2017/7/1</a:t>
+              <a:t>2017/7/5</a:t>
             </a:fld>
             <a:endParaRPr lang="zh-CN" altLang="en-US"/>
           </a:p>
@@ -1251,7 +1252,7 @@
           <a:p>
             <a:fld id="{E27CD909-5952-48F8-A19C-6F1FFF2EAE97}" type="datetimeFigureOut">
               <a:rPr lang="zh-CN" altLang="en-US" smtClean="0"/>
-              <a:t>2017/7/1</a:t>
+              <a:t>2017/7/5</a:t>
             </a:fld>
             <a:endParaRPr lang="zh-CN" altLang="en-US"/>
           </a:p>
@@ -1618,7 +1619,7 @@
           <a:p>
             <a:fld id="{E27CD909-5952-48F8-A19C-6F1FFF2EAE97}" type="datetimeFigureOut">
               <a:rPr lang="zh-CN" altLang="en-US" smtClean="0"/>
-              <a:t>2017/7/1</a:t>
+              <a:t>2017/7/5</a:t>
             </a:fld>
             <a:endParaRPr lang="zh-CN" altLang="en-US"/>
           </a:p>
@@ -1736,7 +1737,7 @@
           <a:p>
             <a:fld id="{E27CD909-5952-48F8-A19C-6F1FFF2EAE97}" type="datetimeFigureOut">
               <a:rPr lang="zh-CN" altLang="en-US" smtClean="0"/>
-              <a:t>2017/7/1</a:t>
+              <a:t>2017/7/5</a:t>
             </a:fld>
             <a:endParaRPr lang="zh-CN" altLang="en-US"/>
           </a:p>
@@ -1831,7 +1832,7 @@
           <a:p>
             <a:fld id="{E27CD909-5952-48F8-A19C-6F1FFF2EAE97}" type="datetimeFigureOut">
               <a:rPr lang="zh-CN" altLang="en-US" smtClean="0"/>
-              <a:t>2017/7/1</a:t>
+              <a:t>2017/7/5</a:t>
             </a:fld>
             <a:endParaRPr lang="zh-CN" altLang="en-US"/>
           </a:p>
@@ -2108,7 +2109,7 @@
           <a:p>
             <a:fld id="{E27CD909-5952-48F8-A19C-6F1FFF2EAE97}" type="datetimeFigureOut">
               <a:rPr lang="zh-CN" altLang="en-US" smtClean="0"/>
-              <a:t>2017/7/1</a:t>
+              <a:t>2017/7/5</a:t>
             </a:fld>
             <a:endParaRPr lang="zh-CN" altLang="en-US"/>
           </a:p>
@@ -2361,7 +2362,7 @@
           <a:p>
             <a:fld id="{E27CD909-5952-48F8-A19C-6F1FFF2EAE97}" type="datetimeFigureOut">
               <a:rPr lang="zh-CN" altLang="en-US" smtClean="0"/>
-              <a:t>2017/7/1</a:t>
+              <a:t>2017/7/5</a:t>
             </a:fld>
             <a:endParaRPr lang="zh-CN" altLang="en-US"/>
           </a:p>
@@ -2574,7 +2575,7 @@
           <a:p>
             <a:fld id="{E27CD909-5952-48F8-A19C-6F1FFF2EAE97}" type="datetimeFigureOut">
               <a:rPr lang="zh-CN" altLang="en-US" smtClean="0"/>
-              <a:t>2017/7/1</a:t>
+              <a:t>2017/7/5</a:t>
             </a:fld>
             <a:endParaRPr lang="zh-CN" altLang="en-US"/>
           </a:p>
@@ -10669,6 +10670,2841 @@
 </p:sld>
 </file>
 
+<file path=ppt/slides/slide12.xml><?xml version="1.0" encoding="utf-8"?>
+<p:sld xmlns:a="http://schemas.openxmlformats.org/drawingml/2006/main" xmlns:r="http://schemas.openxmlformats.org/officeDocument/2006/relationships" xmlns:p="http://schemas.openxmlformats.org/presentationml/2006/main">
+  <p:cSld>
+    <p:spTree>
+      <p:nvGrpSpPr>
+        <p:cNvPr id="1" name=""/>
+        <p:cNvGrpSpPr/>
+        <p:nvPr/>
+      </p:nvGrpSpPr>
+      <p:grpSpPr>
+        <a:xfrm>
+          <a:off x="0" y="0"/>
+          <a:ext cx="0" cy="0"/>
+          <a:chOff x="0" y="0"/>
+          <a:chExt cx="0" cy="0"/>
+        </a:xfrm>
+      </p:grpSpPr>
+      <p:sp>
+        <p:nvSpPr>
+          <p:cNvPr id="4" name="矩形 3"/>
+          <p:cNvSpPr/>
+          <p:nvPr/>
+        </p:nvSpPr>
+        <p:spPr>
+          <a:xfrm>
+            <a:off x="481356" y="437159"/>
+            <a:ext cx="360000" cy="360000"/>
+          </a:xfrm>
+          <a:prstGeom prst="rect">
+            <a:avLst/>
+          </a:prstGeom>
+          <a:solidFill>
+            <a:srgbClr val="00B0F0"/>
+          </a:solidFill>
+        </p:spPr>
+        <p:style>
+          <a:lnRef idx="2">
+            <a:schemeClr val="accent1"/>
+          </a:lnRef>
+          <a:fillRef idx="1">
+            <a:schemeClr val="lt1"/>
+          </a:fillRef>
+          <a:effectRef idx="0">
+            <a:schemeClr val="accent1"/>
+          </a:effectRef>
+          <a:fontRef idx="minor">
+            <a:schemeClr val="dk1"/>
+          </a:fontRef>
+        </p:style>
+        <p:txBody>
+          <a:bodyPr rtlCol="0" anchor="ctr"/>
+          <a:lstStyle/>
+          <a:p>
+            <a:pPr algn="ctr"/>
+            <a:r>
+              <a:rPr lang="en-US" altLang="zh-CN" dirty="0"/>
+              <a:t>1</a:t>
+            </a:r>
+            <a:endParaRPr lang="zh-CN" altLang="en-US" dirty="0"/>
+          </a:p>
+        </p:txBody>
+      </p:sp>
+      <p:sp>
+        <p:nvSpPr>
+          <p:cNvPr id="5" name="矩形 4"/>
+          <p:cNvSpPr/>
+          <p:nvPr/>
+        </p:nvSpPr>
+        <p:spPr>
+          <a:xfrm>
+            <a:off x="841356" y="437159"/>
+            <a:ext cx="360000" cy="360000"/>
+          </a:xfrm>
+          <a:prstGeom prst="rect">
+            <a:avLst/>
+          </a:prstGeom>
+        </p:spPr>
+        <p:style>
+          <a:lnRef idx="2">
+            <a:schemeClr val="accent1"/>
+          </a:lnRef>
+          <a:fillRef idx="1">
+            <a:schemeClr val="lt1"/>
+          </a:fillRef>
+          <a:effectRef idx="0">
+            <a:schemeClr val="accent1"/>
+          </a:effectRef>
+          <a:fontRef idx="minor">
+            <a:schemeClr val="dk1"/>
+          </a:fontRef>
+        </p:style>
+        <p:txBody>
+          <a:bodyPr rtlCol="0" anchor="ctr"/>
+          <a:lstStyle/>
+          <a:p>
+            <a:pPr algn="ctr"/>
+            <a:r>
+              <a:rPr lang="en-US" altLang="zh-CN" dirty="0"/>
+              <a:t>0</a:t>
+            </a:r>
+            <a:endParaRPr lang="zh-CN" altLang="en-US" dirty="0"/>
+          </a:p>
+        </p:txBody>
+      </p:sp>
+      <p:sp>
+        <p:nvSpPr>
+          <p:cNvPr id="6" name="矩形 5"/>
+          <p:cNvSpPr/>
+          <p:nvPr/>
+        </p:nvSpPr>
+        <p:spPr>
+          <a:xfrm>
+            <a:off x="1201356" y="437159"/>
+            <a:ext cx="360000" cy="360000"/>
+          </a:xfrm>
+          <a:prstGeom prst="rect">
+            <a:avLst/>
+          </a:prstGeom>
+        </p:spPr>
+        <p:style>
+          <a:lnRef idx="2">
+            <a:schemeClr val="accent1"/>
+          </a:lnRef>
+          <a:fillRef idx="1">
+            <a:schemeClr val="lt1"/>
+          </a:fillRef>
+          <a:effectRef idx="0">
+            <a:schemeClr val="accent1"/>
+          </a:effectRef>
+          <a:fontRef idx="minor">
+            <a:schemeClr val="dk1"/>
+          </a:fontRef>
+        </p:style>
+        <p:txBody>
+          <a:bodyPr rtlCol="0" anchor="ctr"/>
+          <a:lstStyle/>
+          <a:p>
+            <a:pPr algn="ctr"/>
+            <a:r>
+              <a:rPr lang="en-US" altLang="zh-CN" dirty="0"/>
+              <a:t>0</a:t>
+            </a:r>
+            <a:endParaRPr lang="zh-CN" altLang="en-US" dirty="0"/>
+          </a:p>
+        </p:txBody>
+      </p:sp>
+      <p:sp>
+        <p:nvSpPr>
+          <p:cNvPr id="11" name="矩形 10"/>
+          <p:cNvSpPr/>
+          <p:nvPr/>
+        </p:nvSpPr>
+        <p:spPr>
+          <a:xfrm>
+            <a:off x="841356" y="76221"/>
+            <a:ext cx="360000" cy="360000"/>
+          </a:xfrm>
+          <a:prstGeom prst="rect">
+            <a:avLst/>
+          </a:prstGeom>
+          <a:ln>
+            <a:noFill/>
+          </a:ln>
+        </p:spPr>
+        <p:style>
+          <a:lnRef idx="2">
+            <a:schemeClr val="accent1"/>
+          </a:lnRef>
+          <a:fillRef idx="1">
+            <a:schemeClr val="lt1"/>
+          </a:fillRef>
+          <a:effectRef idx="0">
+            <a:schemeClr val="accent1"/>
+          </a:effectRef>
+          <a:fontRef idx="minor">
+            <a:schemeClr val="dk1"/>
+          </a:fontRef>
+        </p:style>
+        <p:txBody>
+          <a:bodyPr rtlCol="0" anchor="ctr"/>
+          <a:lstStyle/>
+          <a:p>
+            <a:pPr algn="ctr"/>
+            <a:r>
+              <a:rPr lang="en-US" altLang="zh-CN" dirty="0"/>
+              <a:t>a</a:t>
+            </a:r>
+            <a:endParaRPr lang="zh-CN" altLang="en-US" dirty="0"/>
+          </a:p>
+        </p:txBody>
+      </p:sp>
+      <p:sp>
+        <p:nvSpPr>
+          <p:cNvPr id="12" name="矩形 11"/>
+          <p:cNvSpPr/>
+          <p:nvPr/>
+        </p:nvSpPr>
+        <p:spPr>
+          <a:xfrm>
+            <a:off x="1201356" y="76221"/>
+            <a:ext cx="360000" cy="360000"/>
+          </a:xfrm>
+          <a:prstGeom prst="rect">
+            <a:avLst/>
+          </a:prstGeom>
+          <a:ln>
+            <a:noFill/>
+          </a:ln>
+        </p:spPr>
+        <p:style>
+          <a:lnRef idx="2">
+            <a:schemeClr val="accent1"/>
+          </a:lnRef>
+          <a:fillRef idx="1">
+            <a:schemeClr val="lt1"/>
+          </a:fillRef>
+          <a:effectRef idx="0">
+            <a:schemeClr val="accent1"/>
+          </a:effectRef>
+          <a:fontRef idx="minor">
+            <a:schemeClr val="dk1"/>
+          </a:fontRef>
+        </p:style>
+        <p:txBody>
+          <a:bodyPr rtlCol="0" anchor="ctr"/>
+          <a:lstStyle/>
+          <a:p>
+            <a:pPr algn="ctr"/>
+            <a:r>
+              <a:rPr lang="en-US" altLang="zh-CN" dirty="0" smtClean="0"/>
+              <a:t>a</a:t>
+            </a:r>
+            <a:endParaRPr lang="zh-CN" altLang="en-US" dirty="0"/>
+          </a:p>
+        </p:txBody>
+      </p:sp>
+      <p:sp>
+        <p:nvSpPr>
+          <p:cNvPr id="19" name="矩形 18"/>
+          <p:cNvSpPr/>
+          <p:nvPr/>
+        </p:nvSpPr>
+        <p:spPr>
+          <a:xfrm>
+            <a:off x="481356" y="793969"/>
+            <a:ext cx="360000" cy="360000"/>
+          </a:xfrm>
+          <a:prstGeom prst="rect">
+            <a:avLst/>
+          </a:prstGeom>
+        </p:spPr>
+        <p:style>
+          <a:lnRef idx="2">
+            <a:schemeClr val="accent1"/>
+          </a:lnRef>
+          <a:fillRef idx="1">
+            <a:schemeClr val="lt1"/>
+          </a:fillRef>
+          <a:effectRef idx="0">
+            <a:schemeClr val="accent1"/>
+          </a:effectRef>
+          <a:fontRef idx="minor">
+            <a:schemeClr val="dk1"/>
+          </a:fontRef>
+        </p:style>
+        <p:txBody>
+          <a:bodyPr rtlCol="0" anchor="ctr"/>
+          <a:lstStyle/>
+          <a:p>
+            <a:pPr algn="ctr"/>
+            <a:r>
+              <a:rPr lang="en-US" altLang="zh-CN" dirty="0"/>
+              <a:t>0</a:t>
+            </a:r>
+            <a:endParaRPr lang="zh-CN" altLang="en-US" dirty="0"/>
+          </a:p>
+        </p:txBody>
+      </p:sp>
+      <p:sp>
+        <p:nvSpPr>
+          <p:cNvPr id="20" name="矩形 19"/>
+          <p:cNvSpPr/>
+          <p:nvPr/>
+        </p:nvSpPr>
+        <p:spPr>
+          <a:xfrm>
+            <a:off x="841356" y="793969"/>
+            <a:ext cx="360000" cy="360000"/>
+          </a:xfrm>
+          <a:prstGeom prst="rect">
+            <a:avLst/>
+          </a:prstGeom>
+          <a:solidFill>
+            <a:srgbClr val="00B0F0"/>
+          </a:solidFill>
+        </p:spPr>
+        <p:style>
+          <a:lnRef idx="2">
+            <a:schemeClr val="accent1"/>
+          </a:lnRef>
+          <a:fillRef idx="1">
+            <a:schemeClr val="lt1"/>
+          </a:fillRef>
+          <a:effectRef idx="0">
+            <a:schemeClr val="accent1"/>
+          </a:effectRef>
+          <a:fontRef idx="minor">
+            <a:schemeClr val="dk1"/>
+          </a:fontRef>
+        </p:style>
+        <p:txBody>
+          <a:bodyPr rtlCol="0" anchor="ctr"/>
+          <a:lstStyle/>
+          <a:p>
+            <a:pPr algn="ctr"/>
+            <a:r>
+              <a:rPr lang="en-US" altLang="zh-CN" dirty="0"/>
+              <a:t>1</a:t>
+            </a:r>
+            <a:endParaRPr lang="zh-CN" altLang="en-US" dirty="0"/>
+          </a:p>
+        </p:txBody>
+      </p:sp>
+      <p:sp>
+        <p:nvSpPr>
+          <p:cNvPr id="21" name="矩形 20"/>
+          <p:cNvSpPr/>
+          <p:nvPr/>
+        </p:nvSpPr>
+        <p:spPr>
+          <a:xfrm>
+            <a:off x="1201356" y="793969"/>
+            <a:ext cx="360000" cy="360000"/>
+          </a:xfrm>
+          <a:prstGeom prst="rect">
+            <a:avLst/>
+          </a:prstGeom>
+          <a:solidFill>
+            <a:schemeClr val="bg1"/>
+          </a:solidFill>
+        </p:spPr>
+        <p:style>
+          <a:lnRef idx="2">
+            <a:schemeClr val="accent1"/>
+          </a:lnRef>
+          <a:fillRef idx="1">
+            <a:schemeClr val="lt1"/>
+          </a:fillRef>
+          <a:effectRef idx="0">
+            <a:schemeClr val="accent1"/>
+          </a:effectRef>
+          <a:fontRef idx="minor">
+            <a:schemeClr val="dk1"/>
+          </a:fontRef>
+        </p:style>
+        <p:txBody>
+          <a:bodyPr rtlCol="0" anchor="ctr"/>
+          <a:lstStyle/>
+          <a:p>
+            <a:pPr algn="ctr"/>
+            <a:r>
+              <a:rPr lang="en-US" altLang="zh-CN" dirty="0"/>
+              <a:t>0</a:t>
+            </a:r>
+            <a:endParaRPr lang="zh-CN" altLang="en-US" dirty="0"/>
+          </a:p>
+        </p:txBody>
+      </p:sp>
+      <p:sp>
+        <p:nvSpPr>
+          <p:cNvPr id="33" name="矩形 32"/>
+          <p:cNvSpPr/>
+          <p:nvPr/>
+        </p:nvSpPr>
+        <p:spPr>
+          <a:xfrm>
+            <a:off x="481356" y="1151155"/>
+            <a:ext cx="360000" cy="360000"/>
+          </a:xfrm>
+          <a:prstGeom prst="rect">
+            <a:avLst/>
+          </a:prstGeom>
+        </p:spPr>
+        <p:style>
+          <a:lnRef idx="2">
+            <a:schemeClr val="accent1"/>
+          </a:lnRef>
+          <a:fillRef idx="1">
+            <a:schemeClr val="lt1"/>
+          </a:fillRef>
+          <a:effectRef idx="0">
+            <a:schemeClr val="accent1"/>
+          </a:effectRef>
+          <a:fontRef idx="minor">
+            <a:schemeClr val="dk1"/>
+          </a:fontRef>
+        </p:style>
+        <p:txBody>
+          <a:bodyPr rtlCol="0" anchor="ctr"/>
+          <a:lstStyle/>
+          <a:p>
+            <a:pPr algn="ctr"/>
+            <a:r>
+              <a:rPr lang="en-US" altLang="zh-CN" dirty="0"/>
+              <a:t>0</a:t>
+            </a:r>
+            <a:endParaRPr lang="zh-CN" altLang="en-US" dirty="0"/>
+          </a:p>
+        </p:txBody>
+      </p:sp>
+      <p:sp>
+        <p:nvSpPr>
+          <p:cNvPr id="34" name="矩形 33"/>
+          <p:cNvSpPr/>
+          <p:nvPr/>
+        </p:nvSpPr>
+        <p:spPr>
+          <a:xfrm>
+            <a:off x="841356" y="1151155"/>
+            <a:ext cx="360000" cy="360000"/>
+          </a:xfrm>
+          <a:prstGeom prst="rect">
+            <a:avLst/>
+          </a:prstGeom>
+          <a:solidFill>
+            <a:schemeClr val="bg1"/>
+          </a:solidFill>
+        </p:spPr>
+        <p:style>
+          <a:lnRef idx="2">
+            <a:schemeClr val="accent1"/>
+          </a:lnRef>
+          <a:fillRef idx="1">
+            <a:schemeClr val="lt1"/>
+          </a:fillRef>
+          <a:effectRef idx="0">
+            <a:schemeClr val="accent1"/>
+          </a:effectRef>
+          <a:fontRef idx="minor">
+            <a:schemeClr val="dk1"/>
+          </a:fontRef>
+        </p:style>
+        <p:txBody>
+          <a:bodyPr rtlCol="0" anchor="ctr"/>
+          <a:lstStyle/>
+          <a:p>
+            <a:pPr algn="ctr"/>
+            <a:r>
+              <a:rPr lang="en-US" altLang="zh-CN" dirty="0"/>
+              <a:t>0</a:t>
+            </a:r>
+            <a:endParaRPr lang="zh-CN" altLang="en-US" dirty="0"/>
+          </a:p>
+        </p:txBody>
+      </p:sp>
+      <p:sp>
+        <p:nvSpPr>
+          <p:cNvPr id="35" name="矩形 34"/>
+          <p:cNvSpPr/>
+          <p:nvPr/>
+        </p:nvSpPr>
+        <p:spPr>
+          <a:xfrm>
+            <a:off x="1201356" y="1151155"/>
+            <a:ext cx="360000" cy="360000"/>
+          </a:xfrm>
+          <a:prstGeom prst="rect">
+            <a:avLst/>
+          </a:prstGeom>
+          <a:solidFill>
+            <a:srgbClr val="00B0F0"/>
+          </a:solidFill>
+        </p:spPr>
+        <p:style>
+          <a:lnRef idx="2">
+            <a:schemeClr val="accent1"/>
+          </a:lnRef>
+          <a:fillRef idx="1">
+            <a:schemeClr val="lt1"/>
+          </a:fillRef>
+          <a:effectRef idx="0">
+            <a:schemeClr val="accent1"/>
+          </a:effectRef>
+          <a:fontRef idx="minor">
+            <a:schemeClr val="dk1"/>
+          </a:fontRef>
+        </p:style>
+        <p:txBody>
+          <a:bodyPr rtlCol="0" anchor="ctr"/>
+          <a:lstStyle/>
+          <a:p>
+            <a:pPr algn="ctr"/>
+            <a:r>
+              <a:rPr lang="en-US" altLang="zh-CN" dirty="0" smtClean="0"/>
+              <a:t>1</a:t>
+            </a:r>
+            <a:endParaRPr lang="zh-CN" altLang="en-US" dirty="0"/>
+          </a:p>
+        </p:txBody>
+      </p:sp>
+      <p:sp>
+        <p:nvSpPr>
+          <p:cNvPr id="65" name="矩形 64"/>
+          <p:cNvSpPr/>
+          <p:nvPr/>
+        </p:nvSpPr>
+        <p:spPr>
+          <a:xfrm>
+            <a:off x="121356" y="789748"/>
+            <a:ext cx="360000" cy="360000"/>
+          </a:xfrm>
+          <a:prstGeom prst="rect">
+            <a:avLst/>
+          </a:prstGeom>
+          <a:ln>
+            <a:noFill/>
+          </a:ln>
+        </p:spPr>
+        <p:style>
+          <a:lnRef idx="2">
+            <a:schemeClr val="accent1"/>
+          </a:lnRef>
+          <a:fillRef idx="1">
+            <a:schemeClr val="lt1"/>
+          </a:fillRef>
+          <a:effectRef idx="0">
+            <a:schemeClr val="accent1"/>
+          </a:effectRef>
+          <a:fontRef idx="minor">
+            <a:schemeClr val="dk1"/>
+          </a:fontRef>
+        </p:style>
+        <p:txBody>
+          <a:bodyPr rtlCol="0" anchor="ctr"/>
+          <a:lstStyle/>
+          <a:p>
+            <a:pPr algn="ctr"/>
+            <a:r>
+              <a:rPr lang="en-US" altLang="zh-CN" dirty="0"/>
+              <a:t>a</a:t>
+            </a:r>
+            <a:endParaRPr lang="zh-CN" altLang="en-US" dirty="0"/>
+          </a:p>
+        </p:txBody>
+      </p:sp>
+      <p:sp>
+        <p:nvSpPr>
+          <p:cNvPr id="66" name="矩形 65"/>
+          <p:cNvSpPr/>
+          <p:nvPr/>
+        </p:nvSpPr>
+        <p:spPr>
+          <a:xfrm>
+            <a:off x="121356" y="1142337"/>
+            <a:ext cx="360000" cy="360000"/>
+          </a:xfrm>
+          <a:prstGeom prst="rect">
+            <a:avLst/>
+          </a:prstGeom>
+          <a:ln>
+            <a:noFill/>
+          </a:ln>
+        </p:spPr>
+        <p:style>
+          <a:lnRef idx="2">
+            <a:schemeClr val="accent1"/>
+          </a:lnRef>
+          <a:fillRef idx="1">
+            <a:schemeClr val="lt1"/>
+          </a:fillRef>
+          <a:effectRef idx="0">
+            <a:schemeClr val="accent1"/>
+          </a:effectRef>
+          <a:fontRef idx="minor">
+            <a:schemeClr val="dk1"/>
+          </a:fontRef>
+        </p:style>
+        <p:txBody>
+          <a:bodyPr rtlCol="0" anchor="ctr"/>
+          <a:lstStyle/>
+          <a:p>
+            <a:pPr algn="ctr"/>
+            <a:r>
+              <a:rPr lang="en-US" altLang="zh-CN" dirty="0"/>
+              <a:t>.</a:t>
+            </a:r>
+            <a:endParaRPr lang="zh-CN" altLang="en-US" dirty="0"/>
+          </a:p>
+        </p:txBody>
+      </p:sp>
+      <p:sp>
+        <p:nvSpPr>
+          <p:cNvPr id="15" name="矩形 14"/>
+          <p:cNvSpPr/>
+          <p:nvPr/>
+        </p:nvSpPr>
+        <p:spPr>
+          <a:xfrm>
+            <a:off x="481356" y="1505459"/>
+            <a:ext cx="360000" cy="360000"/>
+          </a:xfrm>
+          <a:prstGeom prst="rect">
+            <a:avLst/>
+          </a:prstGeom>
+        </p:spPr>
+        <p:style>
+          <a:lnRef idx="2">
+            <a:schemeClr val="accent1"/>
+          </a:lnRef>
+          <a:fillRef idx="1">
+            <a:schemeClr val="lt1"/>
+          </a:fillRef>
+          <a:effectRef idx="0">
+            <a:schemeClr val="accent1"/>
+          </a:effectRef>
+          <a:fontRef idx="minor">
+            <a:schemeClr val="dk1"/>
+          </a:fontRef>
+        </p:style>
+        <p:txBody>
+          <a:bodyPr rtlCol="0" anchor="ctr"/>
+          <a:lstStyle/>
+          <a:p>
+            <a:pPr algn="ctr"/>
+            <a:r>
+              <a:rPr lang="en-US" altLang="zh-CN" dirty="0"/>
+              <a:t>0</a:t>
+            </a:r>
+            <a:endParaRPr lang="zh-CN" altLang="en-US" dirty="0"/>
+          </a:p>
+        </p:txBody>
+      </p:sp>
+      <p:sp>
+        <p:nvSpPr>
+          <p:cNvPr id="16" name="矩形 15"/>
+          <p:cNvSpPr/>
+          <p:nvPr/>
+        </p:nvSpPr>
+        <p:spPr>
+          <a:xfrm>
+            <a:off x="841356" y="1505459"/>
+            <a:ext cx="360000" cy="360000"/>
+          </a:xfrm>
+          <a:prstGeom prst="rect">
+            <a:avLst/>
+          </a:prstGeom>
+          <a:solidFill>
+            <a:srgbClr val="00B0F0"/>
+          </a:solidFill>
+        </p:spPr>
+        <p:style>
+          <a:lnRef idx="2">
+            <a:schemeClr val="accent1"/>
+          </a:lnRef>
+          <a:fillRef idx="1">
+            <a:schemeClr val="lt1"/>
+          </a:fillRef>
+          <a:effectRef idx="0">
+            <a:schemeClr val="accent1"/>
+          </a:effectRef>
+          <a:fontRef idx="minor">
+            <a:schemeClr val="dk1"/>
+          </a:fontRef>
+        </p:style>
+        <p:txBody>
+          <a:bodyPr rtlCol="0" anchor="ctr"/>
+          <a:lstStyle/>
+          <a:p>
+            <a:pPr algn="ctr"/>
+            <a:r>
+              <a:rPr lang="en-US" altLang="zh-CN" dirty="0"/>
+              <a:t>1</a:t>
+            </a:r>
+            <a:endParaRPr lang="zh-CN" altLang="en-US" dirty="0"/>
+          </a:p>
+        </p:txBody>
+      </p:sp>
+      <p:sp>
+        <p:nvSpPr>
+          <p:cNvPr id="17" name="矩形 16"/>
+          <p:cNvSpPr/>
+          <p:nvPr/>
+        </p:nvSpPr>
+        <p:spPr>
+          <a:xfrm>
+            <a:off x="1201356" y="1505459"/>
+            <a:ext cx="360000" cy="360000"/>
+          </a:xfrm>
+          <a:prstGeom prst="rect">
+            <a:avLst/>
+          </a:prstGeom>
+          <a:solidFill>
+            <a:srgbClr val="00B050"/>
+          </a:solidFill>
+        </p:spPr>
+        <p:style>
+          <a:lnRef idx="2">
+            <a:schemeClr val="accent1"/>
+          </a:lnRef>
+          <a:fillRef idx="1">
+            <a:schemeClr val="lt1"/>
+          </a:fillRef>
+          <a:effectRef idx="0">
+            <a:schemeClr val="accent1"/>
+          </a:effectRef>
+          <a:fontRef idx="minor">
+            <a:schemeClr val="dk1"/>
+          </a:fontRef>
+        </p:style>
+        <p:txBody>
+          <a:bodyPr rtlCol="0" anchor="ctr"/>
+          <a:lstStyle/>
+          <a:p>
+            <a:pPr algn="ctr"/>
+            <a:r>
+              <a:rPr lang="en-US" altLang="zh-CN" dirty="0" smtClean="0"/>
+              <a:t>1</a:t>
+            </a:r>
+            <a:endParaRPr lang="zh-CN" altLang="en-US" dirty="0"/>
+          </a:p>
+        </p:txBody>
+      </p:sp>
+      <p:sp>
+        <p:nvSpPr>
+          <p:cNvPr id="18" name="矩形 17"/>
+          <p:cNvSpPr/>
+          <p:nvPr/>
+        </p:nvSpPr>
+        <p:spPr>
+          <a:xfrm>
+            <a:off x="121356" y="1496641"/>
+            <a:ext cx="360000" cy="360000"/>
+          </a:xfrm>
+          <a:prstGeom prst="rect">
+            <a:avLst/>
+          </a:prstGeom>
+          <a:ln>
+            <a:noFill/>
+          </a:ln>
+        </p:spPr>
+        <p:style>
+          <a:lnRef idx="2">
+            <a:schemeClr val="accent1"/>
+          </a:lnRef>
+          <a:fillRef idx="1">
+            <a:schemeClr val="lt1"/>
+          </a:fillRef>
+          <a:effectRef idx="0">
+            <a:schemeClr val="accent1"/>
+          </a:effectRef>
+          <a:fontRef idx="minor">
+            <a:schemeClr val="dk1"/>
+          </a:fontRef>
+        </p:style>
+        <p:txBody>
+          <a:bodyPr rtlCol="0" anchor="ctr"/>
+          <a:lstStyle/>
+          <a:p>
+            <a:pPr algn="ctr"/>
+            <a:r>
+              <a:rPr lang="en-US" altLang="zh-CN" dirty="0"/>
+              <a:t>*</a:t>
+            </a:r>
+            <a:endParaRPr lang="zh-CN" altLang="en-US" dirty="0"/>
+          </a:p>
+        </p:txBody>
+      </p:sp>
+      <p:sp>
+        <p:nvSpPr>
+          <p:cNvPr id="23" name="左弧形箭头 22"/>
+          <p:cNvSpPr/>
+          <p:nvPr/>
+        </p:nvSpPr>
+        <p:spPr>
+          <a:xfrm>
+            <a:off x="870384" y="1030583"/>
+            <a:ext cx="72000" cy="601143"/>
+          </a:xfrm>
+          <a:prstGeom prst="curvedRightArrow">
+            <a:avLst/>
+          </a:prstGeom>
+          <a:solidFill>
+            <a:schemeClr val="tx1"/>
+          </a:solidFill>
+          <a:ln w="6350">
+            <a:solidFill>
+              <a:schemeClr val="tx1"/>
+            </a:solidFill>
+            <a:headEnd type="none"/>
+            <a:tailEnd type="triangle"/>
+          </a:ln>
+        </p:spPr>
+        <p:style>
+          <a:lnRef idx="2">
+            <a:schemeClr val="accent1">
+              <a:shade val="50000"/>
+            </a:schemeClr>
+          </a:lnRef>
+          <a:fillRef idx="1">
+            <a:schemeClr val="accent1"/>
+          </a:fillRef>
+          <a:effectRef idx="0">
+            <a:schemeClr val="accent1"/>
+          </a:effectRef>
+          <a:fontRef idx="minor">
+            <a:schemeClr val="lt1"/>
+          </a:fontRef>
+        </p:style>
+        <p:txBody>
+          <a:bodyPr rtlCol="0" anchor="ctr"/>
+          <a:lstStyle/>
+          <a:p>
+            <a:pPr algn="ctr"/>
+            <a:endParaRPr lang="zh-CN" altLang="en-US">
+              <a:solidFill>
+                <a:schemeClr val="tx1"/>
+              </a:solidFill>
+            </a:endParaRPr>
+          </a:p>
+        </p:txBody>
+      </p:sp>
+      <p:cxnSp>
+        <p:nvCxnSpPr>
+          <p:cNvPr id="24" name="直接箭头连接符 23"/>
+          <p:cNvCxnSpPr/>
+          <p:nvPr/>
+        </p:nvCxnSpPr>
+        <p:spPr>
+          <a:xfrm rot="-2700000">
+            <a:off x="1111356" y="1595460"/>
+            <a:ext cx="180000" cy="180000"/>
+          </a:xfrm>
+          <a:prstGeom prst="straightConnector1">
+            <a:avLst/>
+          </a:prstGeom>
+          <a:ln w="12700">
+            <a:solidFill>
+              <a:schemeClr val="tx1"/>
+            </a:solidFill>
+            <a:tailEnd type="triangle"/>
+          </a:ln>
+        </p:spPr>
+        <p:style>
+          <a:lnRef idx="1">
+            <a:schemeClr val="accent1"/>
+          </a:lnRef>
+          <a:fillRef idx="0">
+            <a:schemeClr val="accent1"/>
+          </a:fillRef>
+          <a:effectRef idx="0">
+            <a:schemeClr val="accent1"/>
+          </a:effectRef>
+          <a:fontRef idx="minor">
+            <a:schemeClr val="tx1"/>
+          </a:fontRef>
+        </p:style>
+      </p:cxnSp>
+      <p:sp>
+        <p:nvSpPr>
+          <p:cNvPr id="25" name="矩形 24"/>
+          <p:cNvSpPr/>
+          <p:nvPr/>
+        </p:nvSpPr>
+        <p:spPr>
+          <a:xfrm>
+            <a:off x="2738327" y="437159"/>
+            <a:ext cx="360000" cy="360000"/>
+          </a:xfrm>
+          <a:prstGeom prst="rect">
+            <a:avLst/>
+          </a:prstGeom>
+          <a:solidFill>
+            <a:srgbClr val="00B0F0"/>
+          </a:solidFill>
+        </p:spPr>
+        <p:style>
+          <a:lnRef idx="2">
+            <a:schemeClr val="accent1"/>
+          </a:lnRef>
+          <a:fillRef idx="1">
+            <a:schemeClr val="lt1"/>
+          </a:fillRef>
+          <a:effectRef idx="0">
+            <a:schemeClr val="accent1"/>
+          </a:effectRef>
+          <a:fontRef idx="minor">
+            <a:schemeClr val="dk1"/>
+          </a:fontRef>
+        </p:style>
+        <p:txBody>
+          <a:bodyPr rtlCol="0" anchor="ctr"/>
+          <a:lstStyle/>
+          <a:p>
+            <a:pPr algn="ctr"/>
+            <a:r>
+              <a:rPr lang="en-US" altLang="zh-CN" dirty="0"/>
+              <a:t>1</a:t>
+            </a:r>
+            <a:endParaRPr lang="zh-CN" altLang="en-US" dirty="0"/>
+          </a:p>
+        </p:txBody>
+      </p:sp>
+      <p:sp>
+        <p:nvSpPr>
+          <p:cNvPr id="26" name="矩形 25"/>
+          <p:cNvSpPr/>
+          <p:nvPr/>
+        </p:nvSpPr>
+        <p:spPr>
+          <a:xfrm>
+            <a:off x="3098327" y="437159"/>
+            <a:ext cx="360000" cy="360000"/>
+          </a:xfrm>
+          <a:prstGeom prst="rect">
+            <a:avLst/>
+          </a:prstGeom>
+        </p:spPr>
+        <p:style>
+          <a:lnRef idx="2">
+            <a:schemeClr val="accent1"/>
+          </a:lnRef>
+          <a:fillRef idx="1">
+            <a:schemeClr val="lt1"/>
+          </a:fillRef>
+          <a:effectRef idx="0">
+            <a:schemeClr val="accent1"/>
+          </a:effectRef>
+          <a:fontRef idx="minor">
+            <a:schemeClr val="dk1"/>
+          </a:fontRef>
+        </p:style>
+        <p:txBody>
+          <a:bodyPr rtlCol="0" anchor="ctr"/>
+          <a:lstStyle/>
+          <a:p>
+            <a:pPr algn="ctr"/>
+            <a:r>
+              <a:rPr lang="en-US" altLang="zh-CN" dirty="0"/>
+              <a:t>0</a:t>
+            </a:r>
+            <a:endParaRPr lang="zh-CN" altLang="en-US" dirty="0"/>
+          </a:p>
+        </p:txBody>
+      </p:sp>
+      <p:sp>
+        <p:nvSpPr>
+          <p:cNvPr id="27" name="矩形 26"/>
+          <p:cNvSpPr/>
+          <p:nvPr/>
+        </p:nvSpPr>
+        <p:spPr>
+          <a:xfrm>
+            <a:off x="3458327" y="437159"/>
+            <a:ext cx="360000" cy="360000"/>
+          </a:xfrm>
+          <a:prstGeom prst="rect">
+            <a:avLst/>
+          </a:prstGeom>
+        </p:spPr>
+        <p:style>
+          <a:lnRef idx="2">
+            <a:schemeClr val="accent1"/>
+          </a:lnRef>
+          <a:fillRef idx="1">
+            <a:schemeClr val="lt1"/>
+          </a:fillRef>
+          <a:effectRef idx="0">
+            <a:schemeClr val="accent1"/>
+          </a:effectRef>
+          <a:fontRef idx="minor">
+            <a:schemeClr val="dk1"/>
+          </a:fontRef>
+        </p:style>
+        <p:txBody>
+          <a:bodyPr rtlCol="0" anchor="ctr"/>
+          <a:lstStyle/>
+          <a:p>
+            <a:pPr algn="ctr"/>
+            <a:r>
+              <a:rPr lang="en-US" altLang="zh-CN" dirty="0"/>
+              <a:t>0</a:t>
+            </a:r>
+            <a:endParaRPr lang="zh-CN" altLang="en-US" dirty="0"/>
+          </a:p>
+        </p:txBody>
+      </p:sp>
+      <p:sp>
+        <p:nvSpPr>
+          <p:cNvPr id="28" name="矩形 27"/>
+          <p:cNvSpPr/>
+          <p:nvPr/>
+        </p:nvSpPr>
+        <p:spPr>
+          <a:xfrm>
+            <a:off x="3098327" y="76221"/>
+            <a:ext cx="360000" cy="360000"/>
+          </a:xfrm>
+          <a:prstGeom prst="rect">
+            <a:avLst/>
+          </a:prstGeom>
+          <a:ln>
+            <a:noFill/>
+          </a:ln>
+        </p:spPr>
+        <p:style>
+          <a:lnRef idx="2">
+            <a:schemeClr val="accent1"/>
+          </a:lnRef>
+          <a:fillRef idx="1">
+            <a:schemeClr val="lt1"/>
+          </a:fillRef>
+          <a:effectRef idx="0">
+            <a:schemeClr val="accent1"/>
+          </a:effectRef>
+          <a:fontRef idx="minor">
+            <a:schemeClr val="dk1"/>
+          </a:fontRef>
+        </p:style>
+        <p:txBody>
+          <a:bodyPr rtlCol="0" anchor="ctr"/>
+          <a:lstStyle/>
+          <a:p>
+            <a:pPr algn="ctr"/>
+            <a:r>
+              <a:rPr lang="en-US" altLang="zh-CN" dirty="0"/>
+              <a:t>a</a:t>
+            </a:r>
+            <a:endParaRPr lang="zh-CN" altLang="en-US" dirty="0"/>
+          </a:p>
+        </p:txBody>
+      </p:sp>
+      <p:sp>
+        <p:nvSpPr>
+          <p:cNvPr id="29" name="矩形 28"/>
+          <p:cNvSpPr/>
+          <p:nvPr/>
+        </p:nvSpPr>
+        <p:spPr>
+          <a:xfrm>
+            <a:off x="3458327" y="76221"/>
+            <a:ext cx="360000" cy="360000"/>
+          </a:xfrm>
+          <a:prstGeom prst="rect">
+            <a:avLst/>
+          </a:prstGeom>
+          <a:ln>
+            <a:noFill/>
+          </a:ln>
+        </p:spPr>
+        <p:style>
+          <a:lnRef idx="2">
+            <a:schemeClr val="accent1"/>
+          </a:lnRef>
+          <a:fillRef idx="1">
+            <a:schemeClr val="lt1"/>
+          </a:fillRef>
+          <a:effectRef idx="0">
+            <a:schemeClr val="accent1"/>
+          </a:effectRef>
+          <a:fontRef idx="minor">
+            <a:schemeClr val="dk1"/>
+          </a:fontRef>
+        </p:style>
+        <p:txBody>
+          <a:bodyPr rtlCol="0" anchor="ctr"/>
+          <a:lstStyle/>
+          <a:p>
+            <a:pPr algn="ctr"/>
+            <a:r>
+              <a:rPr lang="en-US" altLang="zh-CN" dirty="0" smtClean="0"/>
+              <a:t>a</a:t>
+            </a:r>
+            <a:endParaRPr lang="zh-CN" altLang="en-US" dirty="0"/>
+          </a:p>
+        </p:txBody>
+      </p:sp>
+      <p:sp>
+        <p:nvSpPr>
+          <p:cNvPr id="30" name="矩形 29"/>
+          <p:cNvSpPr/>
+          <p:nvPr/>
+        </p:nvSpPr>
+        <p:spPr>
+          <a:xfrm>
+            <a:off x="2738327" y="793969"/>
+            <a:ext cx="360000" cy="360000"/>
+          </a:xfrm>
+          <a:prstGeom prst="rect">
+            <a:avLst/>
+          </a:prstGeom>
+        </p:spPr>
+        <p:style>
+          <a:lnRef idx="2">
+            <a:schemeClr val="accent1"/>
+          </a:lnRef>
+          <a:fillRef idx="1">
+            <a:schemeClr val="lt1"/>
+          </a:fillRef>
+          <a:effectRef idx="0">
+            <a:schemeClr val="accent1"/>
+          </a:effectRef>
+          <a:fontRef idx="minor">
+            <a:schemeClr val="dk1"/>
+          </a:fontRef>
+        </p:style>
+        <p:txBody>
+          <a:bodyPr rtlCol="0" anchor="ctr"/>
+          <a:lstStyle/>
+          <a:p>
+            <a:pPr algn="ctr"/>
+            <a:r>
+              <a:rPr lang="en-US" altLang="zh-CN" dirty="0"/>
+              <a:t>0</a:t>
+            </a:r>
+            <a:endParaRPr lang="zh-CN" altLang="en-US" dirty="0"/>
+          </a:p>
+        </p:txBody>
+      </p:sp>
+      <p:sp>
+        <p:nvSpPr>
+          <p:cNvPr id="31" name="矩形 30"/>
+          <p:cNvSpPr/>
+          <p:nvPr/>
+        </p:nvSpPr>
+        <p:spPr>
+          <a:xfrm>
+            <a:off x="3098327" y="793969"/>
+            <a:ext cx="360000" cy="360000"/>
+          </a:xfrm>
+          <a:prstGeom prst="rect">
+            <a:avLst/>
+          </a:prstGeom>
+          <a:solidFill>
+            <a:srgbClr val="00B0F0"/>
+          </a:solidFill>
+        </p:spPr>
+        <p:style>
+          <a:lnRef idx="2">
+            <a:schemeClr val="accent1"/>
+          </a:lnRef>
+          <a:fillRef idx="1">
+            <a:schemeClr val="lt1"/>
+          </a:fillRef>
+          <a:effectRef idx="0">
+            <a:schemeClr val="accent1"/>
+          </a:effectRef>
+          <a:fontRef idx="minor">
+            <a:schemeClr val="dk1"/>
+          </a:fontRef>
+        </p:style>
+        <p:txBody>
+          <a:bodyPr rtlCol="0" anchor="ctr"/>
+          <a:lstStyle/>
+          <a:p>
+            <a:pPr algn="ctr"/>
+            <a:r>
+              <a:rPr lang="en-US" altLang="zh-CN" dirty="0"/>
+              <a:t>1</a:t>
+            </a:r>
+            <a:endParaRPr lang="zh-CN" altLang="en-US" dirty="0"/>
+          </a:p>
+        </p:txBody>
+      </p:sp>
+      <p:sp>
+        <p:nvSpPr>
+          <p:cNvPr id="32" name="矩形 31"/>
+          <p:cNvSpPr/>
+          <p:nvPr/>
+        </p:nvSpPr>
+        <p:spPr>
+          <a:xfrm>
+            <a:off x="3458327" y="793969"/>
+            <a:ext cx="360000" cy="360000"/>
+          </a:xfrm>
+          <a:prstGeom prst="rect">
+            <a:avLst/>
+          </a:prstGeom>
+          <a:solidFill>
+            <a:schemeClr val="bg1"/>
+          </a:solidFill>
+        </p:spPr>
+        <p:style>
+          <a:lnRef idx="2">
+            <a:schemeClr val="accent1"/>
+          </a:lnRef>
+          <a:fillRef idx="1">
+            <a:schemeClr val="lt1"/>
+          </a:fillRef>
+          <a:effectRef idx="0">
+            <a:schemeClr val="accent1"/>
+          </a:effectRef>
+          <a:fontRef idx="minor">
+            <a:schemeClr val="dk1"/>
+          </a:fontRef>
+        </p:style>
+        <p:txBody>
+          <a:bodyPr rtlCol="0" anchor="ctr"/>
+          <a:lstStyle/>
+          <a:p>
+            <a:pPr algn="ctr"/>
+            <a:r>
+              <a:rPr lang="en-US" altLang="zh-CN" dirty="0"/>
+              <a:t>0</a:t>
+            </a:r>
+            <a:endParaRPr lang="zh-CN" altLang="en-US" dirty="0"/>
+          </a:p>
+        </p:txBody>
+      </p:sp>
+      <p:sp>
+        <p:nvSpPr>
+          <p:cNvPr id="36" name="矩形 35"/>
+          <p:cNvSpPr/>
+          <p:nvPr/>
+        </p:nvSpPr>
+        <p:spPr>
+          <a:xfrm>
+            <a:off x="2738327" y="1151155"/>
+            <a:ext cx="360000" cy="360000"/>
+          </a:xfrm>
+          <a:prstGeom prst="rect">
+            <a:avLst/>
+          </a:prstGeom>
+          <a:solidFill>
+            <a:srgbClr val="00B0F0"/>
+          </a:solidFill>
+        </p:spPr>
+        <p:style>
+          <a:lnRef idx="2">
+            <a:schemeClr val="accent1"/>
+          </a:lnRef>
+          <a:fillRef idx="1">
+            <a:schemeClr val="lt1"/>
+          </a:fillRef>
+          <a:effectRef idx="0">
+            <a:schemeClr val="accent1"/>
+          </a:effectRef>
+          <a:fontRef idx="minor">
+            <a:schemeClr val="dk1"/>
+          </a:fontRef>
+        </p:style>
+        <p:txBody>
+          <a:bodyPr rtlCol="0" anchor="ctr"/>
+          <a:lstStyle/>
+          <a:p>
+            <a:pPr algn="ctr"/>
+            <a:r>
+              <a:rPr lang="en-US" altLang="zh-CN" dirty="0" smtClean="0"/>
+              <a:t>1</a:t>
+            </a:r>
+            <a:endParaRPr lang="zh-CN" altLang="en-US" dirty="0"/>
+          </a:p>
+        </p:txBody>
+      </p:sp>
+      <p:sp>
+        <p:nvSpPr>
+          <p:cNvPr id="37" name="矩形 36"/>
+          <p:cNvSpPr/>
+          <p:nvPr/>
+        </p:nvSpPr>
+        <p:spPr>
+          <a:xfrm>
+            <a:off x="3098327" y="1151155"/>
+            <a:ext cx="360000" cy="360000"/>
+          </a:xfrm>
+          <a:prstGeom prst="rect">
+            <a:avLst/>
+          </a:prstGeom>
+          <a:solidFill>
+            <a:srgbClr val="00B0F0"/>
+          </a:solidFill>
+        </p:spPr>
+        <p:style>
+          <a:lnRef idx="2">
+            <a:schemeClr val="accent1"/>
+          </a:lnRef>
+          <a:fillRef idx="1">
+            <a:schemeClr val="lt1"/>
+          </a:fillRef>
+          <a:effectRef idx="0">
+            <a:schemeClr val="accent1"/>
+          </a:effectRef>
+          <a:fontRef idx="minor">
+            <a:schemeClr val="dk1"/>
+          </a:fontRef>
+        </p:style>
+        <p:txBody>
+          <a:bodyPr rtlCol="0" anchor="ctr"/>
+          <a:lstStyle/>
+          <a:p>
+            <a:pPr algn="ctr"/>
+            <a:r>
+              <a:rPr lang="en-US" altLang="zh-CN" dirty="0"/>
+              <a:t>1</a:t>
+            </a:r>
+            <a:endParaRPr lang="zh-CN" altLang="en-US" dirty="0"/>
+          </a:p>
+        </p:txBody>
+      </p:sp>
+      <p:sp>
+        <p:nvSpPr>
+          <p:cNvPr id="38" name="矩形 37"/>
+          <p:cNvSpPr/>
+          <p:nvPr/>
+        </p:nvSpPr>
+        <p:spPr>
+          <a:xfrm>
+            <a:off x="3458327" y="1151155"/>
+            <a:ext cx="360000" cy="360000"/>
+          </a:xfrm>
+          <a:prstGeom prst="rect">
+            <a:avLst/>
+          </a:prstGeom>
+          <a:solidFill>
+            <a:srgbClr val="00B050"/>
+          </a:solidFill>
+        </p:spPr>
+        <p:style>
+          <a:lnRef idx="2">
+            <a:schemeClr val="accent1"/>
+          </a:lnRef>
+          <a:fillRef idx="1">
+            <a:schemeClr val="lt1"/>
+          </a:fillRef>
+          <a:effectRef idx="0">
+            <a:schemeClr val="accent1"/>
+          </a:effectRef>
+          <a:fontRef idx="minor">
+            <a:schemeClr val="dk1"/>
+          </a:fontRef>
+        </p:style>
+        <p:txBody>
+          <a:bodyPr rtlCol="0" anchor="ctr"/>
+          <a:lstStyle/>
+          <a:p>
+            <a:pPr algn="ctr"/>
+            <a:r>
+              <a:rPr lang="en-US" altLang="zh-CN" dirty="0" smtClean="0"/>
+              <a:t>1</a:t>
+            </a:r>
+            <a:endParaRPr lang="zh-CN" altLang="en-US" dirty="0"/>
+          </a:p>
+        </p:txBody>
+      </p:sp>
+      <p:sp>
+        <p:nvSpPr>
+          <p:cNvPr id="39" name="矩形 38"/>
+          <p:cNvSpPr/>
+          <p:nvPr/>
+        </p:nvSpPr>
+        <p:spPr>
+          <a:xfrm>
+            <a:off x="2378327" y="789748"/>
+            <a:ext cx="360000" cy="360000"/>
+          </a:xfrm>
+          <a:prstGeom prst="rect">
+            <a:avLst/>
+          </a:prstGeom>
+          <a:ln>
+            <a:noFill/>
+          </a:ln>
+        </p:spPr>
+        <p:style>
+          <a:lnRef idx="2">
+            <a:schemeClr val="accent1"/>
+          </a:lnRef>
+          <a:fillRef idx="1">
+            <a:schemeClr val="lt1"/>
+          </a:fillRef>
+          <a:effectRef idx="0">
+            <a:schemeClr val="accent1"/>
+          </a:effectRef>
+          <a:fontRef idx="minor">
+            <a:schemeClr val="dk1"/>
+          </a:fontRef>
+        </p:style>
+        <p:txBody>
+          <a:bodyPr rtlCol="0" anchor="ctr"/>
+          <a:lstStyle/>
+          <a:p>
+            <a:pPr algn="ctr"/>
+            <a:r>
+              <a:rPr lang="en-US" altLang="zh-CN" dirty="0" smtClean="0"/>
+              <a:t>.</a:t>
+            </a:r>
+            <a:endParaRPr lang="zh-CN" altLang="en-US" dirty="0"/>
+          </a:p>
+        </p:txBody>
+      </p:sp>
+      <p:sp>
+        <p:nvSpPr>
+          <p:cNvPr id="40" name="矩形 39"/>
+          <p:cNvSpPr/>
+          <p:nvPr/>
+        </p:nvSpPr>
+        <p:spPr>
+          <a:xfrm>
+            <a:off x="2378327" y="1142337"/>
+            <a:ext cx="360000" cy="360000"/>
+          </a:xfrm>
+          <a:prstGeom prst="rect">
+            <a:avLst/>
+          </a:prstGeom>
+          <a:ln>
+            <a:noFill/>
+          </a:ln>
+        </p:spPr>
+        <p:style>
+          <a:lnRef idx="2">
+            <a:schemeClr val="accent1"/>
+          </a:lnRef>
+          <a:fillRef idx="1">
+            <a:schemeClr val="lt1"/>
+          </a:fillRef>
+          <a:effectRef idx="0">
+            <a:schemeClr val="accent1"/>
+          </a:effectRef>
+          <a:fontRef idx="minor">
+            <a:schemeClr val="dk1"/>
+          </a:fontRef>
+        </p:style>
+        <p:txBody>
+          <a:bodyPr rtlCol="0" anchor="ctr"/>
+          <a:lstStyle/>
+          <a:p>
+            <a:pPr algn="ctr"/>
+            <a:r>
+              <a:rPr lang="en-US" altLang="zh-CN" dirty="0" smtClean="0"/>
+              <a:t>*</a:t>
+            </a:r>
+            <a:endParaRPr lang="zh-CN" altLang="en-US" dirty="0"/>
+          </a:p>
+        </p:txBody>
+      </p:sp>
+      <p:sp>
+        <p:nvSpPr>
+          <p:cNvPr id="45" name="左弧形箭头 44"/>
+          <p:cNvSpPr/>
+          <p:nvPr/>
+        </p:nvSpPr>
+        <p:spPr>
+          <a:xfrm>
+            <a:off x="2773568" y="699875"/>
+            <a:ext cx="72000" cy="601143"/>
+          </a:xfrm>
+          <a:prstGeom prst="curvedRightArrow">
+            <a:avLst/>
+          </a:prstGeom>
+          <a:solidFill>
+            <a:schemeClr val="tx1"/>
+          </a:solidFill>
+          <a:ln w="6350">
+            <a:solidFill>
+              <a:schemeClr val="tx1"/>
+            </a:solidFill>
+            <a:headEnd type="none"/>
+            <a:tailEnd type="triangle"/>
+          </a:ln>
+        </p:spPr>
+        <p:style>
+          <a:lnRef idx="2">
+            <a:schemeClr val="accent1">
+              <a:shade val="50000"/>
+            </a:schemeClr>
+          </a:lnRef>
+          <a:fillRef idx="1">
+            <a:schemeClr val="accent1"/>
+          </a:fillRef>
+          <a:effectRef idx="0">
+            <a:schemeClr val="accent1"/>
+          </a:effectRef>
+          <a:fontRef idx="minor">
+            <a:schemeClr val="lt1"/>
+          </a:fontRef>
+        </p:style>
+        <p:txBody>
+          <a:bodyPr rtlCol="0" anchor="ctr"/>
+          <a:lstStyle/>
+          <a:p>
+            <a:pPr algn="ctr"/>
+            <a:endParaRPr lang="zh-CN" altLang="en-US">
+              <a:solidFill>
+                <a:schemeClr val="tx1"/>
+              </a:solidFill>
+            </a:endParaRPr>
+          </a:p>
+        </p:txBody>
+      </p:sp>
+      <p:cxnSp>
+        <p:nvCxnSpPr>
+          <p:cNvPr id="47" name="直接箭头连接符 46"/>
+          <p:cNvCxnSpPr/>
+          <p:nvPr/>
+        </p:nvCxnSpPr>
+        <p:spPr>
+          <a:xfrm rot="2700000">
+            <a:off x="3224327" y="1109897"/>
+            <a:ext cx="108000" cy="108000"/>
+          </a:xfrm>
+          <a:prstGeom prst="straightConnector1">
+            <a:avLst/>
+          </a:prstGeom>
+          <a:ln w="12700">
+            <a:solidFill>
+              <a:schemeClr val="tx1"/>
+            </a:solidFill>
+            <a:tailEnd type="triangle"/>
+          </a:ln>
+        </p:spPr>
+        <p:style>
+          <a:lnRef idx="1">
+            <a:schemeClr val="accent1"/>
+          </a:lnRef>
+          <a:fillRef idx="0">
+            <a:schemeClr val="accent1"/>
+          </a:fillRef>
+          <a:effectRef idx="0">
+            <a:schemeClr val="accent1"/>
+          </a:effectRef>
+          <a:fontRef idx="minor">
+            <a:schemeClr val="tx1"/>
+          </a:fontRef>
+        </p:style>
+      </p:cxnSp>
+      <p:cxnSp>
+        <p:nvCxnSpPr>
+          <p:cNvPr id="48" name="直接箭头连接符 47"/>
+          <p:cNvCxnSpPr/>
+          <p:nvPr/>
+        </p:nvCxnSpPr>
+        <p:spPr>
+          <a:xfrm rot="-2700000">
+            <a:off x="3368326" y="1240387"/>
+            <a:ext cx="180000" cy="180000"/>
+          </a:xfrm>
+          <a:prstGeom prst="straightConnector1">
+            <a:avLst/>
+          </a:prstGeom>
+          <a:ln w="12700">
+            <a:solidFill>
+              <a:schemeClr val="tx1"/>
+            </a:solidFill>
+            <a:tailEnd type="triangle"/>
+          </a:ln>
+        </p:spPr>
+        <p:style>
+          <a:lnRef idx="1">
+            <a:schemeClr val="accent1"/>
+          </a:lnRef>
+          <a:fillRef idx="0">
+            <a:schemeClr val="accent1"/>
+          </a:fillRef>
+          <a:effectRef idx="0">
+            <a:schemeClr val="accent1"/>
+          </a:effectRef>
+          <a:fontRef idx="minor">
+            <a:schemeClr val="tx1"/>
+          </a:fontRef>
+        </p:style>
+      </p:cxnSp>
+      <p:sp>
+        <p:nvSpPr>
+          <p:cNvPr id="7" name="文本框 6"/>
+          <p:cNvSpPr txBox="1"/>
+          <p:nvPr/>
+        </p:nvSpPr>
+        <p:spPr>
+          <a:xfrm>
+            <a:off x="181029" y="2338927"/>
+            <a:ext cx="1680653" cy="369332"/>
+          </a:xfrm>
+          <a:prstGeom prst="rect">
+            <a:avLst/>
+          </a:prstGeom>
+          <a:noFill/>
+        </p:spPr>
+        <p:txBody>
+          <a:bodyPr wrap="none" rtlCol="0">
+            <a:spAutoFit/>
+          </a:bodyPr>
+          <a:lstStyle/>
+          <a:p>
+            <a:r>
+              <a:rPr lang="en-US" altLang="zh-CN" dirty="0"/>
+              <a:t>table[j - 1][</a:t>
+            </a:r>
+            <a:r>
+              <a:rPr lang="en-US" altLang="zh-CN" dirty="0" err="1"/>
+              <a:t>i</a:t>
+            </a:r>
+            <a:r>
+              <a:rPr lang="en-US" altLang="zh-CN" dirty="0"/>
+              <a:t> + 1]</a:t>
+            </a:r>
+            <a:endParaRPr lang="zh-CN" altLang="en-US" dirty="0"/>
+          </a:p>
+        </p:txBody>
+      </p:sp>
+      <p:sp>
+        <p:nvSpPr>
+          <p:cNvPr id="50" name="文本框 49"/>
+          <p:cNvSpPr txBox="1"/>
+          <p:nvPr/>
+        </p:nvSpPr>
+        <p:spPr>
+          <a:xfrm>
+            <a:off x="2558226" y="2338927"/>
+            <a:ext cx="1440202" cy="369332"/>
+          </a:xfrm>
+          <a:prstGeom prst="rect">
+            <a:avLst/>
+          </a:prstGeom>
+          <a:noFill/>
+        </p:spPr>
+        <p:txBody>
+          <a:bodyPr wrap="none" rtlCol="0">
+            <a:spAutoFit/>
+          </a:bodyPr>
+          <a:lstStyle/>
+          <a:p>
+            <a:r>
+              <a:rPr lang="en-US" altLang="zh-CN" dirty="0" smtClean="0"/>
+              <a:t>table[j][</a:t>
+            </a:r>
+            <a:r>
+              <a:rPr lang="en-US" altLang="zh-CN" dirty="0" err="1"/>
+              <a:t>i</a:t>
+            </a:r>
+            <a:r>
+              <a:rPr lang="en-US" altLang="zh-CN" dirty="0"/>
+              <a:t> + 1]</a:t>
+            </a:r>
+            <a:endParaRPr lang="zh-CN" altLang="en-US" dirty="0"/>
+          </a:p>
+        </p:txBody>
+      </p:sp>
+      <p:sp>
+        <p:nvSpPr>
+          <p:cNvPr id="51" name="矩形 50"/>
+          <p:cNvSpPr/>
+          <p:nvPr/>
+        </p:nvSpPr>
+        <p:spPr>
+          <a:xfrm>
+            <a:off x="4875073" y="437159"/>
+            <a:ext cx="360000" cy="360000"/>
+          </a:xfrm>
+          <a:prstGeom prst="rect">
+            <a:avLst/>
+          </a:prstGeom>
+          <a:solidFill>
+            <a:srgbClr val="00B0F0"/>
+          </a:solidFill>
+        </p:spPr>
+        <p:style>
+          <a:lnRef idx="2">
+            <a:schemeClr val="accent1"/>
+          </a:lnRef>
+          <a:fillRef idx="1">
+            <a:schemeClr val="lt1"/>
+          </a:fillRef>
+          <a:effectRef idx="0">
+            <a:schemeClr val="accent1"/>
+          </a:effectRef>
+          <a:fontRef idx="minor">
+            <a:schemeClr val="dk1"/>
+          </a:fontRef>
+        </p:style>
+        <p:txBody>
+          <a:bodyPr rtlCol="0" anchor="ctr"/>
+          <a:lstStyle/>
+          <a:p>
+            <a:pPr algn="ctr"/>
+            <a:r>
+              <a:rPr lang="en-US" altLang="zh-CN" dirty="0"/>
+              <a:t>1</a:t>
+            </a:r>
+            <a:endParaRPr lang="zh-CN" altLang="en-US" dirty="0"/>
+          </a:p>
+        </p:txBody>
+      </p:sp>
+      <p:sp>
+        <p:nvSpPr>
+          <p:cNvPr id="52" name="矩形 51"/>
+          <p:cNvSpPr/>
+          <p:nvPr/>
+        </p:nvSpPr>
+        <p:spPr>
+          <a:xfrm>
+            <a:off x="5235073" y="437159"/>
+            <a:ext cx="360000" cy="360000"/>
+          </a:xfrm>
+          <a:prstGeom prst="rect">
+            <a:avLst/>
+          </a:prstGeom>
+        </p:spPr>
+        <p:style>
+          <a:lnRef idx="2">
+            <a:schemeClr val="accent1"/>
+          </a:lnRef>
+          <a:fillRef idx="1">
+            <a:schemeClr val="lt1"/>
+          </a:fillRef>
+          <a:effectRef idx="0">
+            <a:schemeClr val="accent1"/>
+          </a:effectRef>
+          <a:fontRef idx="minor">
+            <a:schemeClr val="dk1"/>
+          </a:fontRef>
+        </p:style>
+        <p:txBody>
+          <a:bodyPr rtlCol="0" anchor="ctr"/>
+          <a:lstStyle/>
+          <a:p>
+            <a:pPr algn="ctr"/>
+            <a:r>
+              <a:rPr lang="en-US" altLang="zh-CN" dirty="0"/>
+              <a:t>0</a:t>
+            </a:r>
+            <a:endParaRPr lang="zh-CN" altLang="en-US" dirty="0"/>
+          </a:p>
+        </p:txBody>
+      </p:sp>
+      <p:sp>
+        <p:nvSpPr>
+          <p:cNvPr id="53" name="矩形 52"/>
+          <p:cNvSpPr/>
+          <p:nvPr/>
+        </p:nvSpPr>
+        <p:spPr>
+          <a:xfrm>
+            <a:off x="5595073" y="437159"/>
+            <a:ext cx="360000" cy="360000"/>
+          </a:xfrm>
+          <a:prstGeom prst="rect">
+            <a:avLst/>
+          </a:prstGeom>
+        </p:spPr>
+        <p:style>
+          <a:lnRef idx="2">
+            <a:schemeClr val="accent1"/>
+          </a:lnRef>
+          <a:fillRef idx="1">
+            <a:schemeClr val="lt1"/>
+          </a:fillRef>
+          <a:effectRef idx="0">
+            <a:schemeClr val="accent1"/>
+          </a:effectRef>
+          <a:fontRef idx="minor">
+            <a:schemeClr val="dk1"/>
+          </a:fontRef>
+        </p:style>
+        <p:txBody>
+          <a:bodyPr rtlCol="0" anchor="ctr"/>
+          <a:lstStyle/>
+          <a:p>
+            <a:pPr algn="ctr"/>
+            <a:r>
+              <a:rPr lang="en-US" altLang="zh-CN" dirty="0"/>
+              <a:t>0</a:t>
+            </a:r>
+            <a:endParaRPr lang="zh-CN" altLang="en-US" dirty="0"/>
+          </a:p>
+        </p:txBody>
+      </p:sp>
+      <p:sp>
+        <p:nvSpPr>
+          <p:cNvPr id="54" name="矩形 53"/>
+          <p:cNvSpPr/>
+          <p:nvPr/>
+        </p:nvSpPr>
+        <p:spPr>
+          <a:xfrm>
+            <a:off x="5235073" y="76221"/>
+            <a:ext cx="360000" cy="360000"/>
+          </a:xfrm>
+          <a:prstGeom prst="rect">
+            <a:avLst/>
+          </a:prstGeom>
+          <a:ln>
+            <a:noFill/>
+          </a:ln>
+        </p:spPr>
+        <p:style>
+          <a:lnRef idx="2">
+            <a:schemeClr val="accent1"/>
+          </a:lnRef>
+          <a:fillRef idx="1">
+            <a:schemeClr val="lt1"/>
+          </a:fillRef>
+          <a:effectRef idx="0">
+            <a:schemeClr val="accent1"/>
+          </a:effectRef>
+          <a:fontRef idx="minor">
+            <a:schemeClr val="dk1"/>
+          </a:fontRef>
+        </p:style>
+        <p:txBody>
+          <a:bodyPr rtlCol="0" anchor="ctr"/>
+          <a:lstStyle/>
+          <a:p>
+            <a:pPr algn="ctr"/>
+            <a:r>
+              <a:rPr lang="en-US" altLang="zh-CN" dirty="0"/>
+              <a:t>b</a:t>
+            </a:r>
+            <a:endParaRPr lang="zh-CN" altLang="en-US" dirty="0"/>
+          </a:p>
+        </p:txBody>
+      </p:sp>
+      <p:sp>
+        <p:nvSpPr>
+          <p:cNvPr id="55" name="矩形 54"/>
+          <p:cNvSpPr/>
+          <p:nvPr/>
+        </p:nvSpPr>
+        <p:spPr>
+          <a:xfrm>
+            <a:off x="5595073" y="76221"/>
+            <a:ext cx="360000" cy="360000"/>
+          </a:xfrm>
+          <a:prstGeom prst="rect">
+            <a:avLst/>
+          </a:prstGeom>
+          <a:ln>
+            <a:noFill/>
+          </a:ln>
+        </p:spPr>
+        <p:style>
+          <a:lnRef idx="2">
+            <a:schemeClr val="accent1"/>
+          </a:lnRef>
+          <a:fillRef idx="1">
+            <a:schemeClr val="lt1"/>
+          </a:fillRef>
+          <a:effectRef idx="0">
+            <a:schemeClr val="accent1"/>
+          </a:effectRef>
+          <a:fontRef idx="minor">
+            <a:schemeClr val="dk1"/>
+          </a:fontRef>
+        </p:style>
+        <p:txBody>
+          <a:bodyPr rtlCol="0" anchor="ctr"/>
+          <a:lstStyle/>
+          <a:p>
+            <a:pPr algn="ctr"/>
+            <a:r>
+              <a:rPr lang="en-US" altLang="zh-CN" dirty="0" smtClean="0"/>
+              <a:t>a</a:t>
+            </a:r>
+            <a:endParaRPr lang="zh-CN" altLang="en-US" dirty="0"/>
+          </a:p>
+        </p:txBody>
+      </p:sp>
+      <p:sp>
+        <p:nvSpPr>
+          <p:cNvPr id="56" name="矩形 55"/>
+          <p:cNvSpPr/>
+          <p:nvPr/>
+        </p:nvSpPr>
+        <p:spPr>
+          <a:xfrm>
+            <a:off x="4875073" y="793969"/>
+            <a:ext cx="360000" cy="360000"/>
+          </a:xfrm>
+          <a:prstGeom prst="rect">
+            <a:avLst/>
+          </a:prstGeom>
+        </p:spPr>
+        <p:style>
+          <a:lnRef idx="2">
+            <a:schemeClr val="accent1"/>
+          </a:lnRef>
+          <a:fillRef idx="1">
+            <a:schemeClr val="lt1"/>
+          </a:fillRef>
+          <a:effectRef idx="0">
+            <a:schemeClr val="accent1"/>
+          </a:effectRef>
+          <a:fontRef idx="minor">
+            <a:schemeClr val="dk1"/>
+          </a:fontRef>
+        </p:style>
+        <p:txBody>
+          <a:bodyPr rtlCol="0" anchor="ctr"/>
+          <a:lstStyle/>
+          <a:p>
+            <a:pPr algn="ctr"/>
+            <a:r>
+              <a:rPr lang="en-US" altLang="zh-CN" dirty="0"/>
+              <a:t>0</a:t>
+            </a:r>
+            <a:endParaRPr lang="zh-CN" altLang="en-US" dirty="0"/>
+          </a:p>
+        </p:txBody>
+      </p:sp>
+      <p:sp>
+        <p:nvSpPr>
+          <p:cNvPr id="57" name="矩形 56"/>
+          <p:cNvSpPr/>
+          <p:nvPr/>
+        </p:nvSpPr>
+        <p:spPr>
+          <a:xfrm>
+            <a:off x="5235073" y="793969"/>
+            <a:ext cx="360000" cy="360000"/>
+          </a:xfrm>
+          <a:prstGeom prst="rect">
+            <a:avLst/>
+          </a:prstGeom>
+          <a:solidFill>
+            <a:schemeClr val="bg1"/>
+          </a:solidFill>
+        </p:spPr>
+        <p:style>
+          <a:lnRef idx="2">
+            <a:schemeClr val="accent1"/>
+          </a:lnRef>
+          <a:fillRef idx="1">
+            <a:schemeClr val="lt1"/>
+          </a:fillRef>
+          <a:effectRef idx="0">
+            <a:schemeClr val="accent1"/>
+          </a:effectRef>
+          <a:fontRef idx="minor">
+            <a:schemeClr val="dk1"/>
+          </a:fontRef>
+        </p:style>
+        <p:txBody>
+          <a:bodyPr rtlCol="0" anchor="ctr"/>
+          <a:lstStyle/>
+          <a:p>
+            <a:pPr algn="ctr"/>
+            <a:r>
+              <a:rPr lang="en-US" altLang="zh-CN" dirty="0"/>
+              <a:t>0</a:t>
+            </a:r>
+            <a:endParaRPr lang="zh-CN" altLang="en-US" dirty="0"/>
+          </a:p>
+        </p:txBody>
+      </p:sp>
+      <p:sp>
+        <p:nvSpPr>
+          <p:cNvPr id="58" name="矩形 57"/>
+          <p:cNvSpPr/>
+          <p:nvPr/>
+        </p:nvSpPr>
+        <p:spPr>
+          <a:xfrm>
+            <a:off x="5595073" y="793969"/>
+            <a:ext cx="360000" cy="360000"/>
+          </a:xfrm>
+          <a:prstGeom prst="rect">
+            <a:avLst/>
+          </a:prstGeom>
+          <a:solidFill>
+            <a:schemeClr val="bg1"/>
+          </a:solidFill>
+        </p:spPr>
+        <p:style>
+          <a:lnRef idx="2">
+            <a:schemeClr val="accent1"/>
+          </a:lnRef>
+          <a:fillRef idx="1">
+            <a:schemeClr val="lt1"/>
+          </a:fillRef>
+          <a:effectRef idx="0">
+            <a:schemeClr val="accent1"/>
+          </a:effectRef>
+          <a:fontRef idx="minor">
+            <a:schemeClr val="dk1"/>
+          </a:fontRef>
+        </p:style>
+        <p:txBody>
+          <a:bodyPr rtlCol="0" anchor="ctr"/>
+          <a:lstStyle/>
+          <a:p>
+            <a:pPr algn="ctr"/>
+            <a:r>
+              <a:rPr lang="en-US" altLang="zh-CN" dirty="0"/>
+              <a:t>0</a:t>
+            </a:r>
+            <a:endParaRPr lang="zh-CN" altLang="en-US" dirty="0"/>
+          </a:p>
+        </p:txBody>
+      </p:sp>
+      <p:sp>
+        <p:nvSpPr>
+          <p:cNvPr id="59" name="矩形 58"/>
+          <p:cNvSpPr/>
+          <p:nvPr/>
+        </p:nvSpPr>
+        <p:spPr>
+          <a:xfrm>
+            <a:off x="4875073" y="1151155"/>
+            <a:ext cx="360000" cy="360000"/>
+          </a:xfrm>
+          <a:prstGeom prst="rect">
+            <a:avLst/>
+          </a:prstGeom>
+          <a:solidFill>
+            <a:srgbClr val="00B0F0"/>
+          </a:solidFill>
+        </p:spPr>
+        <p:style>
+          <a:lnRef idx="2">
+            <a:schemeClr val="accent1"/>
+          </a:lnRef>
+          <a:fillRef idx="1">
+            <a:schemeClr val="lt1"/>
+          </a:fillRef>
+          <a:effectRef idx="0">
+            <a:schemeClr val="accent1"/>
+          </a:effectRef>
+          <a:fontRef idx="minor">
+            <a:schemeClr val="dk1"/>
+          </a:fontRef>
+        </p:style>
+        <p:txBody>
+          <a:bodyPr rtlCol="0" anchor="ctr"/>
+          <a:lstStyle/>
+          <a:p>
+            <a:pPr algn="ctr"/>
+            <a:r>
+              <a:rPr lang="en-US" altLang="zh-CN" dirty="0"/>
+              <a:t>1</a:t>
+            </a:r>
+            <a:endParaRPr lang="zh-CN" altLang="en-US" dirty="0"/>
+          </a:p>
+        </p:txBody>
+      </p:sp>
+      <p:sp>
+        <p:nvSpPr>
+          <p:cNvPr id="60" name="矩形 59"/>
+          <p:cNvSpPr/>
+          <p:nvPr/>
+        </p:nvSpPr>
+        <p:spPr>
+          <a:xfrm>
+            <a:off x="5235073" y="1151155"/>
+            <a:ext cx="360000" cy="360000"/>
+          </a:xfrm>
+          <a:prstGeom prst="rect">
+            <a:avLst/>
+          </a:prstGeom>
+          <a:solidFill>
+            <a:schemeClr val="bg1"/>
+          </a:solidFill>
+        </p:spPr>
+        <p:style>
+          <a:lnRef idx="2">
+            <a:schemeClr val="accent1"/>
+          </a:lnRef>
+          <a:fillRef idx="1">
+            <a:schemeClr val="lt1"/>
+          </a:fillRef>
+          <a:effectRef idx="0">
+            <a:schemeClr val="accent1"/>
+          </a:effectRef>
+          <a:fontRef idx="minor">
+            <a:schemeClr val="dk1"/>
+          </a:fontRef>
+        </p:style>
+        <p:txBody>
+          <a:bodyPr rtlCol="0" anchor="ctr"/>
+          <a:lstStyle/>
+          <a:p>
+            <a:pPr algn="ctr"/>
+            <a:r>
+              <a:rPr lang="en-US" altLang="zh-CN" dirty="0"/>
+              <a:t>0</a:t>
+            </a:r>
+            <a:endParaRPr lang="zh-CN" altLang="en-US" dirty="0"/>
+          </a:p>
+        </p:txBody>
+      </p:sp>
+      <p:sp>
+        <p:nvSpPr>
+          <p:cNvPr id="61" name="矩形 60"/>
+          <p:cNvSpPr/>
+          <p:nvPr/>
+        </p:nvSpPr>
+        <p:spPr>
+          <a:xfrm>
+            <a:off x="5595073" y="1151155"/>
+            <a:ext cx="360000" cy="360000"/>
+          </a:xfrm>
+          <a:prstGeom prst="rect">
+            <a:avLst/>
+          </a:prstGeom>
+          <a:solidFill>
+            <a:schemeClr val="bg1"/>
+          </a:solidFill>
+        </p:spPr>
+        <p:style>
+          <a:lnRef idx="2">
+            <a:schemeClr val="accent1"/>
+          </a:lnRef>
+          <a:fillRef idx="1">
+            <a:schemeClr val="lt1"/>
+          </a:fillRef>
+          <a:effectRef idx="0">
+            <a:schemeClr val="accent1"/>
+          </a:effectRef>
+          <a:fontRef idx="minor">
+            <a:schemeClr val="dk1"/>
+          </a:fontRef>
+        </p:style>
+        <p:txBody>
+          <a:bodyPr rtlCol="0" anchor="ctr"/>
+          <a:lstStyle/>
+          <a:p>
+            <a:pPr algn="ctr"/>
+            <a:r>
+              <a:rPr lang="en-US" altLang="zh-CN" dirty="0" smtClean="0"/>
+              <a:t>0</a:t>
+            </a:r>
+            <a:endParaRPr lang="zh-CN" altLang="en-US" dirty="0"/>
+          </a:p>
+        </p:txBody>
+      </p:sp>
+      <p:sp>
+        <p:nvSpPr>
+          <p:cNvPr id="62" name="矩形 61"/>
+          <p:cNvSpPr/>
+          <p:nvPr/>
+        </p:nvSpPr>
+        <p:spPr>
+          <a:xfrm>
+            <a:off x="4515073" y="789748"/>
+            <a:ext cx="360000" cy="360000"/>
+          </a:xfrm>
+          <a:prstGeom prst="rect">
+            <a:avLst/>
+          </a:prstGeom>
+          <a:ln>
+            <a:noFill/>
+          </a:ln>
+        </p:spPr>
+        <p:style>
+          <a:lnRef idx="2">
+            <a:schemeClr val="accent1"/>
+          </a:lnRef>
+          <a:fillRef idx="1">
+            <a:schemeClr val="lt1"/>
+          </a:fillRef>
+          <a:effectRef idx="0">
+            <a:schemeClr val="accent1"/>
+          </a:effectRef>
+          <a:fontRef idx="minor">
+            <a:schemeClr val="dk1"/>
+          </a:fontRef>
+        </p:style>
+        <p:txBody>
+          <a:bodyPr rtlCol="0" anchor="ctr"/>
+          <a:lstStyle/>
+          <a:p>
+            <a:pPr algn="ctr"/>
+            <a:r>
+              <a:rPr lang="en-US" altLang="zh-CN" dirty="0"/>
+              <a:t>a</a:t>
+            </a:r>
+            <a:endParaRPr lang="zh-CN" altLang="en-US" dirty="0"/>
+          </a:p>
+        </p:txBody>
+      </p:sp>
+      <p:sp>
+        <p:nvSpPr>
+          <p:cNvPr id="63" name="矩形 62"/>
+          <p:cNvSpPr/>
+          <p:nvPr/>
+        </p:nvSpPr>
+        <p:spPr>
+          <a:xfrm>
+            <a:off x="4515073" y="1142337"/>
+            <a:ext cx="360000" cy="360000"/>
+          </a:xfrm>
+          <a:prstGeom prst="rect">
+            <a:avLst/>
+          </a:prstGeom>
+          <a:ln>
+            <a:noFill/>
+          </a:ln>
+        </p:spPr>
+        <p:style>
+          <a:lnRef idx="2">
+            <a:schemeClr val="accent1"/>
+          </a:lnRef>
+          <a:fillRef idx="1">
+            <a:schemeClr val="lt1"/>
+          </a:fillRef>
+          <a:effectRef idx="0">
+            <a:schemeClr val="accent1"/>
+          </a:effectRef>
+          <a:fontRef idx="minor">
+            <a:schemeClr val="dk1"/>
+          </a:fontRef>
+        </p:style>
+        <p:txBody>
+          <a:bodyPr rtlCol="0" anchor="ctr"/>
+          <a:lstStyle/>
+          <a:p>
+            <a:pPr algn="ctr"/>
+            <a:r>
+              <a:rPr lang="en-US" altLang="zh-CN" dirty="0" smtClean="0"/>
+              <a:t>*</a:t>
+            </a:r>
+            <a:endParaRPr lang="zh-CN" altLang="en-US" dirty="0"/>
+          </a:p>
+        </p:txBody>
+      </p:sp>
+      <p:sp>
+        <p:nvSpPr>
+          <p:cNvPr id="64" name="矩形 63"/>
+          <p:cNvSpPr/>
+          <p:nvPr/>
+        </p:nvSpPr>
+        <p:spPr>
+          <a:xfrm>
+            <a:off x="4875073" y="1505459"/>
+            <a:ext cx="360000" cy="360000"/>
+          </a:xfrm>
+          <a:prstGeom prst="rect">
+            <a:avLst/>
+          </a:prstGeom>
+        </p:spPr>
+        <p:style>
+          <a:lnRef idx="2">
+            <a:schemeClr val="accent1"/>
+          </a:lnRef>
+          <a:fillRef idx="1">
+            <a:schemeClr val="lt1"/>
+          </a:fillRef>
+          <a:effectRef idx="0">
+            <a:schemeClr val="accent1"/>
+          </a:effectRef>
+          <a:fontRef idx="minor">
+            <a:schemeClr val="dk1"/>
+          </a:fontRef>
+        </p:style>
+        <p:txBody>
+          <a:bodyPr rtlCol="0" anchor="ctr"/>
+          <a:lstStyle/>
+          <a:p>
+            <a:pPr algn="ctr"/>
+            <a:r>
+              <a:rPr lang="en-US" altLang="zh-CN" dirty="0"/>
+              <a:t>0</a:t>
+            </a:r>
+            <a:endParaRPr lang="zh-CN" altLang="en-US" dirty="0"/>
+          </a:p>
+        </p:txBody>
+      </p:sp>
+      <p:sp>
+        <p:nvSpPr>
+          <p:cNvPr id="67" name="矩形 66"/>
+          <p:cNvSpPr/>
+          <p:nvPr/>
+        </p:nvSpPr>
+        <p:spPr>
+          <a:xfrm>
+            <a:off x="5235073" y="1505459"/>
+            <a:ext cx="360000" cy="360000"/>
+          </a:xfrm>
+          <a:prstGeom prst="rect">
+            <a:avLst/>
+          </a:prstGeom>
+          <a:solidFill>
+            <a:srgbClr val="00B0F0"/>
+          </a:solidFill>
+        </p:spPr>
+        <p:style>
+          <a:lnRef idx="2">
+            <a:schemeClr val="accent1"/>
+          </a:lnRef>
+          <a:fillRef idx="1">
+            <a:schemeClr val="lt1"/>
+          </a:fillRef>
+          <a:effectRef idx="0">
+            <a:schemeClr val="accent1"/>
+          </a:effectRef>
+          <a:fontRef idx="minor">
+            <a:schemeClr val="dk1"/>
+          </a:fontRef>
+        </p:style>
+        <p:txBody>
+          <a:bodyPr rtlCol="0" anchor="ctr"/>
+          <a:lstStyle/>
+          <a:p>
+            <a:pPr algn="ctr"/>
+            <a:r>
+              <a:rPr lang="en-US" altLang="zh-CN" dirty="0"/>
+              <a:t>1</a:t>
+            </a:r>
+            <a:endParaRPr lang="zh-CN" altLang="en-US" dirty="0"/>
+          </a:p>
+        </p:txBody>
+      </p:sp>
+      <p:sp>
+        <p:nvSpPr>
+          <p:cNvPr id="68" name="矩形 67"/>
+          <p:cNvSpPr/>
+          <p:nvPr/>
+        </p:nvSpPr>
+        <p:spPr>
+          <a:xfrm>
+            <a:off x="5595073" y="1505459"/>
+            <a:ext cx="360000" cy="360000"/>
+          </a:xfrm>
+          <a:prstGeom prst="rect">
+            <a:avLst/>
+          </a:prstGeom>
+          <a:solidFill>
+            <a:schemeClr val="bg1"/>
+          </a:solidFill>
+        </p:spPr>
+        <p:style>
+          <a:lnRef idx="2">
+            <a:schemeClr val="accent1"/>
+          </a:lnRef>
+          <a:fillRef idx="1">
+            <a:schemeClr val="lt1"/>
+          </a:fillRef>
+          <a:effectRef idx="0">
+            <a:schemeClr val="accent1"/>
+          </a:effectRef>
+          <a:fontRef idx="minor">
+            <a:schemeClr val="dk1"/>
+          </a:fontRef>
+        </p:style>
+        <p:txBody>
+          <a:bodyPr rtlCol="0" anchor="ctr"/>
+          <a:lstStyle/>
+          <a:p>
+            <a:pPr algn="ctr"/>
+            <a:r>
+              <a:rPr lang="en-US" altLang="zh-CN" dirty="0" smtClean="0"/>
+              <a:t>0</a:t>
+            </a:r>
+            <a:endParaRPr lang="zh-CN" altLang="en-US" dirty="0"/>
+          </a:p>
+        </p:txBody>
+      </p:sp>
+      <p:sp>
+        <p:nvSpPr>
+          <p:cNvPr id="69" name="矩形 68"/>
+          <p:cNvSpPr/>
+          <p:nvPr/>
+        </p:nvSpPr>
+        <p:spPr>
+          <a:xfrm>
+            <a:off x="4515073" y="1496641"/>
+            <a:ext cx="360000" cy="360000"/>
+          </a:xfrm>
+          <a:prstGeom prst="rect">
+            <a:avLst/>
+          </a:prstGeom>
+          <a:ln>
+            <a:noFill/>
+          </a:ln>
+        </p:spPr>
+        <p:style>
+          <a:lnRef idx="2">
+            <a:schemeClr val="accent1"/>
+          </a:lnRef>
+          <a:fillRef idx="1">
+            <a:schemeClr val="lt1"/>
+          </a:fillRef>
+          <a:effectRef idx="0">
+            <a:schemeClr val="accent1"/>
+          </a:effectRef>
+          <a:fontRef idx="minor">
+            <a:schemeClr val="dk1"/>
+          </a:fontRef>
+        </p:style>
+        <p:txBody>
+          <a:bodyPr rtlCol="0" anchor="ctr"/>
+          <a:lstStyle/>
+          <a:p>
+            <a:pPr algn="ctr"/>
+            <a:r>
+              <a:rPr lang="en-US" altLang="zh-CN" dirty="0" smtClean="0"/>
+              <a:t>.</a:t>
+            </a:r>
+            <a:endParaRPr lang="zh-CN" altLang="en-US" dirty="0"/>
+          </a:p>
+        </p:txBody>
+      </p:sp>
+      <p:cxnSp>
+        <p:nvCxnSpPr>
+          <p:cNvPr id="71" name="直接箭头连接符 70"/>
+          <p:cNvCxnSpPr/>
+          <p:nvPr/>
+        </p:nvCxnSpPr>
+        <p:spPr>
+          <a:xfrm rot="-2700000">
+            <a:off x="5505073" y="1955459"/>
+            <a:ext cx="180000" cy="180000"/>
+          </a:xfrm>
+          <a:prstGeom prst="straightConnector1">
+            <a:avLst/>
+          </a:prstGeom>
+          <a:ln w="12700">
+            <a:solidFill>
+              <a:schemeClr val="tx1"/>
+            </a:solidFill>
+            <a:tailEnd type="triangle"/>
+          </a:ln>
+        </p:spPr>
+        <p:style>
+          <a:lnRef idx="1">
+            <a:schemeClr val="accent1"/>
+          </a:lnRef>
+          <a:fillRef idx="0">
+            <a:schemeClr val="accent1"/>
+          </a:fillRef>
+          <a:effectRef idx="0">
+            <a:schemeClr val="accent1"/>
+          </a:effectRef>
+          <a:fontRef idx="minor">
+            <a:schemeClr val="tx1"/>
+          </a:fontRef>
+        </p:style>
+      </p:cxnSp>
+      <p:sp>
+        <p:nvSpPr>
+          <p:cNvPr id="73" name="矩形 72"/>
+          <p:cNvSpPr/>
+          <p:nvPr/>
+        </p:nvSpPr>
+        <p:spPr>
+          <a:xfrm>
+            <a:off x="4875073" y="1874277"/>
+            <a:ext cx="360000" cy="360000"/>
+          </a:xfrm>
+          <a:prstGeom prst="rect">
+            <a:avLst/>
+          </a:prstGeom>
+          <a:solidFill>
+            <a:srgbClr val="00B0F0"/>
+          </a:solidFill>
+        </p:spPr>
+        <p:style>
+          <a:lnRef idx="2">
+            <a:schemeClr val="accent1"/>
+          </a:lnRef>
+          <a:fillRef idx="1">
+            <a:schemeClr val="lt1"/>
+          </a:fillRef>
+          <a:effectRef idx="0">
+            <a:schemeClr val="accent1"/>
+          </a:effectRef>
+          <a:fontRef idx="minor">
+            <a:schemeClr val="dk1"/>
+          </a:fontRef>
+        </p:style>
+        <p:txBody>
+          <a:bodyPr rtlCol="0" anchor="ctr"/>
+          <a:lstStyle/>
+          <a:p>
+            <a:pPr algn="ctr"/>
+            <a:r>
+              <a:rPr lang="en-US" altLang="zh-CN" dirty="0"/>
+              <a:t>1</a:t>
+            </a:r>
+            <a:endParaRPr lang="zh-CN" altLang="en-US" dirty="0"/>
+          </a:p>
+        </p:txBody>
+      </p:sp>
+      <p:sp>
+        <p:nvSpPr>
+          <p:cNvPr id="74" name="矩形 73"/>
+          <p:cNvSpPr/>
+          <p:nvPr/>
+        </p:nvSpPr>
+        <p:spPr>
+          <a:xfrm>
+            <a:off x="5235073" y="1874277"/>
+            <a:ext cx="360000" cy="360000"/>
+          </a:xfrm>
+          <a:prstGeom prst="rect">
+            <a:avLst/>
+          </a:prstGeom>
+          <a:solidFill>
+            <a:srgbClr val="00B0F0"/>
+          </a:solidFill>
+        </p:spPr>
+        <p:style>
+          <a:lnRef idx="2">
+            <a:schemeClr val="accent1"/>
+          </a:lnRef>
+          <a:fillRef idx="1">
+            <a:schemeClr val="lt1"/>
+          </a:fillRef>
+          <a:effectRef idx="0">
+            <a:schemeClr val="accent1"/>
+          </a:effectRef>
+          <a:fontRef idx="minor">
+            <a:schemeClr val="dk1"/>
+          </a:fontRef>
+        </p:style>
+        <p:txBody>
+          <a:bodyPr rtlCol="0" anchor="ctr"/>
+          <a:lstStyle/>
+          <a:p>
+            <a:pPr algn="ctr"/>
+            <a:r>
+              <a:rPr lang="en-US" altLang="zh-CN" dirty="0" smtClean="0"/>
+              <a:t>1</a:t>
+            </a:r>
+            <a:endParaRPr lang="zh-CN" altLang="en-US" dirty="0"/>
+          </a:p>
+        </p:txBody>
+      </p:sp>
+      <p:sp>
+        <p:nvSpPr>
+          <p:cNvPr id="75" name="矩形 74"/>
+          <p:cNvSpPr/>
+          <p:nvPr/>
+        </p:nvSpPr>
+        <p:spPr>
+          <a:xfrm>
+            <a:off x="5595073" y="1874277"/>
+            <a:ext cx="360000" cy="360000"/>
+          </a:xfrm>
+          <a:prstGeom prst="rect">
+            <a:avLst/>
+          </a:prstGeom>
+          <a:solidFill>
+            <a:srgbClr val="00B0F0"/>
+          </a:solidFill>
+        </p:spPr>
+        <p:style>
+          <a:lnRef idx="2">
+            <a:schemeClr val="accent1"/>
+          </a:lnRef>
+          <a:fillRef idx="1">
+            <a:schemeClr val="lt1"/>
+          </a:fillRef>
+          <a:effectRef idx="0">
+            <a:schemeClr val="accent1"/>
+          </a:effectRef>
+          <a:fontRef idx="minor">
+            <a:schemeClr val="dk1"/>
+          </a:fontRef>
+        </p:style>
+        <p:txBody>
+          <a:bodyPr rtlCol="0" anchor="ctr"/>
+          <a:lstStyle/>
+          <a:p>
+            <a:pPr algn="ctr"/>
+            <a:r>
+              <a:rPr lang="en-US" altLang="zh-CN" dirty="0" smtClean="0"/>
+              <a:t>1</a:t>
+            </a:r>
+            <a:endParaRPr lang="zh-CN" altLang="en-US" dirty="0"/>
+          </a:p>
+        </p:txBody>
+      </p:sp>
+      <p:sp>
+        <p:nvSpPr>
+          <p:cNvPr id="76" name="矩形 75"/>
+          <p:cNvSpPr/>
+          <p:nvPr/>
+        </p:nvSpPr>
+        <p:spPr>
+          <a:xfrm>
+            <a:off x="4515073" y="1865459"/>
+            <a:ext cx="360000" cy="360000"/>
+          </a:xfrm>
+          <a:prstGeom prst="rect">
+            <a:avLst/>
+          </a:prstGeom>
+          <a:ln>
+            <a:noFill/>
+          </a:ln>
+        </p:spPr>
+        <p:style>
+          <a:lnRef idx="2">
+            <a:schemeClr val="accent1"/>
+          </a:lnRef>
+          <a:fillRef idx="1">
+            <a:schemeClr val="lt1"/>
+          </a:fillRef>
+          <a:effectRef idx="0">
+            <a:schemeClr val="accent1"/>
+          </a:effectRef>
+          <a:fontRef idx="minor">
+            <a:schemeClr val="dk1"/>
+          </a:fontRef>
+        </p:style>
+        <p:txBody>
+          <a:bodyPr rtlCol="0" anchor="ctr"/>
+          <a:lstStyle/>
+          <a:p>
+            <a:pPr algn="ctr"/>
+            <a:r>
+              <a:rPr lang="en-US" altLang="zh-CN" dirty="0" smtClean="0"/>
+              <a:t>*</a:t>
+            </a:r>
+            <a:endParaRPr lang="zh-CN" altLang="en-US" dirty="0"/>
+          </a:p>
+        </p:txBody>
+      </p:sp>
+      <p:sp>
+        <p:nvSpPr>
+          <p:cNvPr id="77" name="左弧形箭头 76"/>
+          <p:cNvSpPr/>
+          <p:nvPr/>
+        </p:nvSpPr>
+        <p:spPr>
+          <a:xfrm>
+            <a:off x="4910155" y="699875"/>
+            <a:ext cx="72000" cy="601143"/>
+          </a:xfrm>
+          <a:prstGeom prst="curvedRightArrow">
+            <a:avLst/>
+          </a:prstGeom>
+          <a:solidFill>
+            <a:schemeClr val="tx1"/>
+          </a:solidFill>
+          <a:ln w="6350">
+            <a:solidFill>
+              <a:schemeClr val="tx1"/>
+            </a:solidFill>
+            <a:headEnd type="none"/>
+            <a:tailEnd type="triangle"/>
+          </a:ln>
+        </p:spPr>
+        <p:style>
+          <a:lnRef idx="2">
+            <a:schemeClr val="accent1">
+              <a:shade val="50000"/>
+            </a:schemeClr>
+          </a:lnRef>
+          <a:fillRef idx="1">
+            <a:schemeClr val="accent1"/>
+          </a:fillRef>
+          <a:effectRef idx="0">
+            <a:schemeClr val="accent1"/>
+          </a:effectRef>
+          <a:fontRef idx="minor">
+            <a:schemeClr val="lt1"/>
+          </a:fontRef>
+        </p:style>
+        <p:txBody>
+          <a:bodyPr rtlCol="0" anchor="ctr"/>
+          <a:lstStyle/>
+          <a:p>
+            <a:pPr algn="ctr"/>
+            <a:endParaRPr lang="zh-CN" altLang="en-US">
+              <a:solidFill>
+                <a:schemeClr val="tx1"/>
+              </a:solidFill>
+            </a:endParaRPr>
+          </a:p>
+        </p:txBody>
+      </p:sp>
+      <p:sp>
+        <p:nvSpPr>
+          <p:cNvPr id="78" name="左弧形箭头 77"/>
+          <p:cNvSpPr/>
+          <p:nvPr/>
+        </p:nvSpPr>
+        <p:spPr>
+          <a:xfrm>
+            <a:off x="4914137" y="1395112"/>
+            <a:ext cx="72000" cy="601143"/>
+          </a:xfrm>
+          <a:prstGeom prst="curvedRightArrow">
+            <a:avLst/>
+          </a:prstGeom>
+          <a:solidFill>
+            <a:schemeClr val="tx1"/>
+          </a:solidFill>
+          <a:ln w="6350">
+            <a:solidFill>
+              <a:schemeClr val="tx1"/>
+            </a:solidFill>
+            <a:headEnd type="none"/>
+            <a:tailEnd type="triangle"/>
+          </a:ln>
+        </p:spPr>
+        <p:style>
+          <a:lnRef idx="2">
+            <a:schemeClr val="accent1">
+              <a:shade val="50000"/>
+            </a:schemeClr>
+          </a:lnRef>
+          <a:fillRef idx="1">
+            <a:schemeClr val="accent1"/>
+          </a:fillRef>
+          <a:effectRef idx="0">
+            <a:schemeClr val="accent1"/>
+          </a:effectRef>
+          <a:fontRef idx="minor">
+            <a:schemeClr val="lt1"/>
+          </a:fontRef>
+        </p:style>
+        <p:txBody>
+          <a:bodyPr rtlCol="0" anchor="ctr"/>
+          <a:lstStyle/>
+          <a:p>
+            <a:pPr algn="ctr"/>
+            <a:endParaRPr lang="zh-CN" altLang="en-US">
+              <a:solidFill>
+                <a:schemeClr val="tx1"/>
+              </a:solidFill>
+            </a:endParaRPr>
+          </a:p>
+        </p:txBody>
+      </p:sp>
+      <p:cxnSp>
+        <p:nvCxnSpPr>
+          <p:cNvPr id="80" name="直接箭头连接符 79"/>
+          <p:cNvCxnSpPr/>
+          <p:nvPr/>
+        </p:nvCxnSpPr>
+        <p:spPr>
+          <a:xfrm rot="2700000">
+            <a:off x="5368504" y="1815868"/>
+            <a:ext cx="108000" cy="108000"/>
+          </a:xfrm>
+          <a:prstGeom prst="straightConnector1">
+            <a:avLst/>
+          </a:prstGeom>
+          <a:ln w="12700">
+            <a:solidFill>
+              <a:schemeClr val="tx1"/>
+            </a:solidFill>
+            <a:tailEnd type="triangle"/>
+          </a:ln>
+        </p:spPr>
+        <p:style>
+          <a:lnRef idx="1">
+            <a:schemeClr val="accent1"/>
+          </a:lnRef>
+          <a:fillRef idx="0">
+            <a:schemeClr val="accent1"/>
+          </a:fillRef>
+          <a:effectRef idx="0">
+            <a:schemeClr val="accent1"/>
+          </a:effectRef>
+          <a:fontRef idx="minor">
+            <a:schemeClr val="tx1"/>
+          </a:fontRef>
+        </p:style>
+      </p:cxnSp>
+      <p:cxnSp>
+        <p:nvCxnSpPr>
+          <p:cNvPr id="81" name="直接箭头连接符 80"/>
+          <p:cNvCxnSpPr/>
+          <p:nvPr/>
+        </p:nvCxnSpPr>
+        <p:spPr>
+          <a:xfrm rot="-2700000">
+            <a:off x="5510946" y="1973885"/>
+            <a:ext cx="180000" cy="180000"/>
+          </a:xfrm>
+          <a:prstGeom prst="straightConnector1">
+            <a:avLst/>
+          </a:prstGeom>
+          <a:ln w="12700">
+            <a:solidFill>
+              <a:schemeClr val="tx1"/>
+            </a:solidFill>
+            <a:tailEnd type="triangle"/>
+          </a:ln>
+        </p:spPr>
+        <p:style>
+          <a:lnRef idx="1">
+            <a:schemeClr val="accent1"/>
+          </a:lnRef>
+          <a:fillRef idx="0">
+            <a:schemeClr val="accent1"/>
+          </a:fillRef>
+          <a:effectRef idx="0">
+            <a:schemeClr val="accent1"/>
+          </a:effectRef>
+          <a:fontRef idx="minor">
+            <a:schemeClr val="tx1"/>
+          </a:fontRef>
+        </p:style>
+      </p:cxnSp>
+      <p:sp>
+        <p:nvSpPr>
+          <p:cNvPr id="83" name="文本框 82"/>
+          <p:cNvSpPr txBox="1"/>
+          <p:nvPr/>
+        </p:nvSpPr>
+        <p:spPr>
+          <a:xfrm>
+            <a:off x="4702403" y="2338927"/>
+            <a:ext cx="1440202" cy="369332"/>
+          </a:xfrm>
+          <a:prstGeom prst="rect">
+            <a:avLst/>
+          </a:prstGeom>
+          <a:noFill/>
+        </p:spPr>
+        <p:txBody>
+          <a:bodyPr wrap="none" rtlCol="0">
+            <a:spAutoFit/>
+          </a:bodyPr>
+          <a:lstStyle/>
+          <a:p>
+            <a:r>
+              <a:rPr lang="en-US" altLang="zh-CN" dirty="0" smtClean="0"/>
+              <a:t>table[j][</a:t>
+            </a:r>
+            <a:r>
+              <a:rPr lang="en-US" altLang="zh-CN" dirty="0" err="1"/>
+              <a:t>i</a:t>
+            </a:r>
+            <a:r>
+              <a:rPr lang="en-US" altLang="zh-CN" dirty="0"/>
+              <a:t> + 1]</a:t>
+            </a:r>
+            <a:endParaRPr lang="zh-CN" altLang="en-US" dirty="0"/>
+          </a:p>
+        </p:txBody>
+      </p:sp>
+    </p:spTree>
+    <p:extLst>
+      <p:ext uri="{BB962C8B-B14F-4D97-AF65-F5344CB8AC3E}">
+        <p14:creationId xmlns:p14="http://schemas.microsoft.com/office/powerpoint/2010/main" val="3715688308"/>
+      </p:ext>
+    </p:extLst>
+  </p:cSld>
+  <p:clrMapOvr>
+    <a:masterClrMapping/>
+  </p:clrMapOvr>
+</p:sld>
+</file>
+
 <file path=ppt/slides/slide2.xml><?xml version="1.0" encoding="utf-8"?>
 <p:sld xmlns:a="http://schemas.openxmlformats.org/drawingml/2006/main" xmlns:r="http://schemas.openxmlformats.org/officeDocument/2006/relationships" xmlns:p="http://schemas.openxmlformats.org/presentationml/2006/main">
   <p:cSld>

</xml_diff>

<commit_message>
[#10 Regular Expression Matching] Update some resource files.
</commit_message>
<xml_diff>
--- a/Resources/010_RegularExpressionMatching_DynamicProgramming.pptx
+++ b/Resources/010_RegularExpressionMatching_DynamicProgramming.pptx
@@ -13492,6 +13492,60 @@
           </a:p>
         </p:txBody>
       </p:sp>
+      <p:sp>
+        <p:nvSpPr>
+          <p:cNvPr id="70" name="左弧形箭头 69"/>
+          <p:cNvSpPr/>
+          <p:nvPr/>
+        </p:nvSpPr>
+        <p:spPr>
+          <a:xfrm>
+            <a:off x="512988" y="1031991"/>
+            <a:ext cx="72000" cy="601143"/>
+          </a:xfrm>
+          <a:prstGeom prst="curvedRightArrow">
+            <a:avLst/>
+          </a:prstGeom>
+          <a:solidFill>
+            <a:schemeClr val="tx1"/>
+          </a:solidFill>
+          <a:ln w="6350">
+            <a:solidFill>
+              <a:schemeClr val="tx1"/>
+            </a:solidFill>
+            <a:headEnd type="none"/>
+            <a:tailEnd type="triangle"/>
+          </a:ln>
+        </p:spPr>
+        <p:style>
+          <a:lnRef idx="2">
+            <a:schemeClr val="accent1">
+              <a:shade val="50000"/>
+            </a:schemeClr>
+          </a:lnRef>
+          <a:fillRef idx="1">
+            <a:schemeClr val="accent1"/>
+          </a:fillRef>
+          <a:effectRef idx="0">
+            <a:schemeClr val="accent1"/>
+          </a:effectRef>
+          <a:fontRef idx="minor">
+            <a:schemeClr val="lt1"/>
+          </a:fontRef>
+        </p:style>
+        <p:txBody>
+          <a:bodyPr rtlCol="0" anchor="ctr"/>
+          <a:lstStyle/>
+          <a:p>
+            <a:pPr algn="ctr"/>
+            <a:endParaRPr lang="zh-CN" altLang="en-US">
+              <a:solidFill>
+                <a:schemeClr val="tx1"/>
+              </a:solidFill>
+            </a:endParaRPr>
+          </a:p>
+        </p:txBody>
+      </p:sp>
     </p:spTree>
     <p:extLst>
       <p:ext uri="{BB962C8B-B14F-4D97-AF65-F5344CB8AC3E}">

</xml_diff>